<commit_message>
Synching pres with exercises.
</commit_message>
<xml_diff>
--- a/CSS2018/presentation/images/ImagesForPres.pptx
+++ b/CSS2018/presentation/images/ImagesForPres.pptx
@@ -6,9 +6,11 @@
   </p:sldMasterIdLst>
   <p:sldIdLst>
     <p:sldId id="258" r:id="rId2"/>
-    <p:sldId id="259" r:id="rId3"/>
+    <p:sldId id="261" r:id="rId3"/>
     <p:sldId id="260" r:id="rId4"/>
     <p:sldId id="257" r:id="rId5"/>
+    <p:sldId id="259" r:id="rId6"/>
+    <p:sldId id="262" r:id="rId7"/>
   </p:sldIdLst>
   <p:sldSz cx="12192000" cy="6858000"/>
   <p:notesSz cx="6858000" cy="9144000"/>
@@ -244,7 +246,7 @@
           <a:p>
             <a:fld id="{D11E1260-BDD1-43CE-88D4-981C7FF86022}" type="datetimeFigureOut">
               <a:rPr lang="en-US" smtClean="0"/>
-              <a:t>2/11/2018</a:t>
+              <a:t>2/13/2018</a:t>
             </a:fld>
             <a:endParaRPr lang="en-US"/>
           </a:p>
@@ -412,7 +414,7 @@
           <a:p>
             <a:fld id="{D11E1260-BDD1-43CE-88D4-981C7FF86022}" type="datetimeFigureOut">
               <a:rPr lang="en-US" smtClean="0"/>
-              <a:t>2/11/2018</a:t>
+              <a:t>2/13/2018</a:t>
             </a:fld>
             <a:endParaRPr lang="en-US"/>
           </a:p>
@@ -590,7 +592,7 @@
           <a:p>
             <a:fld id="{D11E1260-BDD1-43CE-88D4-981C7FF86022}" type="datetimeFigureOut">
               <a:rPr lang="en-US" smtClean="0"/>
-              <a:t>2/11/2018</a:t>
+              <a:t>2/13/2018</a:t>
             </a:fld>
             <a:endParaRPr lang="en-US"/>
           </a:p>
@@ -758,7 +760,7 @@
           <a:p>
             <a:fld id="{D11E1260-BDD1-43CE-88D4-981C7FF86022}" type="datetimeFigureOut">
               <a:rPr lang="en-US" smtClean="0"/>
-              <a:t>2/11/2018</a:t>
+              <a:t>2/13/2018</a:t>
             </a:fld>
             <a:endParaRPr lang="en-US"/>
           </a:p>
@@ -1003,7 +1005,7 @@
           <a:p>
             <a:fld id="{D11E1260-BDD1-43CE-88D4-981C7FF86022}" type="datetimeFigureOut">
               <a:rPr lang="en-US" smtClean="0"/>
-              <a:t>2/11/2018</a:t>
+              <a:t>2/13/2018</a:t>
             </a:fld>
             <a:endParaRPr lang="en-US"/>
           </a:p>
@@ -1232,7 +1234,7 @@
           <a:p>
             <a:fld id="{D11E1260-BDD1-43CE-88D4-981C7FF86022}" type="datetimeFigureOut">
               <a:rPr lang="en-US" smtClean="0"/>
-              <a:t>2/11/2018</a:t>
+              <a:t>2/13/2018</a:t>
             </a:fld>
             <a:endParaRPr lang="en-US"/>
           </a:p>
@@ -1596,7 +1598,7 @@
           <a:p>
             <a:fld id="{D11E1260-BDD1-43CE-88D4-981C7FF86022}" type="datetimeFigureOut">
               <a:rPr lang="en-US" smtClean="0"/>
-              <a:t>2/11/2018</a:t>
+              <a:t>2/13/2018</a:t>
             </a:fld>
             <a:endParaRPr lang="en-US"/>
           </a:p>
@@ -1713,7 +1715,7 @@
           <a:p>
             <a:fld id="{D11E1260-BDD1-43CE-88D4-981C7FF86022}" type="datetimeFigureOut">
               <a:rPr lang="en-US" smtClean="0"/>
-              <a:t>2/11/2018</a:t>
+              <a:t>2/13/2018</a:t>
             </a:fld>
             <a:endParaRPr lang="en-US"/>
           </a:p>
@@ -1808,7 +1810,7 @@
           <a:p>
             <a:fld id="{D11E1260-BDD1-43CE-88D4-981C7FF86022}" type="datetimeFigureOut">
               <a:rPr lang="en-US" smtClean="0"/>
-              <a:t>2/11/2018</a:t>
+              <a:t>2/13/2018</a:t>
             </a:fld>
             <a:endParaRPr lang="en-US"/>
           </a:p>
@@ -2083,7 +2085,7 @@
           <a:p>
             <a:fld id="{D11E1260-BDD1-43CE-88D4-981C7FF86022}" type="datetimeFigureOut">
               <a:rPr lang="en-US" smtClean="0"/>
-              <a:t>2/11/2018</a:t>
+              <a:t>2/13/2018</a:t>
             </a:fld>
             <a:endParaRPr lang="en-US"/>
           </a:p>
@@ -2335,7 +2337,7 @@
           <a:p>
             <a:fld id="{D11E1260-BDD1-43CE-88D4-981C7FF86022}" type="datetimeFigureOut">
               <a:rPr lang="en-US" smtClean="0"/>
-              <a:t>2/11/2018</a:t>
+              <a:t>2/13/2018</a:t>
             </a:fld>
             <a:endParaRPr lang="en-US"/>
           </a:p>
@@ -2546,7 +2548,7 @@
           <a:p>
             <a:fld id="{D11E1260-BDD1-43CE-88D4-981C7FF86022}" type="datetimeFigureOut">
               <a:rPr lang="en-US" smtClean="0"/>
-              <a:t>2/11/2018</a:t>
+              <a:t>2/13/2018</a:t>
             </a:fld>
             <a:endParaRPr lang="en-US"/>
           </a:p>
@@ -2953,93 +2955,6 @@
       </p:grpSpPr>
       <p:sp>
         <p:nvSpPr>
-          <p:cNvPr id="3" name="TextBox 2"/>
-          <p:cNvSpPr txBox="1"/>
-          <p:nvPr/>
-        </p:nvSpPr>
-        <p:spPr>
-          <a:xfrm>
-            <a:off x="2483709" y="1421027"/>
-            <a:ext cx="1087862" cy="400110"/>
-          </a:xfrm>
-          <a:prstGeom prst="rect">
-            <a:avLst/>
-          </a:prstGeom>
-          <a:noFill/>
-        </p:spPr>
-        <p:txBody>
-          <a:bodyPr wrap="none" rtlCol="0">
-            <a:spAutoFit/>
-          </a:bodyPr>
-          <a:lstStyle/>
-          <a:p>
-            <a:r>
-              <a:rPr lang="en-US" sz="2000" b="1" dirty="0"/>
-              <a:t>SUBJECT</a:t>
-            </a:r>
-          </a:p>
-        </p:txBody>
-      </p:sp>
-      <p:sp>
-        <p:nvSpPr>
-          <p:cNvPr id="45" name="TextBox 44"/>
-          <p:cNvSpPr txBox="1"/>
-          <p:nvPr/>
-        </p:nvSpPr>
-        <p:spPr>
-          <a:xfrm>
-            <a:off x="5350491" y="1421027"/>
-            <a:ext cx="1344407" cy="400110"/>
-          </a:xfrm>
-          <a:prstGeom prst="rect">
-            <a:avLst/>
-          </a:prstGeom>
-          <a:noFill/>
-        </p:spPr>
-        <p:txBody>
-          <a:bodyPr wrap="none" rtlCol="0">
-            <a:spAutoFit/>
-          </a:bodyPr>
-          <a:lstStyle/>
-          <a:p>
-            <a:r>
-              <a:rPr lang="en-US" sz="2000" b="1" dirty="0"/>
-              <a:t>PREDICATE</a:t>
-            </a:r>
-          </a:p>
-        </p:txBody>
-      </p:sp>
-      <p:sp>
-        <p:nvSpPr>
-          <p:cNvPr id="47" name="TextBox 46"/>
-          <p:cNvSpPr txBox="1"/>
-          <p:nvPr/>
-        </p:nvSpPr>
-        <p:spPr>
-          <a:xfrm>
-            <a:off x="7833641" y="1421027"/>
-            <a:ext cx="972446" cy="400110"/>
-          </a:xfrm>
-          <a:prstGeom prst="rect">
-            <a:avLst/>
-          </a:prstGeom>
-          <a:noFill/>
-        </p:spPr>
-        <p:txBody>
-          <a:bodyPr wrap="none" rtlCol="0">
-            <a:spAutoFit/>
-          </a:bodyPr>
-          <a:lstStyle/>
-          <a:p>
-            <a:r>
-              <a:rPr lang="en-US" sz="2000" b="1" dirty="0"/>
-              <a:t>OBJECT</a:t>
-            </a:r>
-          </a:p>
-        </p:txBody>
-      </p:sp>
-      <p:sp>
-        <p:nvSpPr>
           <p:cNvPr id="49" name="TextBox 48"/>
           <p:cNvSpPr txBox="1"/>
           <p:nvPr/>
@@ -3156,7 +3071,7 @@
         <p:spPr>
           <a:xfrm flipH="1">
             <a:off x="2458986" y="3716866"/>
-            <a:ext cx="6134176" cy="1200329"/>
+            <a:ext cx="6311388" cy="1200329"/>
           </a:xfrm>
           <a:prstGeom prst="rect">
             <a:avLst/>
@@ -3173,7 +3088,7 @@
               <a:rPr lang="en-US" sz="2400" dirty="0">
                 <a:latin typeface="Calibri Light" panose="020F0302020204030204" pitchFamily="34" charset="0"/>
               </a:rPr>
-              <a:t>  Person 1                                    </a:t>
+              <a:t>Person 1                                        </a:t>
             </a:r>
             <a:r>
               <a:rPr lang="en-US" sz="2400" dirty="0" err="1">
@@ -3199,7 +3114,19 @@
               <a:rPr lang="en-US" sz="2400" dirty="0">
                 <a:latin typeface="Calibri Light" panose="020F0302020204030204" pitchFamily="34" charset="0"/>
               </a:rPr>
-              <a:t>“ Person1 has given name ‘Bob’ ”</a:t>
+              <a:t>“ Person1 </a:t>
+            </a:r>
+            <a:r>
+              <a:rPr lang="en-US" sz="2400" b="1" i="1" dirty="0">
+                <a:latin typeface="Calibri Light" panose="020F0302020204030204" pitchFamily="34" charset="0"/>
+              </a:rPr>
+              <a:t>has given name</a:t>
+            </a:r>
+            <a:r>
+              <a:rPr lang="en-US" sz="2400" dirty="0">
+                <a:latin typeface="Calibri Light" panose="020F0302020204030204" pitchFamily="34" charset="0"/>
+              </a:rPr>
+              <a:t> ‘Bob’ ”</a:t>
             </a:r>
           </a:p>
         </p:txBody>
@@ -3437,93 +3364,6 @@
       </p:grpSpPr>
       <p:sp>
         <p:nvSpPr>
-          <p:cNvPr id="3" name="TextBox 2"/>
-          <p:cNvSpPr txBox="1"/>
-          <p:nvPr/>
-        </p:nvSpPr>
-        <p:spPr>
-          <a:xfrm>
-            <a:off x="2483709" y="1421027"/>
-            <a:ext cx="1087862" cy="400110"/>
-          </a:xfrm>
-          <a:prstGeom prst="rect">
-            <a:avLst/>
-          </a:prstGeom>
-          <a:noFill/>
-        </p:spPr>
-        <p:txBody>
-          <a:bodyPr wrap="none" rtlCol="0">
-            <a:spAutoFit/>
-          </a:bodyPr>
-          <a:lstStyle/>
-          <a:p>
-            <a:r>
-              <a:rPr lang="en-US" sz="2000" b="1" dirty="0"/>
-              <a:t>SUBJECT</a:t>
-            </a:r>
-          </a:p>
-        </p:txBody>
-      </p:sp>
-      <p:sp>
-        <p:nvSpPr>
-          <p:cNvPr id="45" name="TextBox 44"/>
-          <p:cNvSpPr txBox="1"/>
-          <p:nvPr/>
-        </p:nvSpPr>
-        <p:spPr>
-          <a:xfrm>
-            <a:off x="5350491" y="1421027"/>
-            <a:ext cx="1344407" cy="400110"/>
-          </a:xfrm>
-          <a:prstGeom prst="rect">
-            <a:avLst/>
-          </a:prstGeom>
-          <a:noFill/>
-        </p:spPr>
-        <p:txBody>
-          <a:bodyPr wrap="none" rtlCol="0">
-            <a:spAutoFit/>
-          </a:bodyPr>
-          <a:lstStyle/>
-          <a:p>
-            <a:r>
-              <a:rPr lang="en-US" sz="2000" b="1" dirty="0"/>
-              <a:t>PREDICATE</a:t>
-            </a:r>
-          </a:p>
-        </p:txBody>
-      </p:sp>
-      <p:sp>
-        <p:nvSpPr>
-          <p:cNvPr id="47" name="TextBox 46"/>
-          <p:cNvSpPr txBox="1"/>
-          <p:nvPr/>
-        </p:nvSpPr>
-        <p:spPr>
-          <a:xfrm>
-            <a:off x="7833641" y="1421027"/>
-            <a:ext cx="972446" cy="400110"/>
-          </a:xfrm>
-          <a:prstGeom prst="rect">
-            <a:avLst/>
-          </a:prstGeom>
-          <a:noFill/>
-        </p:spPr>
-        <p:txBody>
-          <a:bodyPr wrap="none" rtlCol="0">
-            <a:spAutoFit/>
-          </a:bodyPr>
-          <a:lstStyle/>
-          <a:p>
-            <a:r>
-              <a:rPr lang="en-US" sz="2000" b="1" dirty="0"/>
-              <a:t>OBJECT</a:t>
-            </a:r>
-          </a:p>
-        </p:txBody>
-      </p:sp>
-      <p:sp>
-        <p:nvSpPr>
           <p:cNvPr id="49" name="TextBox 48"/>
           <p:cNvSpPr txBox="1"/>
           <p:nvPr/>
@@ -3639,8 +3479,8 @@
         </p:nvSpPr>
         <p:spPr>
           <a:xfrm flipH="1">
-            <a:off x="2458986" y="3716866"/>
-            <a:ext cx="6134176" cy="1200329"/>
+            <a:off x="2458985" y="3716866"/>
+            <a:ext cx="5750949" cy="1200329"/>
           </a:xfrm>
           <a:prstGeom prst="rect">
             <a:avLst/>
@@ -3657,33 +3497,45 @@
               <a:rPr lang="en-US" sz="2400" dirty="0">
                 <a:latin typeface="Calibri Light" panose="020F0302020204030204" pitchFamily="34" charset="0"/>
               </a:rPr>
-              <a:t>  Person 1                             </a:t>
+              <a:t>Drug 1                                            study=Study1</a:t>
+            </a:r>
+          </a:p>
+          <a:p>
+            <a:endParaRPr lang="en-US" sz="2400" dirty="0">
+              <a:latin typeface="Calibri Light" panose="020F0302020204030204" pitchFamily="34" charset="0"/>
+            </a:endParaRPr>
+          </a:p>
+          <a:p>
+            <a:pPr algn="ctr"/>
+            <a:r>
+              <a:rPr lang="en-US" sz="2400" dirty="0">
+                <a:latin typeface="Calibri Light" panose="020F0302020204030204" pitchFamily="34" charset="0"/>
+              </a:rPr>
+              <a:t>“ Drug1 </a:t>
+            </a:r>
+            <a:r>
+              <a:rPr lang="en-US" sz="2400" b="1" i="1" dirty="0">
+                <a:latin typeface="Calibri Light" panose="020F0302020204030204" pitchFamily="34" charset="0"/>
+              </a:rPr>
+              <a:t>has study</a:t>
+            </a:r>
+            <a:r>
+              <a:rPr lang="en-US" sz="2400" dirty="0">
+                <a:latin typeface="Calibri Light" panose="020F0302020204030204" pitchFamily="34" charset="0"/>
+              </a:rPr>
+              <a:t> </a:t>
             </a:r>
             <a:r>
               <a:rPr lang="en-US" sz="2400" dirty="0" err="1">
                 <a:latin typeface="Calibri Light" panose="020F0302020204030204" pitchFamily="34" charset="0"/>
               </a:rPr>
-              <a:t>participatesIn</a:t>
+              <a:t>Study</a:t>
             </a:r>
             <a:r>
               <a:rPr lang="en-US" sz="2400" dirty="0">
                 <a:latin typeface="Calibri Light" panose="020F0302020204030204" pitchFamily="34" charset="0"/>
               </a:rPr>
-              <a:t>=Study1</a:t>
-            </a:r>
-          </a:p>
-          <a:p>
-            <a:endParaRPr lang="en-US" sz="2400" dirty="0">
-              <a:latin typeface="Calibri Light" panose="020F0302020204030204" pitchFamily="34" charset="0"/>
-            </a:endParaRPr>
-          </a:p>
-          <a:p>
-            <a:pPr algn="ctr"/>
-            <a:r>
-              <a:rPr lang="en-US" sz="2400" dirty="0">
-                <a:latin typeface="Calibri Light" panose="020F0302020204030204" pitchFamily="34" charset="0"/>
-              </a:rPr>
-              <a:t>“ Person1 participates in Study 1”</a:t>
+              <a:t> 1”</a:t>
             </a:r>
           </a:p>
         </p:txBody>
@@ -3741,7 +3593,7 @@
                   <a:schemeClr val="tx1"/>
                 </a:solidFill>
               </a:rPr>
-              <a:t>eg:Person1</a:t>
+              <a:t>eg:Drug1</a:t>
             </a:r>
           </a:p>
         </p:txBody>
@@ -3875,7 +3727,7 @@
                   </a:schemeClr>
                 </a:solidFill>
               </a:rPr>
-              <a:t>eg:participatesIn</a:t>
+              <a:t>ncit:study</a:t>
             </a:r>
             <a:endParaRPr lang="en-US" dirty="0">
               <a:solidFill>
@@ -3890,7 +3742,7 @@
     </p:spTree>
     <p:extLst>
       <p:ext uri="{BB962C8B-B14F-4D97-AF65-F5344CB8AC3E}">
-        <p14:creationId xmlns:p14="http://schemas.microsoft.com/office/powerpoint/2010/main" val="4214973345"/>
+        <p14:creationId xmlns:p14="http://schemas.microsoft.com/office/powerpoint/2010/main" val="2632591786"/>
       </p:ext>
     </p:extLst>
   </p:cSld>
@@ -3941,210 +3793,6 @@
           </a:prstGeom>
         </p:spPr>
       </p:pic>
-      <p:sp>
-        <p:nvSpPr>
-          <p:cNvPr id="5" name="TextBox 4"/>
-          <p:cNvSpPr txBox="1"/>
-          <p:nvPr/>
-        </p:nvSpPr>
-        <p:spPr>
-          <a:xfrm>
-            <a:off x="1544596" y="1285103"/>
-            <a:ext cx="1087862" cy="400110"/>
-          </a:xfrm>
-          <a:prstGeom prst="rect">
-            <a:avLst/>
-          </a:prstGeom>
-          <a:noFill/>
-        </p:spPr>
-        <p:txBody>
-          <a:bodyPr wrap="none" rtlCol="0">
-            <a:spAutoFit/>
-          </a:bodyPr>
-          <a:lstStyle/>
-          <a:p>
-            <a:r>
-              <a:rPr lang="en-US" sz="2000" b="1" dirty="0">
-                <a:solidFill>
-                  <a:schemeClr val="accent1">
-                    <a:lumMod val="75000"/>
-                  </a:schemeClr>
-                </a:solidFill>
-              </a:rPr>
-              <a:t>SUBJECT</a:t>
-            </a:r>
-          </a:p>
-        </p:txBody>
-      </p:sp>
-      <p:sp>
-        <p:nvSpPr>
-          <p:cNvPr id="6" name="TextBox 5"/>
-          <p:cNvSpPr txBox="1"/>
-          <p:nvPr/>
-        </p:nvSpPr>
-        <p:spPr>
-          <a:xfrm>
-            <a:off x="3321172" y="2162463"/>
-            <a:ext cx="1344407" cy="400110"/>
-          </a:xfrm>
-          <a:prstGeom prst="rect">
-            <a:avLst/>
-          </a:prstGeom>
-          <a:noFill/>
-        </p:spPr>
-        <p:txBody>
-          <a:bodyPr wrap="none" rtlCol="0">
-            <a:spAutoFit/>
-          </a:bodyPr>
-          <a:lstStyle/>
-          <a:p>
-            <a:r>
-              <a:rPr lang="en-US" sz="2000" b="1" dirty="0">
-                <a:solidFill>
-                  <a:schemeClr val="accent1">
-                    <a:lumMod val="75000"/>
-                  </a:schemeClr>
-                </a:solidFill>
-              </a:rPr>
-              <a:t>PREDICATE</a:t>
-            </a:r>
-          </a:p>
-        </p:txBody>
-      </p:sp>
-      <p:sp>
-        <p:nvSpPr>
-          <p:cNvPr id="7" name="TextBox 6"/>
-          <p:cNvSpPr txBox="1"/>
-          <p:nvPr/>
-        </p:nvSpPr>
-        <p:spPr>
-          <a:xfrm>
-            <a:off x="4332655" y="3406286"/>
-            <a:ext cx="972446" cy="400110"/>
-          </a:xfrm>
-          <a:prstGeom prst="rect">
-            <a:avLst/>
-          </a:prstGeom>
-          <a:noFill/>
-        </p:spPr>
-        <p:txBody>
-          <a:bodyPr wrap="none" rtlCol="0">
-            <a:spAutoFit/>
-          </a:bodyPr>
-          <a:lstStyle/>
-          <a:p>
-            <a:r>
-              <a:rPr lang="en-US" sz="2000" b="1" dirty="0">
-                <a:solidFill>
-                  <a:schemeClr val="accent1">
-                    <a:lumMod val="75000"/>
-                  </a:schemeClr>
-                </a:solidFill>
-              </a:rPr>
-              <a:t>OBJECT</a:t>
-            </a:r>
-          </a:p>
-        </p:txBody>
-      </p:sp>
-      <p:sp>
-        <p:nvSpPr>
-          <p:cNvPr id="8" name="TextBox 7"/>
-          <p:cNvSpPr txBox="1"/>
-          <p:nvPr/>
-        </p:nvSpPr>
-        <p:spPr>
-          <a:xfrm>
-            <a:off x="10154707" y="1285103"/>
-            <a:ext cx="972446" cy="400110"/>
-          </a:xfrm>
-          <a:prstGeom prst="rect">
-            <a:avLst/>
-          </a:prstGeom>
-          <a:noFill/>
-        </p:spPr>
-        <p:txBody>
-          <a:bodyPr wrap="none" rtlCol="0">
-            <a:spAutoFit/>
-          </a:bodyPr>
-          <a:lstStyle/>
-          <a:p>
-            <a:r>
-              <a:rPr lang="en-US" sz="2000" b="1" dirty="0">
-                <a:solidFill>
-                  <a:srgbClr val="C00000"/>
-                </a:solidFill>
-              </a:rPr>
-              <a:t>OBJECT</a:t>
-            </a:r>
-          </a:p>
-        </p:txBody>
-      </p:sp>
-      <p:sp>
-        <p:nvSpPr>
-          <p:cNvPr id="9" name="TextBox 8"/>
-          <p:cNvSpPr txBox="1"/>
-          <p:nvPr/>
-        </p:nvSpPr>
-        <p:spPr>
-          <a:xfrm>
-            <a:off x="7891451" y="2162463"/>
-            <a:ext cx="1344407" cy="400110"/>
-          </a:xfrm>
-          <a:prstGeom prst="rect">
-            <a:avLst/>
-          </a:prstGeom>
-          <a:noFill/>
-        </p:spPr>
-        <p:txBody>
-          <a:bodyPr wrap="none" rtlCol="0">
-            <a:spAutoFit/>
-          </a:bodyPr>
-          <a:lstStyle/>
-          <a:p>
-            <a:r>
-              <a:rPr lang="en-US" sz="2000" b="1" dirty="0">
-                <a:solidFill>
-                  <a:srgbClr val="C00000"/>
-                </a:solidFill>
-              </a:rPr>
-              <a:t>PREDICATE</a:t>
-            </a:r>
-          </a:p>
-        </p:txBody>
-      </p:sp>
-      <p:sp>
-        <p:nvSpPr>
-          <p:cNvPr id="10" name="TextBox 9"/>
-          <p:cNvSpPr txBox="1"/>
-          <p:nvPr/>
-        </p:nvSpPr>
-        <p:spPr>
-          <a:xfrm>
-            <a:off x="7347520" y="3430772"/>
-            <a:ext cx="1087862" cy="400110"/>
-          </a:xfrm>
-          <a:prstGeom prst="rect">
-            <a:avLst/>
-          </a:prstGeom>
-          <a:noFill/>
-        </p:spPr>
-        <p:txBody>
-          <a:bodyPr wrap="none" rtlCol="0">
-            <a:spAutoFit/>
-          </a:bodyPr>
-          <a:lstStyle/>
-          <a:p>
-            <a:r>
-              <a:rPr lang="en-US" sz="2000" b="1" dirty="0">
-                <a:solidFill>
-                  <a:srgbClr val="C00000"/>
-                </a:solidFill>
-              </a:rPr>
-              <a:t>SUBJECT</a:t>
-            </a:r>
-          </a:p>
-        </p:txBody>
-      </p:sp>
       <p:cxnSp>
         <p:nvCxnSpPr>
           <p:cNvPr id="12" name="Straight Arrow Connector 11"/>
@@ -4181,9 +3829,7 @@
       <p:cxnSp>
         <p:nvCxnSpPr>
           <p:cNvPr id="13" name="Straight Arrow Connector 12"/>
-          <p:cNvCxnSpPr>
-            <a:stCxn id="10" idx="0"/>
-          </p:cNvCxnSpPr>
+          <p:cNvCxnSpPr/>
           <p:nvPr/>
         </p:nvCxnSpPr>
         <p:spPr>
@@ -6027,6 +5673,453 @@
     <p:extLst>
       <p:ext uri="{BB962C8B-B14F-4D97-AF65-F5344CB8AC3E}">
         <p14:creationId xmlns:p14="http://schemas.microsoft.com/office/powerpoint/2010/main" val="711884031"/>
+      </p:ext>
+    </p:extLst>
+  </p:cSld>
+  <p:clrMapOvr>
+    <a:masterClrMapping/>
+  </p:clrMapOvr>
+</p:sld>
+</file>
+
+<file path=ppt/slides/slide5.xml><?xml version="1.0" encoding="utf-8"?>
+<p:sld xmlns:a="http://schemas.openxmlformats.org/drawingml/2006/main" xmlns:r="http://schemas.openxmlformats.org/officeDocument/2006/relationships" xmlns:p="http://schemas.openxmlformats.org/presentationml/2006/main">
+  <p:cSld>
+    <p:spTree>
+      <p:nvGrpSpPr>
+        <p:cNvPr id="1" name=""/>
+        <p:cNvGrpSpPr/>
+        <p:nvPr/>
+      </p:nvGrpSpPr>
+      <p:grpSpPr>
+        <a:xfrm>
+          <a:off x="0" y="0"/>
+          <a:ext cx="0" cy="0"/>
+          <a:chOff x="0" y="0"/>
+          <a:chExt cx="0" cy="0"/>
+        </a:xfrm>
+      </p:grpSpPr>
+      <p:sp>
+        <p:nvSpPr>
+          <p:cNvPr id="49" name="TextBox 48"/>
+          <p:cNvSpPr txBox="1"/>
+          <p:nvPr/>
+        </p:nvSpPr>
+        <p:spPr>
+          <a:xfrm>
+            <a:off x="2483709" y="3195726"/>
+            <a:ext cx="1172950" cy="400110"/>
+          </a:xfrm>
+          <a:prstGeom prst="rect">
+            <a:avLst/>
+          </a:prstGeom>
+          <a:noFill/>
+        </p:spPr>
+        <p:txBody>
+          <a:bodyPr wrap="none" rtlCol="0">
+            <a:spAutoFit/>
+          </a:bodyPr>
+          <a:lstStyle/>
+          <a:p>
+            <a:r>
+              <a:rPr lang="en-US" sz="2000" b="1" dirty="0">
+                <a:solidFill>
+                  <a:schemeClr val="accent1">
+                    <a:lumMod val="50000"/>
+                  </a:schemeClr>
+                </a:solidFill>
+              </a:rPr>
+              <a:t>Identifier</a:t>
+            </a:r>
+          </a:p>
+        </p:txBody>
+      </p:sp>
+      <p:sp>
+        <p:nvSpPr>
+          <p:cNvPr id="51" name="TextBox 50"/>
+          <p:cNvSpPr txBox="1"/>
+          <p:nvPr/>
+        </p:nvSpPr>
+        <p:spPr>
+          <a:xfrm>
+            <a:off x="6256314" y="3195726"/>
+            <a:ext cx="1820819" cy="400110"/>
+          </a:xfrm>
+          <a:prstGeom prst="rect">
+            <a:avLst/>
+          </a:prstGeom>
+          <a:noFill/>
+        </p:spPr>
+        <p:txBody>
+          <a:bodyPr wrap="none" rtlCol="0">
+            <a:spAutoFit/>
+          </a:bodyPr>
+          <a:lstStyle/>
+          <a:p>
+            <a:r>
+              <a:rPr lang="en-US" sz="2000" b="1" dirty="0"/>
+              <a:t>Key=Value Pair </a:t>
+            </a:r>
+          </a:p>
+        </p:txBody>
+      </p:sp>
+      <p:sp>
+        <p:nvSpPr>
+          <p:cNvPr id="26" name="Arc 25"/>
+          <p:cNvSpPr/>
+          <p:nvPr/>
+        </p:nvSpPr>
+        <p:spPr>
+          <a:xfrm rot="8184322">
+            <a:off x="5928653" y="787486"/>
+            <a:ext cx="2207740" cy="2207740"/>
+          </a:xfrm>
+          <a:prstGeom prst="arc">
+            <a:avLst/>
+          </a:prstGeom>
+          <a:ln w="76200">
+            <a:solidFill>
+              <a:srgbClr val="C00000"/>
+            </a:solidFill>
+            <a:headEnd type="triangle" w="med" len="med"/>
+            <a:tailEnd type="triangle"/>
+          </a:ln>
+        </p:spPr>
+        <p:style>
+          <a:lnRef idx="1">
+            <a:schemeClr val="accent1"/>
+          </a:lnRef>
+          <a:fillRef idx="0">
+            <a:schemeClr val="accent1"/>
+          </a:fillRef>
+          <a:effectRef idx="0">
+            <a:schemeClr val="accent1"/>
+          </a:effectRef>
+          <a:fontRef idx="minor">
+            <a:schemeClr val="tx1"/>
+          </a:fontRef>
+        </p:style>
+        <p:txBody>
+          <a:bodyPr rtlCol="0" anchor="ctr"/>
+          <a:lstStyle/>
+          <a:p>
+            <a:pPr algn="ctr"/>
+            <a:endParaRPr lang="en-US" dirty="0"/>
+          </a:p>
+        </p:txBody>
+      </p:sp>
+      <p:sp>
+        <p:nvSpPr>
+          <p:cNvPr id="28" name="TextBox 27"/>
+          <p:cNvSpPr txBox="1"/>
+          <p:nvPr/>
+        </p:nvSpPr>
+        <p:spPr>
+          <a:xfrm flipH="1">
+            <a:off x="2458986" y="3716866"/>
+            <a:ext cx="6134176" cy="1200329"/>
+          </a:xfrm>
+          <a:prstGeom prst="rect">
+            <a:avLst/>
+          </a:prstGeom>
+          <a:noFill/>
+        </p:spPr>
+        <p:txBody>
+          <a:bodyPr wrap="square" rtlCol="0">
+            <a:spAutoFit/>
+          </a:bodyPr>
+          <a:lstStyle/>
+          <a:p>
+            <a:r>
+              <a:rPr lang="en-US" sz="2400" dirty="0">
+                <a:latin typeface="Calibri Light" panose="020F0302020204030204" pitchFamily="34" charset="0"/>
+              </a:rPr>
+              <a:t>  Person 1                             </a:t>
+            </a:r>
+            <a:r>
+              <a:rPr lang="en-US" sz="2400" dirty="0" err="1">
+                <a:latin typeface="Calibri Light" panose="020F0302020204030204" pitchFamily="34" charset="0"/>
+              </a:rPr>
+              <a:t>participatesIn</a:t>
+            </a:r>
+            <a:r>
+              <a:rPr lang="en-US" sz="2400" dirty="0">
+                <a:latin typeface="Calibri Light" panose="020F0302020204030204" pitchFamily="34" charset="0"/>
+              </a:rPr>
+              <a:t>=Study1</a:t>
+            </a:r>
+          </a:p>
+          <a:p>
+            <a:endParaRPr lang="en-US" sz="2400" dirty="0">
+              <a:latin typeface="Calibri Light" panose="020F0302020204030204" pitchFamily="34" charset="0"/>
+            </a:endParaRPr>
+          </a:p>
+          <a:p>
+            <a:pPr algn="ctr"/>
+            <a:r>
+              <a:rPr lang="en-US" sz="2400" dirty="0">
+                <a:latin typeface="Calibri Light" panose="020F0302020204030204" pitchFamily="34" charset="0"/>
+              </a:rPr>
+              <a:t>“ Person1 participates in Study 1”</a:t>
+            </a:r>
+          </a:p>
+        </p:txBody>
+      </p:sp>
+      <p:sp>
+        <p:nvSpPr>
+          <p:cNvPr id="4" name="Rectangle: Rounded Corners 3"/>
+          <p:cNvSpPr/>
+          <p:nvPr/>
+        </p:nvSpPr>
+        <p:spPr>
+          <a:xfrm>
+            <a:off x="1976108" y="2086008"/>
+            <a:ext cx="2103064" cy="365721"/>
+          </a:xfrm>
+          <a:prstGeom prst="roundRect">
+            <a:avLst/>
+          </a:prstGeom>
+          <a:solidFill>
+            <a:schemeClr val="accent6">
+              <a:lumMod val="40000"/>
+              <a:lumOff val="60000"/>
+            </a:schemeClr>
+          </a:solidFill>
+          <a:ln>
+            <a:solidFill>
+              <a:schemeClr val="tx1"/>
+            </a:solidFill>
+          </a:ln>
+        </p:spPr>
+        <p:style>
+          <a:lnRef idx="2">
+            <a:schemeClr val="accent1">
+              <a:shade val="50000"/>
+            </a:schemeClr>
+          </a:lnRef>
+          <a:fillRef idx="1">
+            <a:schemeClr val="accent1"/>
+          </a:fillRef>
+          <a:effectRef idx="0">
+            <a:schemeClr val="accent1"/>
+          </a:effectRef>
+          <a:fontRef idx="minor">
+            <a:schemeClr val="lt1"/>
+          </a:fontRef>
+        </p:style>
+        <p:txBody>
+          <a:bodyPr rtlCol="0" anchor="ctr"/>
+          <a:lstStyle/>
+          <a:p>
+            <a:pPr algn="ctr"/>
+            <a:r>
+              <a:rPr lang="en-US" b="1" dirty="0">
+                <a:solidFill>
+                  <a:schemeClr val="tx1"/>
+                </a:solidFill>
+              </a:rPr>
+              <a:t>eg:Person1</a:t>
+            </a:r>
+          </a:p>
+        </p:txBody>
+      </p:sp>
+      <p:sp>
+        <p:nvSpPr>
+          <p:cNvPr id="11" name="Rectangle: Rounded Corners 10"/>
+          <p:cNvSpPr/>
+          <p:nvPr/>
+        </p:nvSpPr>
+        <p:spPr>
+          <a:xfrm>
+            <a:off x="7268332" y="2086008"/>
+            <a:ext cx="2103064" cy="365721"/>
+          </a:xfrm>
+          <a:prstGeom prst="roundRect">
+            <a:avLst/>
+          </a:prstGeom>
+          <a:solidFill>
+            <a:schemeClr val="accent6">
+              <a:lumMod val="40000"/>
+              <a:lumOff val="60000"/>
+            </a:schemeClr>
+          </a:solidFill>
+          <a:ln>
+            <a:solidFill>
+              <a:schemeClr val="tx1"/>
+            </a:solidFill>
+          </a:ln>
+        </p:spPr>
+        <p:style>
+          <a:lnRef idx="2">
+            <a:schemeClr val="accent1">
+              <a:shade val="50000"/>
+            </a:schemeClr>
+          </a:lnRef>
+          <a:fillRef idx="1">
+            <a:schemeClr val="accent1"/>
+          </a:fillRef>
+          <a:effectRef idx="0">
+            <a:schemeClr val="accent1"/>
+          </a:effectRef>
+          <a:fontRef idx="minor">
+            <a:schemeClr val="lt1"/>
+          </a:fontRef>
+        </p:style>
+        <p:txBody>
+          <a:bodyPr rtlCol="0" anchor="ctr"/>
+          <a:lstStyle/>
+          <a:p>
+            <a:pPr algn="ctr"/>
+            <a:r>
+              <a:rPr lang="en-US" b="1" dirty="0">
+                <a:solidFill>
+                  <a:schemeClr val="tx1"/>
+                </a:solidFill>
+              </a:rPr>
+              <a:t>eg:Study1</a:t>
+            </a:r>
+          </a:p>
+        </p:txBody>
+      </p:sp>
+      <p:cxnSp>
+        <p:nvCxnSpPr>
+          <p:cNvPr id="6" name="Straight Arrow Connector 5"/>
+          <p:cNvCxnSpPr>
+            <a:stCxn id="4" idx="3"/>
+            <a:endCxn id="11" idx="1"/>
+          </p:cNvCxnSpPr>
+          <p:nvPr/>
+        </p:nvCxnSpPr>
+        <p:spPr>
+          <a:xfrm>
+            <a:off x="4079172" y="2268869"/>
+            <a:ext cx="3189160" cy="0"/>
+          </a:xfrm>
+          <a:prstGeom prst="straightConnector1">
+            <a:avLst/>
+          </a:prstGeom>
+          <a:ln w="50800">
+            <a:solidFill>
+              <a:schemeClr val="bg1">
+                <a:lumMod val="50000"/>
+              </a:schemeClr>
+            </a:solidFill>
+            <a:tailEnd type="triangle"/>
+          </a:ln>
+        </p:spPr>
+        <p:style>
+          <a:lnRef idx="1">
+            <a:schemeClr val="accent1"/>
+          </a:lnRef>
+          <a:fillRef idx="0">
+            <a:schemeClr val="accent1"/>
+          </a:fillRef>
+          <a:effectRef idx="0">
+            <a:schemeClr val="accent1"/>
+          </a:effectRef>
+          <a:fontRef idx="minor">
+            <a:schemeClr val="tx1"/>
+          </a:fontRef>
+        </p:style>
+      </p:cxnSp>
+      <p:sp>
+        <p:nvSpPr>
+          <p:cNvPr id="7" name="TextBox 6"/>
+          <p:cNvSpPr txBox="1"/>
+          <p:nvPr/>
+        </p:nvSpPr>
+        <p:spPr>
+          <a:xfrm>
+            <a:off x="4933841" y="1891782"/>
+            <a:ext cx="2872535" cy="369332"/>
+          </a:xfrm>
+          <a:prstGeom prst="rect">
+            <a:avLst/>
+          </a:prstGeom>
+          <a:noFill/>
+        </p:spPr>
+        <p:txBody>
+          <a:bodyPr wrap="square" rtlCol="0">
+            <a:spAutoFit/>
+          </a:bodyPr>
+          <a:lstStyle/>
+          <a:p>
+            <a:r>
+              <a:rPr lang="en-US" dirty="0" err="1">
+                <a:solidFill>
+                  <a:schemeClr val="accent2">
+                    <a:lumMod val="75000"/>
+                  </a:schemeClr>
+                </a:solidFill>
+              </a:rPr>
+              <a:t>eg:participatesIn</a:t>
+            </a:r>
+            <a:endParaRPr lang="en-US" dirty="0">
+              <a:solidFill>
+                <a:schemeClr val="accent2">
+                  <a:lumMod val="75000"/>
+                </a:schemeClr>
+              </a:solidFill>
+            </a:endParaRPr>
+          </a:p>
+        </p:txBody>
+      </p:sp>
+    </p:spTree>
+    <p:extLst>
+      <p:ext uri="{BB962C8B-B14F-4D97-AF65-F5344CB8AC3E}">
+        <p14:creationId xmlns:p14="http://schemas.microsoft.com/office/powerpoint/2010/main" val="4214973345"/>
+      </p:ext>
+    </p:extLst>
+  </p:cSld>
+  <p:clrMapOvr>
+    <a:masterClrMapping/>
+  </p:clrMapOvr>
+</p:sld>
+</file>
+
+<file path=ppt/slides/slide6.xml><?xml version="1.0" encoding="utf-8"?>
+<p:sld xmlns:a="http://schemas.openxmlformats.org/drawingml/2006/main" xmlns:r="http://schemas.openxmlformats.org/officeDocument/2006/relationships" xmlns:p="http://schemas.openxmlformats.org/presentationml/2006/main">
+  <p:cSld>
+    <p:spTree>
+      <p:nvGrpSpPr>
+        <p:cNvPr id="1" name=""/>
+        <p:cNvGrpSpPr/>
+        <p:nvPr/>
+      </p:nvGrpSpPr>
+      <p:grpSpPr>
+        <a:xfrm>
+          <a:off x="0" y="0"/>
+          <a:ext cx="0" cy="0"/>
+          <a:chOff x="0" y="0"/>
+          <a:chExt cx="0" cy="0"/>
+        </a:xfrm>
+      </p:grpSpPr>
+      <p:sp>
+        <p:nvSpPr>
+          <p:cNvPr id="2" name="Title 1"/>
+          <p:cNvSpPr>
+            <a:spLocks noGrp="1"/>
+          </p:cNvSpPr>
+          <p:nvPr>
+            <p:ph type="title"/>
+          </p:nvPr>
+        </p:nvSpPr>
+        <p:spPr/>
+        <p:txBody>
+          <a:bodyPr/>
+          <a:lstStyle/>
+          <a:p>
+            <a:r>
+              <a:rPr lang="en-US" dirty="0"/>
+              <a:t>OLDE SLIDES</a:t>
+            </a:r>
+          </a:p>
+        </p:txBody>
+      </p:sp>
+    </p:spTree>
+    <p:extLst>
+      <p:ext uri="{BB962C8B-B14F-4D97-AF65-F5344CB8AC3E}">
+        <p14:creationId xmlns:p14="http://schemas.microsoft.com/office/powerpoint/2010/main" val="1009182284"/>
       </p:ext>
     </p:extLst>
   </p:cSld>

</xml_diff>

<commit_message>
ontology correction for LDExpert
</commit_message>
<xml_diff>
--- a/CSS2018/presentation/images/ImagesForPres.pptx
+++ b/CSS2018/presentation/images/ImagesForPres.pptx
@@ -7,10 +7,12 @@
   <p:sldIdLst>
     <p:sldId id="258" r:id="rId2"/>
     <p:sldId id="261" r:id="rId3"/>
-    <p:sldId id="260" r:id="rId4"/>
-    <p:sldId id="257" r:id="rId5"/>
-    <p:sldId id="259" r:id="rId6"/>
-    <p:sldId id="262" r:id="rId7"/>
+    <p:sldId id="263" r:id="rId4"/>
+    <p:sldId id="264" r:id="rId5"/>
+    <p:sldId id="260" r:id="rId6"/>
+    <p:sldId id="257" r:id="rId7"/>
+    <p:sldId id="259" r:id="rId8"/>
+    <p:sldId id="262" r:id="rId9"/>
   </p:sldIdLst>
   <p:sldSz cx="12192000" cy="6858000"/>
   <p:notesSz cx="6858000" cy="9144000"/>
@@ -246,7 +248,7 @@
           <a:p>
             <a:fld id="{D11E1260-BDD1-43CE-88D4-981C7FF86022}" type="datetimeFigureOut">
               <a:rPr lang="en-US" smtClean="0"/>
-              <a:t>2/13/2018</a:t>
+              <a:t>2/20/2018</a:t>
             </a:fld>
             <a:endParaRPr lang="en-US"/>
           </a:p>
@@ -414,7 +416,7 @@
           <a:p>
             <a:fld id="{D11E1260-BDD1-43CE-88D4-981C7FF86022}" type="datetimeFigureOut">
               <a:rPr lang="en-US" smtClean="0"/>
-              <a:t>2/13/2018</a:t>
+              <a:t>2/20/2018</a:t>
             </a:fld>
             <a:endParaRPr lang="en-US"/>
           </a:p>
@@ -592,7 +594,7 @@
           <a:p>
             <a:fld id="{D11E1260-BDD1-43CE-88D4-981C7FF86022}" type="datetimeFigureOut">
               <a:rPr lang="en-US" smtClean="0"/>
-              <a:t>2/13/2018</a:t>
+              <a:t>2/20/2018</a:t>
             </a:fld>
             <a:endParaRPr lang="en-US"/>
           </a:p>
@@ -760,7 +762,7 @@
           <a:p>
             <a:fld id="{D11E1260-BDD1-43CE-88D4-981C7FF86022}" type="datetimeFigureOut">
               <a:rPr lang="en-US" smtClean="0"/>
-              <a:t>2/13/2018</a:t>
+              <a:t>2/20/2018</a:t>
             </a:fld>
             <a:endParaRPr lang="en-US"/>
           </a:p>
@@ -1005,7 +1007,7 @@
           <a:p>
             <a:fld id="{D11E1260-BDD1-43CE-88D4-981C7FF86022}" type="datetimeFigureOut">
               <a:rPr lang="en-US" smtClean="0"/>
-              <a:t>2/13/2018</a:t>
+              <a:t>2/20/2018</a:t>
             </a:fld>
             <a:endParaRPr lang="en-US"/>
           </a:p>
@@ -1234,7 +1236,7 @@
           <a:p>
             <a:fld id="{D11E1260-BDD1-43CE-88D4-981C7FF86022}" type="datetimeFigureOut">
               <a:rPr lang="en-US" smtClean="0"/>
-              <a:t>2/13/2018</a:t>
+              <a:t>2/20/2018</a:t>
             </a:fld>
             <a:endParaRPr lang="en-US"/>
           </a:p>
@@ -1598,7 +1600,7 @@
           <a:p>
             <a:fld id="{D11E1260-BDD1-43CE-88D4-981C7FF86022}" type="datetimeFigureOut">
               <a:rPr lang="en-US" smtClean="0"/>
-              <a:t>2/13/2018</a:t>
+              <a:t>2/20/2018</a:t>
             </a:fld>
             <a:endParaRPr lang="en-US"/>
           </a:p>
@@ -1715,7 +1717,7 @@
           <a:p>
             <a:fld id="{D11E1260-BDD1-43CE-88D4-981C7FF86022}" type="datetimeFigureOut">
               <a:rPr lang="en-US" smtClean="0"/>
-              <a:t>2/13/2018</a:t>
+              <a:t>2/20/2018</a:t>
             </a:fld>
             <a:endParaRPr lang="en-US"/>
           </a:p>
@@ -1810,7 +1812,7 @@
           <a:p>
             <a:fld id="{D11E1260-BDD1-43CE-88D4-981C7FF86022}" type="datetimeFigureOut">
               <a:rPr lang="en-US" smtClean="0"/>
-              <a:t>2/13/2018</a:t>
+              <a:t>2/20/2018</a:t>
             </a:fld>
             <a:endParaRPr lang="en-US"/>
           </a:p>
@@ -2085,7 +2087,7 @@
           <a:p>
             <a:fld id="{D11E1260-BDD1-43CE-88D4-981C7FF86022}" type="datetimeFigureOut">
               <a:rPr lang="en-US" smtClean="0"/>
-              <a:t>2/13/2018</a:t>
+              <a:t>2/20/2018</a:t>
             </a:fld>
             <a:endParaRPr lang="en-US"/>
           </a:p>
@@ -2337,7 +2339,7 @@
           <a:p>
             <a:fld id="{D11E1260-BDD1-43CE-88D4-981C7FF86022}" type="datetimeFigureOut">
               <a:rPr lang="en-US" smtClean="0"/>
-              <a:t>2/13/2018</a:t>
+              <a:t>2/20/2018</a:t>
             </a:fld>
             <a:endParaRPr lang="en-US"/>
           </a:p>
@@ -2548,7 +2550,7 @@
           <a:p>
             <a:fld id="{D11E1260-BDD1-43CE-88D4-981C7FF86022}" type="datetimeFigureOut">
               <a:rPr lang="en-US" smtClean="0"/>
-              <a:t>2/13/2018</a:t>
+              <a:t>2/20/2018</a:t>
             </a:fld>
             <a:endParaRPr lang="en-US"/>
           </a:p>
@@ -3769,45 +3771,139 @@
           <a:chExt cx="0" cy="0"/>
         </a:xfrm>
       </p:grpSpPr>
-      <p:pic>
-        <p:nvPicPr>
-          <p:cNvPr id="4" name="Picture 3"/>
-          <p:cNvPicPr>
-            <a:picLocks noChangeAspect="1"/>
-          </p:cNvPicPr>
-          <p:nvPr/>
-        </p:nvPicPr>
-        <p:blipFill>
-          <a:blip r:embed="rId2"/>
-          <a:stretch>
-            <a:fillRect/>
-          </a:stretch>
-        </p:blipFill>
-        <p:spPr>
-          <a:xfrm>
-            <a:off x="2520521" y="582827"/>
-            <a:ext cx="7867650" cy="3048000"/>
-          </a:xfrm>
-          <a:prstGeom prst="rect">
-            <a:avLst/>
-          </a:prstGeom>
-        </p:spPr>
-      </p:pic>
+      <p:sp>
+        <p:nvSpPr>
+          <p:cNvPr id="4" name="Rectangle: Rounded Corners 3"/>
+          <p:cNvSpPr/>
+          <p:nvPr/>
+        </p:nvSpPr>
+        <p:spPr>
+          <a:xfrm>
+            <a:off x="543230" y="2086008"/>
+            <a:ext cx="3692340" cy="365721"/>
+          </a:xfrm>
+          <a:prstGeom prst="roundRect">
+            <a:avLst/>
+          </a:prstGeom>
+          <a:solidFill>
+            <a:schemeClr val="accent6">
+              <a:lumMod val="40000"/>
+              <a:lumOff val="60000"/>
+            </a:schemeClr>
+          </a:solidFill>
+          <a:ln>
+            <a:solidFill>
+              <a:schemeClr val="tx1"/>
+            </a:solidFill>
+          </a:ln>
+        </p:spPr>
+        <p:style>
+          <a:lnRef idx="2">
+            <a:schemeClr val="accent1">
+              <a:shade val="50000"/>
+            </a:schemeClr>
+          </a:lnRef>
+          <a:fillRef idx="1">
+            <a:schemeClr val="accent1"/>
+          </a:fillRef>
+          <a:effectRef idx="0">
+            <a:schemeClr val="accent1"/>
+          </a:effectRef>
+          <a:fontRef idx="minor">
+            <a:schemeClr val="lt1"/>
+          </a:fontRef>
+        </p:style>
+        <p:txBody>
+          <a:bodyPr rtlCol="0" anchor="ctr"/>
+          <a:lstStyle/>
+          <a:p>
+            <a:pPr algn="ctr"/>
+            <a:endParaRPr lang="en-US" b="1" dirty="0">
+              <a:solidFill>
+                <a:schemeClr val="tx1"/>
+              </a:solidFill>
+            </a:endParaRPr>
+          </a:p>
+        </p:txBody>
+      </p:sp>
+      <p:sp>
+        <p:nvSpPr>
+          <p:cNvPr id="11" name="Rectangle: Rounded Corners 10"/>
+          <p:cNvSpPr/>
+          <p:nvPr/>
+        </p:nvSpPr>
+        <p:spPr>
+          <a:xfrm>
+            <a:off x="7268331" y="2077988"/>
+            <a:ext cx="4265185" cy="365721"/>
+          </a:xfrm>
+          <a:prstGeom prst="roundRect">
+            <a:avLst/>
+          </a:prstGeom>
+          <a:solidFill>
+            <a:schemeClr val="accent6">
+              <a:lumMod val="40000"/>
+              <a:lumOff val="60000"/>
+            </a:schemeClr>
+          </a:solidFill>
+          <a:ln>
+            <a:solidFill>
+              <a:schemeClr val="tx1"/>
+            </a:solidFill>
+          </a:ln>
+        </p:spPr>
+        <p:style>
+          <a:lnRef idx="2">
+            <a:schemeClr val="accent1">
+              <a:shade val="50000"/>
+            </a:schemeClr>
+          </a:lnRef>
+          <a:fillRef idx="1">
+            <a:schemeClr val="accent1"/>
+          </a:fillRef>
+          <a:effectRef idx="0">
+            <a:schemeClr val="accent1"/>
+          </a:effectRef>
+          <a:fontRef idx="minor">
+            <a:schemeClr val="lt1"/>
+          </a:fontRef>
+        </p:style>
+        <p:txBody>
+          <a:bodyPr rtlCol="0" anchor="ctr"/>
+          <a:lstStyle/>
+          <a:p>
+            <a:pPr algn="ctr"/>
+            <a:endParaRPr lang="en-US" b="1" dirty="0">
+              <a:solidFill>
+                <a:schemeClr val="tx1"/>
+              </a:solidFill>
+            </a:endParaRPr>
+          </a:p>
+        </p:txBody>
+      </p:sp>
       <p:cxnSp>
         <p:nvCxnSpPr>
-          <p:cNvPr id="12" name="Straight Arrow Connector 11"/>
-          <p:cNvCxnSpPr/>
+          <p:cNvPr id="6" name="Straight Arrow Connector 5"/>
+          <p:cNvCxnSpPr>
+            <a:stCxn id="4" idx="3"/>
+            <a:endCxn id="11" idx="1"/>
+          </p:cNvCxnSpPr>
           <p:nvPr/>
         </p:nvCxnSpPr>
         <p:spPr>
-          <a:xfrm>
-            <a:off x="2065042" y="1638864"/>
-            <a:ext cx="2551235" cy="1791908"/>
+          <a:xfrm flipV="1">
+            <a:off x="4235570" y="2260849"/>
+            <a:ext cx="3032761" cy="8020"/>
           </a:xfrm>
           <a:prstGeom prst="straightConnector1">
             <a:avLst/>
           </a:prstGeom>
-          <a:ln w="101600">
+          <a:ln w="50800">
+            <a:solidFill>
+              <a:schemeClr val="bg1">
+                <a:lumMod val="50000"/>
+              </a:schemeClr>
+            </a:solidFill>
             <a:tailEnd type="triangle"/>
           </a:ln>
         </p:spPr>
@@ -3826,52 +3922,16 @@
           </a:fontRef>
         </p:style>
       </p:cxnSp>
-      <p:cxnSp>
-        <p:nvCxnSpPr>
-          <p:cNvPr id="13" name="Straight Arrow Connector 12"/>
-          <p:cNvCxnSpPr/>
-          <p:nvPr/>
-        </p:nvCxnSpPr>
-        <p:spPr>
-          <a:xfrm flipV="1">
-            <a:off x="7891451" y="1685213"/>
-            <a:ext cx="2565405" cy="1745559"/>
-          </a:xfrm>
-          <a:prstGeom prst="straightConnector1">
-            <a:avLst/>
-          </a:prstGeom>
-          <a:ln w="101600">
-            <a:solidFill>
-              <a:srgbClr val="C00000"/>
-            </a:solidFill>
-            <a:tailEnd type="triangle"/>
-          </a:ln>
-        </p:spPr>
-        <p:style>
-          <a:lnRef idx="1">
-            <a:schemeClr val="accent1"/>
-          </a:lnRef>
-          <a:fillRef idx="0">
-            <a:schemeClr val="accent1"/>
-          </a:fillRef>
-          <a:effectRef idx="0">
-            <a:schemeClr val="accent1"/>
-          </a:effectRef>
-          <a:fontRef idx="minor">
-            <a:schemeClr val="tx1"/>
-          </a:fontRef>
-        </p:style>
-      </p:cxnSp>
-      <p:sp>
-        <p:nvSpPr>
-          <p:cNvPr id="17" name="TextBox 16"/>
+      <p:sp>
+        <p:nvSpPr>
+          <p:cNvPr id="7" name="TextBox 6"/>
           <p:cNvSpPr txBox="1"/>
           <p:nvPr/>
         </p:nvSpPr>
         <p:spPr>
           <a:xfrm>
-            <a:off x="2525225" y="2196451"/>
-            <a:ext cx="535724" cy="923330"/>
+            <a:off x="2887514" y="3026762"/>
+            <a:ext cx="6168354" cy="369332"/>
           </a:xfrm>
           <a:prstGeom prst="rect">
             <a:avLst/>
@@ -3879,34 +3939,47 @@
           <a:noFill/>
         </p:spPr>
         <p:txBody>
-          <a:bodyPr wrap="none" rtlCol="0">
+          <a:bodyPr wrap="square" rtlCol="0">
             <a:spAutoFit/>
           </a:bodyPr>
           <a:lstStyle/>
           <a:p>
             <a:r>
-              <a:rPr lang="en-US" sz="5400" b="1" dirty="0">
+              <a:rPr lang="en-US" dirty="0">
                 <a:solidFill>
-                  <a:schemeClr val="accent1">
+                  <a:schemeClr val="accent2">
                     <a:lumMod val="75000"/>
                   </a:schemeClr>
                 </a:solidFill>
               </a:rPr>
-              <a:t>1</a:t>
-            </a:r>
-          </a:p>
-        </p:txBody>
-      </p:sp>
-      <p:sp>
-        <p:nvSpPr>
-          <p:cNvPr id="18" name="TextBox 17"/>
+              <a:t>http://ncicb.nci.nih.gov/xml/owl/EVS/Thesaurus.owl#</a:t>
+            </a:r>
+            <a:r>
+              <a:rPr lang="en-US" dirty="0">
+                <a:solidFill>
+                  <a:schemeClr val="accent2">
+                    <a:lumMod val="75000"/>
+                  </a:schemeClr>
+                </a:solidFill>
+                <a:highlight>
+                  <a:srgbClr val="FFFF00"/>
+                </a:highlight>
+              </a:rPr>
+              <a:t>study</a:t>
+            </a:r>
+          </a:p>
+        </p:txBody>
+      </p:sp>
+      <p:sp>
+        <p:nvSpPr>
+          <p:cNvPr id="10" name="TextBox 9"/>
           <p:cNvSpPr txBox="1"/>
           <p:nvPr/>
         </p:nvSpPr>
         <p:spPr>
           <a:xfrm>
-            <a:off x="9423475" y="2251483"/>
-            <a:ext cx="535724" cy="923330"/>
+            <a:off x="545128" y="2072408"/>
+            <a:ext cx="3761351" cy="369332"/>
           </a:xfrm>
           <a:prstGeom prst="rect">
             <a:avLst/>
@@ -3914,26 +3987,112 @@
           <a:noFill/>
         </p:spPr>
         <p:txBody>
-          <a:bodyPr wrap="none" rtlCol="0">
+          <a:bodyPr wrap="square" rtlCol="0">
             <a:spAutoFit/>
           </a:bodyPr>
           <a:lstStyle/>
           <a:p>
             <a:r>
-              <a:rPr lang="en-US" sz="5400" b="1" dirty="0">
-                <a:solidFill>
-                  <a:srgbClr val="C00000"/>
-                </a:solidFill>
+              <a:rPr lang="en-US" dirty="0"/>
+              <a:t>http://www.example.org/LDW#</a:t>
+            </a:r>
+            <a:r>
+              <a:rPr lang="en-US" b="1" dirty="0">
+                <a:highlight>
+                  <a:srgbClr val="FFFF00"/>
+                </a:highlight>
               </a:rPr>
-              <a:t>2</a:t>
-            </a:r>
+              <a:t>Drug1</a:t>
+            </a:r>
+          </a:p>
+        </p:txBody>
+      </p:sp>
+      <p:sp>
+        <p:nvSpPr>
+          <p:cNvPr id="12" name="TextBox 11"/>
+          <p:cNvSpPr txBox="1"/>
+          <p:nvPr/>
+        </p:nvSpPr>
+        <p:spPr>
+          <a:xfrm>
+            <a:off x="7268331" y="2086008"/>
+            <a:ext cx="3816612" cy="369332"/>
+          </a:xfrm>
+          <a:prstGeom prst="rect">
+            <a:avLst/>
+          </a:prstGeom>
+          <a:noFill/>
+        </p:spPr>
+        <p:txBody>
+          <a:bodyPr wrap="square" rtlCol="0">
+            <a:spAutoFit/>
+          </a:bodyPr>
+          <a:lstStyle/>
+          <a:p>
+            <a:r>
+              <a:rPr lang="en-US" dirty="0"/>
+              <a:t>http://www.example.org/LDW#</a:t>
+            </a:r>
+            <a:r>
+              <a:rPr lang="en-US" b="1" dirty="0">
+                <a:highlight>
+                  <a:srgbClr val="FFFF00"/>
+                </a:highlight>
+              </a:rPr>
+              <a:t>Study1</a:t>
+            </a:r>
+          </a:p>
+        </p:txBody>
+      </p:sp>
+      <p:sp>
+        <p:nvSpPr>
+          <p:cNvPr id="15" name="Arrow: Right 14"/>
+          <p:cNvSpPr/>
+          <p:nvPr/>
+        </p:nvSpPr>
+        <p:spPr>
+          <a:xfrm rot="16200000">
+            <a:off x="5086352" y="2495080"/>
+            <a:ext cx="724619" cy="338743"/>
+          </a:xfrm>
+          <a:prstGeom prst="rightArrow">
+            <a:avLst/>
+          </a:prstGeom>
+          <a:solidFill>
+            <a:schemeClr val="accent2">
+              <a:lumMod val="75000"/>
+            </a:schemeClr>
+          </a:solidFill>
+        </p:spPr>
+        <p:style>
+          <a:lnRef idx="2">
+            <a:schemeClr val="accent1">
+              <a:shade val="50000"/>
+            </a:schemeClr>
+          </a:lnRef>
+          <a:fillRef idx="1">
+            <a:schemeClr val="accent1"/>
+          </a:fillRef>
+          <a:effectRef idx="0">
+            <a:schemeClr val="accent1"/>
+          </a:effectRef>
+          <a:fontRef idx="minor">
+            <a:schemeClr val="lt1"/>
+          </a:fontRef>
+        </p:style>
+        <p:txBody>
+          <a:bodyPr rtlCol="0" anchor="ctr"/>
+          <a:lstStyle/>
+          <a:p>
+            <a:pPr algn="ctr"/>
+            <a:endParaRPr lang="en-US"/>
           </a:p>
         </p:txBody>
       </p:sp>
     </p:spTree>
     <p:extLst>
       <p:ext uri="{BB962C8B-B14F-4D97-AF65-F5344CB8AC3E}">
-        <p14:creationId xmlns:p14="http://schemas.microsoft.com/office/powerpoint/2010/main" val="6244059"/>
+        <p14:creationId xmlns:p14="http://schemas.microsoft.com/office/powerpoint/2010/main" val="3311363653"/>
       </p:ext>
     </p:extLst>
   </p:cSld>
@@ -3960,626 +4119,31 @@
           <a:chExt cx="0" cy="0"/>
         </a:xfrm>
       </p:grpSpPr>
-      <p:cxnSp>
-        <p:nvCxnSpPr>
-          <p:cNvPr id="27" name="Straight Connector 26"/>
-          <p:cNvCxnSpPr/>
-          <p:nvPr/>
-        </p:nvCxnSpPr>
-        <p:spPr>
-          <a:xfrm flipH="1">
-            <a:off x="5904417" y="839174"/>
-            <a:ext cx="54948" cy="2552955"/>
-          </a:xfrm>
-          <a:prstGeom prst="line">
-            <a:avLst/>
-          </a:prstGeom>
-        </p:spPr>
-        <p:style>
-          <a:lnRef idx="1">
-            <a:schemeClr val="accent1"/>
-          </a:lnRef>
-          <a:fillRef idx="0">
-            <a:schemeClr val="accent1"/>
-          </a:fillRef>
-          <a:effectRef idx="0">
-            <a:schemeClr val="accent1"/>
-          </a:effectRef>
-          <a:fontRef idx="minor">
-            <a:schemeClr val="tx1"/>
-          </a:fontRef>
-        </p:style>
-      </p:cxnSp>
-      <p:cxnSp>
-        <p:nvCxnSpPr>
-          <p:cNvPr id="29" name="Straight Connector 28"/>
-          <p:cNvCxnSpPr/>
-          <p:nvPr/>
-        </p:nvCxnSpPr>
-        <p:spPr>
-          <a:xfrm>
-            <a:off x="4166144" y="1137383"/>
-            <a:ext cx="1777456" cy="2228980"/>
-          </a:xfrm>
-          <a:prstGeom prst="line">
-            <a:avLst/>
-          </a:prstGeom>
-        </p:spPr>
-        <p:style>
-          <a:lnRef idx="1">
-            <a:schemeClr val="accent1"/>
-          </a:lnRef>
-          <a:fillRef idx="0">
-            <a:schemeClr val="accent1"/>
-          </a:fillRef>
-          <a:effectRef idx="0">
-            <a:schemeClr val="accent1"/>
-          </a:effectRef>
-          <a:fontRef idx="minor">
-            <a:schemeClr val="tx1"/>
-          </a:fontRef>
-        </p:style>
-      </p:cxnSp>
-      <p:cxnSp>
-        <p:nvCxnSpPr>
-          <p:cNvPr id="34" name="Straight Connector 33"/>
-          <p:cNvCxnSpPr/>
-          <p:nvPr/>
-        </p:nvCxnSpPr>
-        <p:spPr>
-          <a:xfrm>
-            <a:off x="3230350" y="1640544"/>
-            <a:ext cx="2713250" cy="1751585"/>
-          </a:xfrm>
-          <a:prstGeom prst="line">
-            <a:avLst/>
-          </a:prstGeom>
-        </p:spPr>
-        <p:style>
-          <a:lnRef idx="1">
-            <a:schemeClr val="accent1"/>
-          </a:lnRef>
-          <a:fillRef idx="0">
-            <a:schemeClr val="accent1"/>
-          </a:fillRef>
-          <a:effectRef idx="0">
-            <a:schemeClr val="accent1"/>
-          </a:effectRef>
-          <a:fontRef idx="minor">
-            <a:schemeClr val="tx1"/>
-          </a:fontRef>
-        </p:style>
-      </p:cxnSp>
-      <p:cxnSp>
-        <p:nvCxnSpPr>
-          <p:cNvPr id="36" name="Straight Connector 35"/>
-          <p:cNvCxnSpPr/>
-          <p:nvPr/>
-        </p:nvCxnSpPr>
-        <p:spPr>
-          <a:xfrm>
-            <a:off x="2736900" y="2301427"/>
-            <a:ext cx="3206700" cy="1087502"/>
-          </a:xfrm>
-          <a:prstGeom prst="line">
-            <a:avLst/>
-          </a:prstGeom>
-        </p:spPr>
-        <p:style>
-          <a:lnRef idx="1">
-            <a:schemeClr val="accent1"/>
-          </a:lnRef>
-          <a:fillRef idx="0">
-            <a:schemeClr val="accent1"/>
-          </a:fillRef>
-          <a:effectRef idx="0">
-            <a:schemeClr val="accent1"/>
-          </a:effectRef>
-          <a:fontRef idx="minor">
-            <a:schemeClr val="tx1"/>
-          </a:fontRef>
-        </p:style>
-      </p:cxnSp>
-      <p:cxnSp>
-        <p:nvCxnSpPr>
-          <p:cNvPr id="38" name="Straight Connector 37"/>
-          <p:cNvCxnSpPr/>
-          <p:nvPr/>
-        </p:nvCxnSpPr>
-        <p:spPr>
-          <a:xfrm>
-            <a:off x="2600958" y="2885609"/>
-            <a:ext cx="3358406" cy="517506"/>
-          </a:xfrm>
-          <a:prstGeom prst="line">
-            <a:avLst/>
-          </a:prstGeom>
-        </p:spPr>
-        <p:style>
-          <a:lnRef idx="1">
-            <a:schemeClr val="accent1"/>
-          </a:lnRef>
-          <a:fillRef idx="0">
-            <a:schemeClr val="accent1"/>
-          </a:fillRef>
-          <a:effectRef idx="0">
-            <a:schemeClr val="accent1"/>
-          </a:effectRef>
-          <a:fontRef idx="minor">
-            <a:schemeClr val="tx1"/>
-          </a:fontRef>
-        </p:style>
-      </p:cxnSp>
-      <p:cxnSp>
-        <p:nvCxnSpPr>
-          <p:cNvPr id="40" name="Straight Connector 39"/>
-          <p:cNvCxnSpPr/>
-          <p:nvPr/>
-        </p:nvCxnSpPr>
-        <p:spPr>
-          <a:xfrm flipV="1">
-            <a:off x="2402816" y="3446375"/>
-            <a:ext cx="3556548" cy="116647"/>
-          </a:xfrm>
-          <a:prstGeom prst="line">
-            <a:avLst/>
-          </a:prstGeom>
-        </p:spPr>
-        <p:style>
-          <a:lnRef idx="1">
-            <a:schemeClr val="accent1"/>
-          </a:lnRef>
-          <a:fillRef idx="0">
-            <a:schemeClr val="accent1"/>
-          </a:fillRef>
-          <a:effectRef idx="0">
-            <a:schemeClr val="accent1"/>
-          </a:effectRef>
-          <a:fontRef idx="minor">
-            <a:schemeClr val="tx1"/>
-          </a:fontRef>
-        </p:style>
-      </p:cxnSp>
-      <p:cxnSp>
-        <p:nvCxnSpPr>
-          <p:cNvPr id="42" name="Straight Connector 41"/>
-          <p:cNvCxnSpPr/>
-          <p:nvPr/>
-        </p:nvCxnSpPr>
-        <p:spPr>
-          <a:xfrm flipV="1">
-            <a:off x="2385847" y="3452740"/>
-            <a:ext cx="3573517" cy="710893"/>
-          </a:xfrm>
-          <a:prstGeom prst="line">
-            <a:avLst/>
-          </a:prstGeom>
-        </p:spPr>
-        <p:style>
-          <a:lnRef idx="1">
-            <a:schemeClr val="accent1"/>
-          </a:lnRef>
-          <a:fillRef idx="0">
-            <a:schemeClr val="accent1"/>
-          </a:fillRef>
-          <a:effectRef idx="0">
-            <a:schemeClr val="accent1"/>
-          </a:effectRef>
-          <a:fontRef idx="minor">
-            <a:schemeClr val="tx1"/>
-          </a:fontRef>
-        </p:style>
-      </p:cxnSp>
-      <p:cxnSp>
-        <p:nvCxnSpPr>
-          <p:cNvPr id="44" name="Straight Connector 43"/>
-          <p:cNvCxnSpPr/>
-          <p:nvPr/>
-        </p:nvCxnSpPr>
-        <p:spPr>
-          <a:xfrm flipV="1">
-            <a:off x="2721670" y="3466590"/>
-            <a:ext cx="3221930" cy="1299873"/>
-          </a:xfrm>
-          <a:prstGeom prst="line">
-            <a:avLst/>
-          </a:prstGeom>
-        </p:spPr>
-        <p:style>
-          <a:lnRef idx="1">
-            <a:schemeClr val="accent1"/>
-          </a:lnRef>
-          <a:fillRef idx="0">
-            <a:schemeClr val="accent1"/>
-          </a:fillRef>
-          <a:effectRef idx="0">
-            <a:schemeClr val="accent1"/>
-          </a:effectRef>
-          <a:fontRef idx="minor">
-            <a:schemeClr val="tx1"/>
-          </a:fontRef>
-        </p:style>
-      </p:cxnSp>
-      <p:cxnSp>
-        <p:nvCxnSpPr>
-          <p:cNvPr id="46" name="Straight Connector 45"/>
-          <p:cNvCxnSpPr/>
-          <p:nvPr/>
-        </p:nvCxnSpPr>
-        <p:spPr>
-          <a:xfrm flipV="1">
-            <a:off x="3276493" y="3481557"/>
-            <a:ext cx="2682871" cy="1976024"/>
-          </a:xfrm>
-          <a:prstGeom prst="line">
-            <a:avLst/>
-          </a:prstGeom>
-        </p:spPr>
-        <p:style>
-          <a:lnRef idx="1">
-            <a:schemeClr val="accent1"/>
-          </a:lnRef>
-          <a:fillRef idx="0">
-            <a:schemeClr val="accent1"/>
-          </a:fillRef>
-          <a:effectRef idx="0">
-            <a:schemeClr val="accent1"/>
-          </a:effectRef>
-          <a:fontRef idx="minor">
-            <a:schemeClr val="tx1"/>
-          </a:fontRef>
-        </p:style>
-      </p:cxnSp>
-      <p:cxnSp>
-        <p:nvCxnSpPr>
-          <p:cNvPr id="48" name="Straight Connector 47"/>
-          <p:cNvCxnSpPr/>
-          <p:nvPr/>
-        </p:nvCxnSpPr>
-        <p:spPr>
-          <a:xfrm flipV="1">
-            <a:off x="4370867" y="3488118"/>
-            <a:ext cx="1572733" cy="2489556"/>
-          </a:xfrm>
-          <a:prstGeom prst="line">
-            <a:avLst/>
-          </a:prstGeom>
-        </p:spPr>
-        <p:style>
-          <a:lnRef idx="1">
-            <a:schemeClr val="accent1"/>
-          </a:lnRef>
-          <a:fillRef idx="0">
-            <a:schemeClr val="accent1"/>
-          </a:fillRef>
-          <a:effectRef idx="0">
-            <a:schemeClr val="accent1"/>
-          </a:effectRef>
-          <a:fontRef idx="minor">
-            <a:schemeClr val="tx1"/>
-          </a:fontRef>
-        </p:style>
-      </p:cxnSp>
-      <p:cxnSp>
-        <p:nvCxnSpPr>
-          <p:cNvPr id="50" name="Straight Connector 49"/>
-          <p:cNvCxnSpPr/>
-          <p:nvPr/>
-        </p:nvCxnSpPr>
-        <p:spPr>
-          <a:xfrm flipH="1" flipV="1">
-            <a:off x="5940046" y="3532833"/>
-            <a:ext cx="77532" cy="2757208"/>
-          </a:xfrm>
-          <a:prstGeom prst="line">
-            <a:avLst/>
-          </a:prstGeom>
-        </p:spPr>
-        <p:style>
-          <a:lnRef idx="1">
-            <a:schemeClr val="accent1"/>
-          </a:lnRef>
-          <a:fillRef idx="0">
-            <a:schemeClr val="accent1"/>
-          </a:fillRef>
-          <a:effectRef idx="0">
-            <a:schemeClr val="accent1"/>
-          </a:effectRef>
-          <a:fontRef idx="minor">
-            <a:schemeClr val="tx1"/>
-          </a:fontRef>
-        </p:style>
-      </p:cxnSp>
-      <p:cxnSp>
-        <p:nvCxnSpPr>
-          <p:cNvPr id="52" name="Straight Connector 51"/>
-          <p:cNvCxnSpPr/>
-          <p:nvPr/>
-        </p:nvCxnSpPr>
-        <p:spPr>
-          <a:xfrm flipH="1" flipV="1">
-            <a:off x="5959364" y="3461847"/>
-            <a:ext cx="1689161" cy="2500532"/>
-          </a:xfrm>
-          <a:prstGeom prst="line">
-            <a:avLst/>
-          </a:prstGeom>
-        </p:spPr>
-        <p:style>
-          <a:lnRef idx="1">
-            <a:schemeClr val="accent1"/>
-          </a:lnRef>
-          <a:fillRef idx="0">
-            <a:schemeClr val="accent1"/>
-          </a:fillRef>
-          <a:effectRef idx="0">
-            <a:schemeClr val="accent1"/>
-          </a:effectRef>
-          <a:fontRef idx="minor">
-            <a:schemeClr val="tx1"/>
-          </a:fontRef>
-        </p:style>
-      </p:cxnSp>
-      <p:cxnSp>
-        <p:nvCxnSpPr>
-          <p:cNvPr id="54" name="Straight Connector 53"/>
-          <p:cNvCxnSpPr/>
-          <p:nvPr/>
-        </p:nvCxnSpPr>
-        <p:spPr>
-          <a:xfrm flipH="1" flipV="1">
-            <a:off x="6017578" y="3478587"/>
-            <a:ext cx="2477916" cy="1896196"/>
-          </a:xfrm>
-          <a:prstGeom prst="line">
-            <a:avLst/>
-          </a:prstGeom>
-        </p:spPr>
-        <p:style>
-          <a:lnRef idx="1">
-            <a:schemeClr val="accent1"/>
-          </a:lnRef>
-          <a:fillRef idx="0">
-            <a:schemeClr val="accent1"/>
-          </a:fillRef>
-          <a:effectRef idx="0">
-            <a:schemeClr val="accent1"/>
-          </a:effectRef>
-          <a:fontRef idx="minor">
-            <a:schemeClr val="tx1"/>
-          </a:fontRef>
-        </p:style>
-      </p:cxnSp>
-      <p:cxnSp>
-        <p:nvCxnSpPr>
-          <p:cNvPr id="56" name="Straight Connector 55"/>
-          <p:cNvCxnSpPr/>
-          <p:nvPr/>
-        </p:nvCxnSpPr>
-        <p:spPr>
-          <a:xfrm flipH="1" flipV="1">
-            <a:off x="5940046" y="3441809"/>
-            <a:ext cx="3202448" cy="1325140"/>
-          </a:xfrm>
-          <a:prstGeom prst="line">
-            <a:avLst/>
-          </a:prstGeom>
-        </p:spPr>
-        <p:style>
-          <a:lnRef idx="1">
-            <a:schemeClr val="accent1"/>
-          </a:lnRef>
-          <a:fillRef idx="0">
-            <a:schemeClr val="accent1"/>
-          </a:fillRef>
-          <a:effectRef idx="0">
-            <a:schemeClr val="accent1"/>
-          </a:effectRef>
-          <a:fontRef idx="minor">
-            <a:schemeClr val="tx1"/>
-          </a:fontRef>
-        </p:style>
-      </p:cxnSp>
-      <p:cxnSp>
-        <p:nvCxnSpPr>
-          <p:cNvPr id="58" name="Straight Connector 57"/>
-          <p:cNvCxnSpPr/>
-          <p:nvPr/>
-        </p:nvCxnSpPr>
-        <p:spPr>
-          <a:xfrm flipH="1" flipV="1">
-            <a:off x="5976333" y="3446375"/>
-            <a:ext cx="3606095" cy="747341"/>
-          </a:xfrm>
-          <a:prstGeom prst="line">
-            <a:avLst/>
-          </a:prstGeom>
-        </p:spPr>
-        <p:style>
-          <a:lnRef idx="1">
-            <a:schemeClr val="accent1"/>
-          </a:lnRef>
-          <a:fillRef idx="0">
-            <a:schemeClr val="accent1"/>
-          </a:fillRef>
-          <a:effectRef idx="0">
-            <a:schemeClr val="accent1"/>
-          </a:effectRef>
-          <a:fontRef idx="minor">
-            <a:schemeClr val="tx1"/>
-          </a:fontRef>
-        </p:style>
-      </p:cxnSp>
-      <p:cxnSp>
-        <p:nvCxnSpPr>
-          <p:cNvPr id="60" name="Straight Connector 59"/>
-          <p:cNvCxnSpPr/>
-          <p:nvPr/>
-        </p:nvCxnSpPr>
-        <p:spPr>
-          <a:xfrm flipH="1" flipV="1">
-            <a:off x="5975128" y="3441809"/>
-            <a:ext cx="3487317" cy="172755"/>
-          </a:xfrm>
-          <a:prstGeom prst="line">
-            <a:avLst/>
-          </a:prstGeom>
-        </p:spPr>
-        <p:style>
-          <a:lnRef idx="1">
-            <a:schemeClr val="accent1"/>
-          </a:lnRef>
-          <a:fillRef idx="0">
-            <a:schemeClr val="accent1"/>
-          </a:fillRef>
-          <a:effectRef idx="0">
-            <a:schemeClr val="accent1"/>
-          </a:effectRef>
-          <a:fontRef idx="minor">
-            <a:schemeClr val="tx1"/>
-          </a:fontRef>
-        </p:style>
-      </p:cxnSp>
-      <p:cxnSp>
-        <p:nvCxnSpPr>
-          <p:cNvPr id="62" name="Straight Connector 61"/>
-          <p:cNvCxnSpPr/>
-          <p:nvPr/>
-        </p:nvCxnSpPr>
-        <p:spPr>
-          <a:xfrm flipH="1">
-            <a:off x="5999457" y="2958452"/>
-            <a:ext cx="3354750" cy="444663"/>
-          </a:xfrm>
-          <a:prstGeom prst="line">
-            <a:avLst/>
-          </a:prstGeom>
-        </p:spPr>
-        <p:style>
-          <a:lnRef idx="1">
-            <a:schemeClr val="accent1"/>
-          </a:lnRef>
-          <a:fillRef idx="0">
-            <a:schemeClr val="accent1"/>
-          </a:fillRef>
-          <a:effectRef idx="0">
-            <a:schemeClr val="accent1"/>
-          </a:effectRef>
-          <a:fontRef idx="minor">
-            <a:schemeClr val="tx1"/>
-          </a:fontRef>
-        </p:style>
-      </p:cxnSp>
-      <p:cxnSp>
-        <p:nvCxnSpPr>
-          <p:cNvPr id="64" name="Straight Connector 63"/>
-          <p:cNvCxnSpPr/>
-          <p:nvPr/>
-        </p:nvCxnSpPr>
-        <p:spPr>
-          <a:xfrm flipH="1">
-            <a:off x="6015179" y="2409208"/>
-            <a:ext cx="3127315" cy="982734"/>
-          </a:xfrm>
-          <a:prstGeom prst="line">
-            <a:avLst/>
-          </a:prstGeom>
-        </p:spPr>
-        <p:style>
-          <a:lnRef idx="1">
-            <a:schemeClr val="accent1"/>
-          </a:lnRef>
-          <a:fillRef idx="0">
-            <a:schemeClr val="accent1"/>
-          </a:fillRef>
-          <a:effectRef idx="0">
-            <a:schemeClr val="accent1"/>
-          </a:effectRef>
-          <a:fontRef idx="minor">
-            <a:schemeClr val="tx1"/>
-          </a:fontRef>
-        </p:style>
-      </p:cxnSp>
-      <p:cxnSp>
-        <p:nvCxnSpPr>
-          <p:cNvPr id="66" name="Straight Connector 65"/>
-          <p:cNvCxnSpPr/>
-          <p:nvPr/>
-        </p:nvCxnSpPr>
-        <p:spPr>
-          <a:xfrm flipH="1">
-            <a:off x="5975128" y="1742801"/>
-            <a:ext cx="2753881" cy="1623562"/>
-          </a:xfrm>
-          <a:prstGeom prst="line">
-            <a:avLst/>
-          </a:prstGeom>
-        </p:spPr>
-        <p:style>
-          <a:lnRef idx="1">
-            <a:schemeClr val="accent1"/>
-          </a:lnRef>
-          <a:fillRef idx="0">
-            <a:schemeClr val="accent1"/>
-          </a:fillRef>
-          <a:effectRef idx="0">
-            <a:schemeClr val="accent1"/>
-          </a:effectRef>
-          <a:fontRef idx="minor">
-            <a:schemeClr val="tx1"/>
-          </a:fontRef>
-        </p:style>
-      </p:cxnSp>
-      <p:cxnSp>
-        <p:nvCxnSpPr>
-          <p:cNvPr id="68" name="Straight Connector 67"/>
-          <p:cNvCxnSpPr/>
-          <p:nvPr/>
-        </p:nvCxnSpPr>
-        <p:spPr>
-          <a:xfrm flipH="1">
-            <a:off x="5983692" y="1115802"/>
-            <a:ext cx="1795688" cy="2234141"/>
-          </a:xfrm>
-          <a:prstGeom prst="line">
-            <a:avLst/>
-          </a:prstGeom>
-        </p:spPr>
-        <p:style>
-          <a:lnRef idx="1">
-            <a:schemeClr val="accent1"/>
-          </a:lnRef>
-          <a:fillRef idx="0">
-            <a:schemeClr val="accent1"/>
-          </a:fillRef>
-          <a:effectRef idx="0">
-            <a:schemeClr val="accent1"/>
-          </a:effectRef>
-          <a:fontRef idx="minor">
-            <a:schemeClr val="tx1"/>
-          </a:fontRef>
-        </p:style>
-      </p:cxnSp>
-      <p:sp>
-        <p:nvSpPr>
-          <p:cNvPr id="4" name="Oval 3"/>
+      <p:sp>
+        <p:nvSpPr>
+          <p:cNvPr id="4" name="Rectangle: Rounded Corners 3"/>
           <p:cNvSpPr/>
           <p:nvPr/>
         </p:nvSpPr>
         <p:spPr>
           <a:xfrm>
-            <a:off x="4884755" y="2437661"/>
-            <a:ext cx="2094271" cy="1848464"/>
-          </a:xfrm>
-          <a:prstGeom prst="ellipse">
+            <a:off x="1976108" y="2086008"/>
+            <a:ext cx="2103064" cy="365721"/>
+          </a:xfrm>
+          <a:prstGeom prst="roundRect">
             <a:avLst/>
           </a:prstGeom>
           <a:solidFill>
-            <a:schemeClr val="accent1">
+            <a:schemeClr val="accent6">
               <a:lumMod val="40000"/>
               <a:lumOff val="60000"/>
             </a:schemeClr>
           </a:solidFill>
+          <a:ln>
+            <a:solidFill>
+              <a:schemeClr val="tx1"/>
+            </a:solidFill>
+          </a:ln>
         </p:spPr>
         <p:style>
           <a:lnRef idx="2">
@@ -4603,24 +4167,28 @@
           <a:p>
             <a:pPr algn="ctr"/>
             <a:r>
-              <a:rPr lang="en-US" sz="2300" b="1" dirty="0"/>
-              <a:t>Drug1Pool</a:t>
-            </a:r>
-          </a:p>
-        </p:txBody>
-      </p:sp>
-      <p:sp>
-        <p:nvSpPr>
-          <p:cNvPr id="5" name="Oval 4"/>
+              <a:rPr lang="en-US" b="1" dirty="0">
+                <a:solidFill>
+                  <a:schemeClr val="tx1"/>
+                </a:solidFill>
+              </a:rPr>
+              <a:t>eg:Drug1</a:t>
+            </a:r>
+          </a:p>
+        </p:txBody>
+      </p:sp>
+      <p:sp>
+        <p:nvSpPr>
+          <p:cNvPr id="11" name="Rectangle: Rounded Corners 10"/>
           <p:cNvSpPr/>
           <p:nvPr/>
         </p:nvSpPr>
         <p:spPr>
           <a:xfrm>
-            <a:off x="5056833" y="522804"/>
-            <a:ext cx="1933903" cy="567559"/>
-          </a:xfrm>
-          <a:prstGeom prst="ellipse">
+            <a:off x="7268332" y="2086008"/>
+            <a:ext cx="2103064" cy="365721"/>
+          </a:xfrm>
+          <a:prstGeom prst="roundRect">
             <a:avLst/>
           </a:prstGeom>
           <a:solidFill>
@@ -4629,6 +4197,11 @@
               <a:lumOff val="60000"/>
             </a:schemeClr>
           </a:solidFill>
+          <a:ln>
+            <a:solidFill>
+              <a:schemeClr val="tx1"/>
+            </a:solidFill>
+          </a:ln>
         </p:spPr>
         <p:style>
           <a:lnRef idx="2">
@@ -4652,1027 +4225,103 @@
           <a:p>
             <a:pPr algn="ctr"/>
             <a:r>
-              <a:rPr lang="en-US" dirty="0">
+              <a:rPr lang="en-US" b="1" dirty="0">
                 <a:solidFill>
                   <a:schemeClr val="tx1"/>
                 </a:solidFill>
               </a:rPr>
-              <a:t>Study1</a:t>
-            </a:r>
-          </a:p>
-        </p:txBody>
-      </p:sp>
-      <p:sp>
-        <p:nvSpPr>
-          <p:cNvPr id="7" name="Oval 6"/>
-          <p:cNvSpPr/>
-          <p:nvPr/>
-        </p:nvSpPr>
-        <p:spPr>
-          <a:xfrm>
-            <a:off x="3240193" y="813193"/>
-            <a:ext cx="1933903" cy="567559"/>
-          </a:xfrm>
-          <a:prstGeom prst="ellipse">
-            <a:avLst/>
-          </a:prstGeom>
-          <a:solidFill>
-            <a:schemeClr val="accent6">
-              <a:lumMod val="40000"/>
-              <a:lumOff val="60000"/>
-            </a:schemeClr>
-          </a:solidFill>
+              <a:t>eg:Study1</a:t>
+            </a:r>
+          </a:p>
+        </p:txBody>
+      </p:sp>
+      <p:cxnSp>
+        <p:nvCxnSpPr>
+          <p:cNvPr id="6" name="Straight Arrow Connector 5"/>
+          <p:cNvCxnSpPr>
+            <a:stCxn id="4" idx="3"/>
+            <a:endCxn id="11" idx="1"/>
+          </p:cNvCxnSpPr>
+          <p:nvPr/>
+        </p:nvCxnSpPr>
+        <p:spPr>
+          <a:xfrm>
+            <a:off x="4079172" y="2268869"/>
+            <a:ext cx="3189160" cy="0"/>
+          </a:xfrm>
+          <a:prstGeom prst="straightConnector1">
+            <a:avLst/>
+          </a:prstGeom>
+          <a:ln w="50800">
+            <a:solidFill>
+              <a:schemeClr val="bg1">
+                <a:lumMod val="50000"/>
+              </a:schemeClr>
+            </a:solidFill>
+            <a:tailEnd type="triangle"/>
+          </a:ln>
         </p:spPr>
         <p:style>
-          <a:lnRef idx="2">
-            <a:schemeClr val="accent1">
-              <a:shade val="50000"/>
-            </a:schemeClr>
+          <a:lnRef idx="1">
+            <a:schemeClr val="accent1"/>
           </a:lnRef>
-          <a:fillRef idx="1">
+          <a:fillRef idx="0">
             <a:schemeClr val="accent1"/>
           </a:fillRef>
           <a:effectRef idx="0">
             <a:schemeClr val="accent1"/>
           </a:effectRef>
           <a:fontRef idx="minor">
-            <a:schemeClr val="lt1"/>
+            <a:schemeClr val="tx1"/>
           </a:fontRef>
         </p:style>
-        <p:txBody>
-          <a:bodyPr rtlCol="0" anchor="ctr"/>
-          <a:lstStyle/>
-          <a:p>
-            <a:pPr algn="ctr"/>
-            <a:r>
-              <a:rPr lang="en-US" dirty="0">
+      </p:cxnSp>
+      <p:sp>
+        <p:nvSpPr>
+          <p:cNvPr id="7" name="TextBox 6"/>
+          <p:cNvSpPr txBox="1"/>
+          <p:nvPr/>
+        </p:nvSpPr>
+        <p:spPr>
+          <a:xfrm>
+            <a:off x="4933841" y="1891782"/>
+            <a:ext cx="2872535" cy="369332"/>
+          </a:xfrm>
+          <a:prstGeom prst="rect">
+            <a:avLst/>
+          </a:prstGeom>
+          <a:noFill/>
+        </p:spPr>
+        <p:txBody>
+          <a:bodyPr wrap="square" rtlCol="0">
+            <a:spAutoFit/>
+          </a:bodyPr>
+          <a:lstStyle/>
+          <a:p>
+            <a:r>
+              <a:rPr lang="en-US" dirty="0" err="1">
                 <a:solidFill>
-                  <a:schemeClr val="tx1"/>
+                  <a:schemeClr val="accent2">
+                    <a:lumMod val="75000"/>
+                  </a:schemeClr>
                 </a:solidFill>
               </a:rPr>
-              <a:t>Study2</a:t>
-            </a:r>
-          </a:p>
-        </p:txBody>
-      </p:sp>
-      <p:sp>
-        <p:nvSpPr>
-          <p:cNvPr id="8" name="Oval 7"/>
-          <p:cNvSpPr/>
-          <p:nvPr/>
-        </p:nvSpPr>
-        <p:spPr>
-          <a:xfrm>
-            <a:off x="2297528" y="1356765"/>
-            <a:ext cx="1933903" cy="567559"/>
-          </a:xfrm>
-          <a:prstGeom prst="ellipse">
-            <a:avLst/>
-          </a:prstGeom>
-          <a:solidFill>
-            <a:schemeClr val="accent6">
-              <a:lumMod val="40000"/>
-              <a:lumOff val="60000"/>
-            </a:schemeClr>
-          </a:solidFill>
-        </p:spPr>
-        <p:style>
-          <a:lnRef idx="2">
-            <a:schemeClr val="accent1">
-              <a:shade val="50000"/>
-            </a:schemeClr>
-          </a:lnRef>
-          <a:fillRef idx="1">
-            <a:schemeClr val="accent1"/>
-          </a:fillRef>
-          <a:effectRef idx="0">
-            <a:schemeClr val="accent1"/>
-          </a:effectRef>
-          <a:fontRef idx="minor">
-            <a:schemeClr val="lt1"/>
-          </a:fontRef>
-        </p:style>
-        <p:txBody>
-          <a:bodyPr rtlCol="0" anchor="ctr"/>
-          <a:lstStyle/>
-          <a:p>
-            <a:pPr algn="ctr"/>
-            <a:r>
-              <a:rPr lang="en-US" dirty="0">
-                <a:solidFill>
-                  <a:schemeClr val="tx1"/>
-                </a:solidFill>
-              </a:rPr>
-              <a:t>Study3</a:t>
-            </a:r>
-          </a:p>
-        </p:txBody>
-      </p:sp>
-      <p:sp>
-        <p:nvSpPr>
-          <p:cNvPr id="9" name="Oval 8"/>
-          <p:cNvSpPr/>
-          <p:nvPr/>
-        </p:nvSpPr>
-        <p:spPr>
-          <a:xfrm>
-            <a:off x="1754719" y="1962077"/>
-            <a:ext cx="1933903" cy="567559"/>
-          </a:xfrm>
-          <a:prstGeom prst="ellipse">
-            <a:avLst/>
-          </a:prstGeom>
-          <a:solidFill>
-            <a:schemeClr val="accent6">
-              <a:lumMod val="40000"/>
-              <a:lumOff val="60000"/>
-            </a:schemeClr>
-          </a:solidFill>
-        </p:spPr>
-        <p:style>
-          <a:lnRef idx="2">
-            <a:schemeClr val="accent1">
-              <a:shade val="50000"/>
-            </a:schemeClr>
-          </a:lnRef>
-          <a:fillRef idx="1">
-            <a:schemeClr val="accent1"/>
-          </a:fillRef>
-          <a:effectRef idx="0">
-            <a:schemeClr val="accent1"/>
-          </a:effectRef>
-          <a:fontRef idx="minor">
-            <a:schemeClr val="lt1"/>
-          </a:fontRef>
-        </p:style>
-        <p:txBody>
-          <a:bodyPr rtlCol="0" anchor="ctr"/>
-          <a:lstStyle/>
-          <a:p>
-            <a:pPr algn="ctr"/>
-            <a:r>
-              <a:rPr lang="en-US" dirty="0">
-                <a:solidFill>
-                  <a:schemeClr val="tx1"/>
-                </a:solidFill>
-              </a:rPr>
-              <a:t>Study4</a:t>
-            </a:r>
-          </a:p>
-        </p:txBody>
-      </p:sp>
-      <p:sp>
-        <p:nvSpPr>
-          <p:cNvPr id="10" name="Oval 9"/>
-          <p:cNvSpPr/>
-          <p:nvPr/>
-        </p:nvSpPr>
-        <p:spPr>
-          <a:xfrm>
-            <a:off x="1494081" y="2576395"/>
-            <a:ext cx="1933903" cy="567559"/>
-          </a:xfrm>
-          <a:prstGeom prst="ellipse">
-            <a:avLst/>
-          </a:prstGeom>
-          <a:solidFill>
-            <a:schemeClr val="accent6">
-              <a:lumMod val="40000"/>
-              <a:lumOff val="60000"/>
-            </a:schemeClr>
-          </a:solidFill>
-        </p:spPr>
-        <p:style>
-          <a:lnRef idx="2">
-            <a:schemeClr val="accent1">
-              <a:shade val="50000"/>
-            </a:schemeClr>
-          </a:lnRef>
-          <a:fillRef idx="1">
-            <a:schemeClr val="accent1"/>
-          </a:fillRef>
-          <a:effectRef idx="0">
-            <a:schemeClr val="accent1"/>
-          </a:effectRef>
-          <a:fontRef idx="minor">
-            <a:schemeClr val="lt1"/>
-          </a:fontRef>
-        </p:style>
-        <p:txBody>
-          <a:bodyPr rtlCol="0" anchor="ctr"/>
-          <a:lstStyle/>
-          <a:p>
-            <a:pPr algn="ctr"/>
-            <a:r>
-              <a:rPr lang="en-US" dirty="0">
-                <a:solidFill>
-                  <a:schemeClr val="tx1"/>
-                </a:solidFill>
-              </a:rPr>
-              <a:t>Study5</a:t>
-            </a:r>
-          </a:p>
-        </p:txBody>
-      </p:sp>
-      <p:sp>
-        <p:nvSpPr>
-          <p:cNvPr id="11" name="Oval 10"/>
-          <p:cNvSpPr/>
-          <p:nvPr/>
-        </p:nvSpPr>
-        <p:spPr>
-          <a:xfrm>
-            <a:off x="3240192" y="5693895"/>
-            <a:ext cx="1933903" cy="567559"/>
-          </a:xfrm>
-          <a:prstGeom prst="ellipse">
-            <a:avLst/>
-          </a:prstGeom>
-          <a:solidFill>
-            <a:schemeClr val="accent6">
-              <a:lumMod val="40000"/>
-              <a:lumOff val="60000"/>
-            </a:schemeClr>
-          </a:solidFill>
-        </p:spPr>
-        <p:style>
-          <a:lnRef idx="2">
-            <a:schemeClr val="accent1">
-              <a:shade val="50000"/>
-            </a:schemeClr>
-          </a:lnRef>
-          <a:fillRef idx="1">
-            <a:schemeClr val="accent1"/>
-          </a:fillRef>
-          <a:effectRef idx="0">
-            <a:schemeClr val="accent1"/>
-          </a:effectRef>
-          <a:fontRef idx="minor">
-            <a:schemeClr val="lt1"/>
-          </a:fontRef>
-        </p:style>
-        <p:txBody>
-          <a:bodyPr rtlCol="0" anchor="ctr"/>
-          <a:lstStyle/>
-          <a:p>
-            <a:pPr algn="ctr"/>
-            <a:r>
-              <a:rPr lang="en-US" dirty="0">
-                <a:solidFill>
-                  <a:schemeClr val="tx1"/>
-                </a:solidFill>
-              </a:rPr>
-              <a:t>Study10</a:t>
-            </a:r>
-          </a:p>
-        </p:txBody>
-      </p:sp>
-      <p:sp>
-        <p:nvSpPr>
-          <p:cNvPr id="12" name="Oval 11"/>
-          <p:cNvSpPr/>
-          <p:nvPr/>
-        </p:nvSpPr>
-        <p:spPr>
-          <a:xfrm>
-            <a:off x="1418896" y="3223966"/>
-            <a:ext cx="1933903" cy="567559"/>
-          </a:xfrm>
-          <a:prstGeom prst="ellipse">
-            <a:avLst/>
-          </a:prstGeom>
-          <a:solidFill>
-            <a:schemeClr val="accent6">
-              <a:lumMod val="40000"/>
-              <a:lumOff val="60000"/>
-            </a:schemeClr>
-          </a:solidFill>
-        </p:spPr>
-        <p:style>
-          <a:lnRef idx="2">
-            <a:schemeClr val="accent1">
-              <a:shade val="50000"/>
-            </a:schemeClr>
-          </a:lnRef>
-          <a:fillRef idx="1">
-            <a:schemeClr val="accent1"/>
-          </a:fillRef>
-          <a:effectRef idx="0">
-            <a:schemeClr val="accent1"/>
-          </a:effectRef>
-          <a:fontRef idx="minor">
-            <a:schemeClr val="lt1"/>
-          </a:fontRef>
-        </p:style>
-        <p:txBody>
-          <a:bodyPr rtlCol="0" anchor="ctr"/>
-          <a:lstStyle/>
-          <a:p>
-            <a:pPr algn="ctr"/>
-            <a:r>
-              <a:rPr lang="en-US" dirty="0">
-                <a:solidFill>
-                  <a:schemeClr val="tx1"/>
-                </a:solidFill>
-              </a:rPr>
-              <a:t>Study6</a:t>
-            </a:r>
-          </a:p>
-        </p:txBody>
-      </p:sp>
-      <p:sp>
-        <p:nvSpPr>
-          <p:cNvPr id="13" name="Oval 12"/>
-          <p:cNvSpPr/>
-          <p:nvPr/>
-        </p:nvSpPr>
-        <p:spPr>
-          <a:xfrm>
-            <a:off x="1470013" y="3865986"/>
-            <a:ext cx="1933903" cy="567559"/>
-          </a:xfrm>
-          <a:prstGeom prst="ellipse">
-            <a:avLst/>
-          </a:prstGeom>
-          <a:solidFill>
-            <a:schemeClr val="accent6">
-              <a:lumMod val="40000"/>
-              <a:lumOff val="60000"/>
-            </a:schemeClr>
-          </a:solidFill>
-        </p:spPr>
-        <p:style>
-          <a:lnRef idx="2">
-            <a:schemeClr val="accent1">
-              <a:shade val="50000"/>
-            </a:schemeClr>
-          </a:lnRef>
-          <a:fillRef idx="1">
-            <a:schemeClr val="accent1"/>
-          </a:fillRef>
-          <a:effectRef idx="0">
-            <a:schemeClr val="accent1"/>
-          </a:effectRef>
-          <a:fontRef idx="minor">
-            <a:schemeClr val="lt1"/>
-          </a:fontRef>
-        </p:style>
-        <p:txBody>
-          <a:bodyPr rtlCol="0" anchor="ctr"/>
-          <a:lstStyle/>
-          <a:p>
-            <a:pPr algn="ctr"/>
-            <a:r>
-              <a:rPr lang="en-US" dirty="0">
-                <a:solidFill>
-                  <a:schemeClr val="tx1"/>
-                </a:solidFill>
-              </a:rPr>
-              <a:t>Study7</a:t>
-            </a:r>
-          </a:p>
-        </p:txBody>
-      </p:sp>
-      <p:sp>
-        <p:nvSpPr>
-          <p:cNvPr id="14" name="Oval 13"/>
-          <p:cNvSpPr/>
-          <p:nvPr/>
-        </p:nvSpPr>
-        <p:spPr>
-          <a:xfrm>
-            <a:off x="1754719" y="4483170"/>
-            <a:ext cx="1933903" cy="567559"/>
-          </a:xfrm>
-          <a:prstGeom prst="ellipse">
-            <a:avLst/>
-          </a:prstGeom>
-          <a:solidFill>
-            <a:schemeClr val="accent6">
-              <a:lumMod val="40000"/>
-              <a:lumOff val="60000"/>
-            </a:schemeClr>
-          </a:solidFill>
-        </p:spPr>
-        <p:style>
-          <a:lnRef idx="2">
-            <a:schemeClr val="accent1">
-              <a:shade val="50000"/>
-            </a:schemeClr>
-          </a:lnRef>
-          <a:fillRef idx="1">
-            <a:schemeClr val="accent1"/>
-          </a:fillRef>
-          <a:effectRef idx="0">
-            <a:schemeClr val="accent1"/>
-          </a:effectRef>
-          <a:fontRef idx="minor">
-            <a:schemeClr val="lt1"/>
-          </a:fontRef>
-        </p:style>
-        <p:txBody>
-          <a:bodyPr rtlCol="0" anchor="ctr"/>
-          <a:lstStyle/>
-          <a:p>
-            <a:pPr algn="ctr"/>
-            <a:r>
-              <a:rPr lang="en-US" dirty="0">
-                <a:solidFill>
-                  <a:schemeClr val="tx1"/>
-                </a:solidFill>
-              </a:rPr>
-              <a:t>Study8</a:t>
-            </a:r>
-          </a:p>
-        </p:txBody>
-      </p:sp>
-      <p:sp>
-        <p:nvSpPr>
-          <p:cNvPr id="15" name="Oval 14"/>
-          <p:cNvSpPr/>
-          <p:nvPr/>
-        </p:nvSpPr>
-        <p:spPr>
-          <a:xfrm>
-            <a:off x="2309542" y="5097749"/>
-            <a:ext cx="1933903" cy="567559"/>
-          </a:xfrm>
-          <a:prstGeom prst="ellipse">
-            <a:avLst/>
-          </a:prstGeom>
-          <a:solidFill>
-            <a:schemeClr val="accent6">
-              <a:lumMod val="40000"/>
-              <a:lumOff val="60000"/>
-            </a:schemeClr>
-          </a:solidFill>
-        </p:spPr>
-        <p:style>
-          <a:lnRef idx="2">
-            <a:schemeClr val="accent1">
-              <a:shade val="50000"/>
-            </a:schemeClr>
-          </a:lnRef>
-          <a:fillRef idx="1">
-            <a:schemeClr val="accent1"/>
-          </a:fillRef>
-          <a:effectRef idx="0">
-            <a:schemeClr val="accent1"/>
-          </a:effectRef>
-          <a:fontRef idx="minor">
-            <a:schemeClr val="lt1"/>
-          </a:fontRef>
-        </p:style>
-        <p:txBody>
-          <a:bodyPr rtlCol="0" anchor="ctr"/>
-          <a:lstStyle/>
-          <a:p>
-            <a:pPr algn="ctr"/>
-            <a:r>
-              <a:rPr lang="en-US" dirty="0">
-                <a:solidFill>
-                  <a:schemeClr val="tx1"/>
-                </a:solidFill>
-              </a:rPr>
-              <a:t>Study9</a:t>
-            </a:r>
-          </a:p>
-        </p:txBody>
-      </p:sp>
-      <p:sp>
-        <p:nvSpPr>
-          <p:cNvPr id="16" name="Oval 15"/>
-          <p:cNvSpPr/>
-          <p:nvPr/>
-        </p:nvSpPr>
-        <p:spPr>
-          <a:xfrm>
-            <a:off x="4992413" y="5982417"/>
-            <a:ext cx="1933903" cy="567559"/>
-          </a:xfrm>
-          <a:prstGeom prst="ellipse">
-            <a:avLst/>
-          </a:prstGeom>
-          <a:solidFill>
-            <a:schemeClr val="accent6">
-              <a:lumMod val="40000"/>
-              <a:lumOff val="60000"/>
-            </a:schemeClr>
-          </a:solidFill>
-        </p:spPr>
-        <p:style>
-          <a:lnRef idx="2">
-            <a:schemeClr val="accent1">
-              <a:shade val="50000"/>
-            </a:schemeClr>
-          </a:lnRef>
-          <a:fillRef idx="1">
-            <a:schemeClr val="accent1"/>
-          </a:fillRef>
-          <a:effectRef idx="0">
-            <a:schemeClr val="accent1"/>
-          </a:effectRef>
-          <a:fontRef idx="minor">
-            <a:schemeClr val="lt1"/>
-          </a:fontRef>
-        </p:style>
-        <p:txBody>
-          <a:bodyPr rtlCol="0" anchor="ctr"/>
-          <a:lstStyle/>
-          <a:p>
-            <a:pPr algn="ctr"/>
-            <a:r>
-              <a:rPr lang="en-US" dirty="0">
-                <a:solidFill>
-                  <a:schemeClr val="tx1"/>
-                </a:solidFill>
-              </a:rPr>
-              <a:t>Study11</a:t>
-            </a:r>
-          </a:p>
-        </p:txBody>
-      </p:sp>
-      <p:sp>
-        <p:nvSpPr>
-          <p:cNvPr id="17" name="Oval 16"/>
-          <p:cNvSpPr/>
-          <p:nvPr/>
-        </p:nvSpPr>
-        <p:spPr>
-          <a:xfrm>
-            <a:off x="8495494" y="3918381"/>
-            <a:ext cx="1933903" cy="567559"/>
-          </a:xfrm>
-          <a:prstGeom prst="ellipse">
-            <a:avLst/>
-          </a:prstGeom>
-          <a:solidFill>
-            <a:schemeClr val="accent6">
-              <a:lumMod val="40000"/>
-              <a:lumOff val="60000"/>
-            </a:schemeClr>
-          </a:solidFill>
-        </p:spPr>
-        <p:style>
-          <a:lnRef idx="2">
-            <a:schemeClr val="accent1">
-              <a:shade val="50000"/>
-            </a:schemeClr>
-          </a:lnRef>
-          <a:fillRef idx="1">
-            <a:schemeClr val="accent1"/>
-          </a:fillRef>
-          <a:effectRef idx="0">
-            <a:schemeClr val="accent1"/>
-          </a:effectRef>
-          <a:fontRef idx="minor">
-            <a:schemeClr val="lt1"/>
-          </a:fontRef>
-        </p:style>
-        <p:txBody>
-          <a:bodyPr rtlCol="0" anchor="ctr"/>
-          <a:lstStyle/>
-          <a:p>
-            <a:pPr algn="ctr"/>
-            <a:r>
-              <a:rPr lang="en-US" dirty="0">
-                <a:solidFill>
-                  <a:schemeClr val="tx1"/>
-                </a:solidFill>
-              </a:rPr>
-              <a:t>Study15</a:t>
-            </a:r>
-          </a:p>
-        </p:txBody>
-      </p:sp>
-      <p:sp>
-        <p:nvSpPr>
-          <p:cNvPr id="18" name="Oval 17"/>
-          <p:cNvSpPr/>
-          <p:nvPr/>
-        </p:nvSpPr>
-        <p:spPr>
-          <a:xfrm>
-            <a:off x="6740645" y="5678600"/>
-            <a:ext cx="1933903" cy="567559"/>
-          </a:xfrm>
-          <a:prstGeom prst="ellipse">
-            <a:avLst/>
-          </a:prstGeom>
-          <a:solidFill>
-            <a:schemeClr val="accent6">
-              <a:lumMod val="40000"/>
-              <a:lumOff val="60000"/>
-            </a:schemeClr>
-          </a:solidFill>
-        </p:spPr>
-        <p:style>
-          <a:lnRef idx="2">
-            <a:schemeClr val="accent1">
-              <a:shade val="50000"/>
-            </a:schemeClr>
-          </a:lnRef>
-          <a:fillRef idx="1">
-            <a:schemeClr val="accent1"/>
-          </a:fillRef>
-          <a:effectRef idx="0">
-            <a:schemeClr val="accent1"/>
-          </a:effectRef>
-          <a:fontRef idx="minor">
-            <a:schemeClr val="lt1"/>
-          </a:fontRef>
-        </p:style>
-        <p:txBody>
-          <a:bodyPr rtlCol="0" anchor="ctr"/>
-          <a:lstStyle/>
-          <a:p>
-            <a:pPr algn="ctr"/>
-            <a:r>
-              <a:rPr lang="en-US" dirty="0">
-                <a:solidFill>
-                  <a:schemeClr val="tx1"/>
-                </a:solidFill>
-              </a:rPr>
-              <a:t>Study12</a:t>
-            </a:r>
-          </a:p>
-        </p:txBody>
-      </p:sp>
-      <p:sp>
-        <p:nvSpPr>
-          <p:cNvPr id="19" name="Oval 18"/>
-          <p:cNvSpPr/>
-          <p:nvPr/>
-        </p:nvSpPr>
-        <p:spPr>
-          <a:xfrm>
-            <a:off x="7648525" y="5130682"/>
-            <a:ext cx="1933903" cy="567559"/>
-          </a:xfrm>
-          <a:prstGeom prst="ellipse">
-            <a:avLst/>
-          </a:prstGeom>
-          <a:solidFill>
-            <a:schemeClr val="accent6">
-              <a:lumMod val="40000"/>
-              <a:lumOff val="60000"/>
-            </a:schemeClr>
-          </a:solidFill>
-        </p:spPr>
-        <p:style>
-          <a:lnRef idx="2">
-            <a:schemeClr val="accent1">
-              <a:shade val="50000"/>
-            </a:schemeClr>
-          </a:lnRef>
-          <a:fillRef idx="1">
-            <a:schemeClr val="accent1"/>
-          </a:fillRef>
-          <a:effectRef idx="0">
-            <a:schemeClr val="accent1"/>
-          </a:effectRef>
-          <a:fontRef idx="minor">
-            <a:schemeClr val="lt1"/>
-          </a:fontRef>
-        </p:style>
-        <p:txBody>
-          <a:bodyPr rtlCol="0" anchor="ctr"/>
-          <a:lstStyle/>
-          <a:p>
-            <a:pPr algn="ctr"/>
-            <a:r>
-              <a:rPr lang="en-US" dirty="0">
-                <a:solidFill>
-                  <a:schemeClr val="tx1"/>
-                </a:solidFill>
-              </a:rPr>
-              <a:t>Study13</a:t>
-            </a:r>
-          </a:p>
-        </p:txBody>
-      </p:sp>
-      <p:sp>
-        <p:nvSpPr>
-          <p:cNvPr id="20" name="Oval 19"/>
-          <p:cNvSpPr/>
-          <p:nvPr/>
-        </p:nvSpPr>
-        <p:spPr>
-          <a:xfrm>
-            <a:off x="8175543" y="4529784"/>
-            <a:ext cx="1933903" cy="567559"/>
-          </a:xfrm>
-          <a:prstGeom prst="ellipse">
-            <a:avLst/>
-          </a:prstGeom>
-          <a:solidFill>
-            <a:schemeClr val="accent6">
-              <a:lumMod val="40000"/>
-              <a:lumOff val="60000"/>
-            </a:schemeClr>
-          </a:solidFill>
-        </p:spPr>
-        <p:style>
-          <a:lnRef idx="2">
-            <a:schemeClr val="accent1">
-              <a:shade val="50000"/>
-            </a:schemeClr>
-          </a:lnRef>
-          <a:fillRef idx="1">
-            <a:schemeClr val="accent1"/>
-          </a:fillRef>
-          <a:effectRef idx="0">
-            <a:schemeClr val="accent1"/>
-          </a:effectRef>
-          <a:fontRef idx="minor">
-            <a:schemeClr val="lt1"/>
-          </a:fontRef>
-        </p:style>
-        <p:txBody>
-          <a:bodyPr rtlCol="0" anchor="ctr"/>
-          <a:lstStyle/>
-          <a:p>
-            <a:pPr algn="ctr"/>
-            <a:r>
-              <a:rPr lang="en-US" dirty="0">
-                <a:solidFill>
-                  <a:schemeClr val="tx1"/>
-                </a:solidFill>
-              </a:rPr>
-              <a:t>Study14</a:t>
-            </a:r>
-          </a:p>
-        </p:txBody>
-      </p:sp>
-      <p:sp>
-        <p:nvSpPr>
-          <p:cNvPr id="21" name="Oval 20"/>
-          <p:cNvSpPr/>
-          <p:nvPr/>
-        </p:nvSpPr>
-        <p:spPr>
-          <a:xfrm>
-            <a:off x="8596616" y="3310414"/>
-            <a:ext cx="1933903" cy="567559"/>
-          </a:xfrm>
-          <a:prstGeom prst="ellipse">
-            <a:avLst/>
-          </a:prstGeom>
-          <a:solidFill>
-            <a:schemeClr val="accent6">
-              <a:lumMod val="40000"/>
-              <a:lumOff val="60000"/>
-            </a:schemeClr>
-          </a:solidFill>
-        </p:spPr>
-        <p:style>
-          <a:lnRef idx="2">
-            <a:schemeClr val="accent1">
-              <a:shade val="50000"/>
-            </a:schemeClr>
-          </a:lnRef>
-          <a:fillRef idx="1">
-            <a:schemeClr val="accent1"/>
-          </a:fillRef>
-          <a:effectRef idx="0">
-            <a:schemeClr val="accent1"/>
-          </a:effectRef>
-          <a:fontRef idx="minor">
-            <a:schemeClr val="lt1"/>
-          </a:fontRef>
-        </p:style>
-        <p:txBody>
-          <a:bodyPr rtlCol="0" anchor="ctr"/>
-          <a:lstStyle/>
-          <a:p>
-            <a:pPr algn="ctr"/>
-            <a:r>
-              <a:rPr lang="en-US" dirty="0">
-                <a:solidFill>
-                  <a:schemeClr val="tx1"/>
-                </a:solidFill>
-              </a:rPr>
-              <a:t>Study16</a:t>
-            </a:r>
-          </a:p>
-        </p:txBody>
-      </p:sp>
-      <p:sp>
-        <p:nvSpPr>
-          <p:cNvPr id="22" name="Oval 21"/>
-          <p:cNvSpPr/>
-          <p:nvPr/>
-        </p:nvSpPr>
-        <p:spPr>
-          <a:xfrm>
-            <a:off x="8495494" y="2692988"/>
-            <a:ext cx="1933903" cy="567559"/>
-          </a:xfrm>
-          <a:prstGeom prst="ellipse">
-            <a:avLst/>
-          </a:prstGeom>
-          <a:solidFill>
-            <a:schemeClr val="accent6">
-              <a:lumMod val="40000"/>
-              <a:lumOff val="60000"/>
-            </a:schemeClr>
-          </a:solidFill>
-        </p:spPr>
-        <p:style>
-          <a:lnRef idx="2">
-            <a:schemeClr val="accent1">
-              <a:shade val="50000"/>
-            </a:schemeClr>
-          </a:lnRef>
-          <a:fillRef idx="1">
-            <a:schemeClr val="accent1"/>
-          </a:fillRef>
-          <a:effectRef idx="0">
-            <a:schemeClr val="accent1"/>
-          </a:effectRef>
-          <a:fontRef idx="minor">
-            <a:schemeClr val="lt1"/>
-          </a:fontRef>
-        </p:style>
-        <p:txBody>
-          <a:bodyPr rtlCol="0" anchor="ctr"/>
-          <a:lstStyle/>
-          <a:p>
-            <a:pPr algn="ctr"/>
-            <a:r>
-              <a:rPr lang="en-US" dirty="0">
-                <a:solidFill>
-                  <a:schemeClr val="tx1"/>
-                </a:solidFill>
-              </a:rPr>
-              <a:t>Study17</a:t>
-            </a:r>
-          </a:p>
-        </p:txBody>
-      </p:sp>
-      <p:sp>
-        <p:nvSpPr>
-          <p:cNvPr id="23" name="Oval 22"/>
-          <p:cNvSpPr/>
-          <p:nvPr/>
-        </p:nvSpPr>
-        <p:spPr>
-          <a:xfrm>
-            <a:off x="8298805" y="2080292"/>
-            <a:ext cx="1933903" cy="567559"/>
-          </a:xfrm>
-          <a:prstGeom prst="ellipse">
-            <a:avLst/>
-          </a:prstGeom>
-          <a:solidFill>
-            <a:schemeClr val="accent6">
-              <a:lumMod val="40000"/>
-              <a:lumOff val="60000"/>
-            </a:schemeClr>
-          </a:solidFill>
-        </p:spPr>
-        <p:style>
-          <a:lnRef idx="2">
-            <a:schemeClr val="accent1">
-              <a:shade val="50000"/>
-            </a:schemeClr>
-          </a:lnRef>
-          <a:fillRef idx="1">
-            <a:schemeClr val="accent1"/>
-          </a:fillRef>
-          <a:effectRef idx="0">
-            <a:schemeClr val="accent1"/>
-          </a:effectRef>
-          <a:fontRef idx="minor">
-            <a:schemeClr val="lt1"/>
-          </a:fontRef>
-        </p:style>
-        <p:txBody>
-          <a:bodyPr rtlCol="0" anchor="ctr"/>
-          <a:lstStyle/>
-          <a:p>
-            <a:pPr algn="ctr"/>
-            <a:r>
-              <a:rPr lang="en-US" dirty="0">
-                <a:solidFill>
-                  <a:schemeClr val="tx1"/>
-                </a:solidFill>
-              </a:rPr>
-              <a:t>Study18</a:t>
-            </a:r>
-          </a:p>
-        </p:txBody>
-      </p:sp>
-      <p:sp>
-        <p:nvSpPr>
-          <p:cNvPr id="24" name="Oval 23"/>
-          <p:cNvSpPr/>
-          <p:nvPr/>
-        </p:nvSpPr>
-        <p:spPr>
-          <a:xfrm>
-            <a:off x="7839210" y="1451870"/>
-            <a:ext cx="1933903" cy="567559"/>
-          </a:xfrm>
-          <a:prstGeom prst="ellipse">
-            <a:avLst/>
-          </a:prstGeom>
-          <a:solidFill>
-            <a:schemeClr val="accent6">
-              <a:lumMod val="40000"/>
-              <a:lumOff val="60000"/>
-            </a:schemeClr>
-          </a:solidFill>
-        </p:spPr>
-        <p:style>
-          <a:lnRef idx="2">
-            <a:schemeClr val="accent1">
-              <a:shade val="50000"/>
-            </a:schemeClr>
-          </a:lnRef>
-          <a:fillRef idx="1">
-            <a:schemeClr val="accent1"/>
-          </a:fillRef>
-          <a:effectRef idx="0">
-            <a:schemeClr val="accent1"/>
-          </a:effectRef>
-          <a:fontRef idx="minor">
-            <a:schemeClr val="lt1"/>
-          </a:fontRef>
-        </p:style>
-        <p:txBody>
-          <a:bodyPr rtlCol="0" anchor="ctr"/>
-          <a:lstStyle/>
-          <a:p>
-            <a:pPr algn="ctr"/>
-            <a:r>
-              <a:rPr lang="en-US" dirty="0">
-                <a:solidFill>
-                  <a:schemeClr val="tx1"/>
-                </a:solidFill>
-              </a:rPr>
-              <a:t>Study19</a:t>
-            </a:r>
-          </a:p>
-        </p:txBody>
-      </p:sp>
-      <p:sp>
-        <p:nvSpPr>
-          <p:cNvPr id="25" name="Oval 24"/>
-          <p:cNvSpPr/>
-          <p:nvPr/>
-        </p:nvSpPr>
-        <p:spPr>
-          <a:xfrm>
-            <a:off x="6934897" y="839174"/>
-            <a:ext cx="1933903" cy="567559"/>
-          </a:xfrm>
-          <a:prstGeom prst="ellipse">
-            <a:avLst/>
-          </a:prstGeom>
-          <a:solidFill>
-            <a:schemeClr val="accent6">
-              <a:lumMod val="40000"/>
-              <a:lumOff val="60000"/>
-            </a:schemeClr>
-          </a:solidFill>
-        </p:spPr>
-        <p:style>
-          <a:lnRef idx="2">
-            <a:schemeClr val="accent1">
-              <a:shade val="50000"/>
-            </a:schemeClr>
-          </a:lnRef>
-          <a:fillRef idx="1">
-            <a:schemeClr val="accent1"/>
-          </a:fillRef>
-          <a:effectRef idx="0">
-            <a:schemeClr val="accent1"/>
-          </a:effectRef>
-          <a:fontRef idx="minor">
-            <a:schemeClr val="lt1"/>
-          </a:fontRef>
-        </p:style>
-        <p:txBody>
-          <a:bodyPr rtlCol="0" anchor="ctr"/>
-          <a:lstStyle/>
-          <a:p>
-            <a:pPr algn="ctr"/>
-            <a:r>
-              <a:rPr lang="en-US" dirty="0">
-                <a:solidFill>
-                  <a:schemeClr val="tx1"/>
-                </a:solidFill>
-              </a:rPr>
-              <a:t>Study20</a:t>
-            </a:r>
+              <a:t>ncit:study</a:t>
+            </a:r>
+            <a:endParaRPr lang="en-US" dirty="0">
+              <a:solidFill>
+                <a:schemeClr val="accent2">
+                  <a:lumMod val="75000"/>
+                </a:schemeClr>
+              </a:solidFill>
+            </a:endParaRPr>
           </a:p>
         </p:txBody>
       </p:sp>
     </p:spTree>
     <p:extLst>
       <p:ext uri="{BB962C8B-B14F-4D97-AF65-F5344CB8AC3E}">
-        <p14:creationId xmlns:p14="http://schemas.microsoft.com/office/powerpoint/2010/main" val="711884031"/>
+        <p14:creationId xmlns:p14="http://schemas.microsoft.com/office/powerpoint/2010/main" val="3126050236"/>
       </p:ext>
     </p:extLst>
   </p:cSld>
@@ -5699,6 +4348,1936 @@
           <a:chExt cx="0" cy="0"/>
         </a:xfrm>
       </p:grpSpPr>
+      <p:pic>
+        <p:nvPicPr>
+          <p:cNvPr id="4" name="Picture 3"/>
+          <p:cNvPicPr>
+            <a:picLocks noChangeAspect="1"/>
+          </p:cNvPicPr>
+          <p:nvPr/>
+        </p:nvPicPr>
+        <p:blipFill>
+          <a:blip r:embed="rId2"/>
+          <a:stretch>
+            <a:fillRect/>
+          </a:stretch>
+        </p:blipFill>
+        <p:spPr>
+          <a:xfrm>
+            <a:off x="2520521" y="582827"/>
+            <a:ext cx="7867650" cy="3048000"/>
+          </a:xfrm>
+          <a:prstGeom prst="rect">
+            <a:avLst/>
+          </a:prstGeom>
+        </p:spPr>
+      </p:pic>
+      <p:cxnSp>
+        <p:nvCxnSpPr>
+          <p:cNvPr id="12" name="Straight Arrow Connector 11"/>
+          <p:cNvCxnSpPr/>
+          <p:nvPr/>
+        </p:nvCxnSpPr>
+        <p:spPr>
+          <a:xfrm>
+            <a:off x="2065042" y="1638864"/>
+            <a:ext cx="2551235" cy="1791908"/>
+          </a:xfrm>
+          <a:prstGeom prst="straightConnector1">
+            <a:avLst/>
+          </a:prstGeom>
+          <a:ln w="101600">
+            <a:tailEnd type="triangle"/>
+          </a:ln>
+        </p:spPr>
+        <p:style>
+          <a:lnRef idx="1">
+            <a:schemeClr val="accent1"/>
+          </a:lnRef>
+          <a:fillRef idx="0">
+            <a:schemeClr val="accent1"/>
+          </a:fillRef>
+          <a:effectRef idx="0">
+            <a:schemeClr val="accent1"/>
+          </a:effectRef>
+          <a:fontRef idx="minor">
+            <a:schemeClr val="tx1"/>
+          </a:fontRef>
+        </p:style>
+      </p:cxnSp>
+      <p:cxnSp>
+        <p:nvCxnSpPr>
+          <p:cNvPr id="13" name="Straight Arrow Connector 12"/>
+          <p:cNvCxnSpPr/>
+          <p:nvPr/>
+        </p:nvCxnSpPr>
+        <p:spPr>
+          <a:xfrm flipV="1">
+            <a:off x="7891451" y="1685213"/>
+            <a:ext cx="2565405" cy="1745559"/>
+          </a:xfrm>
+          <a:prstGeom prst="straightConnector1">
+            <a:avLst/>
+          </a:prstGeom>
+          <a:ln w="101600">
+            <a:solidFill>
+              <a:srgbClr val="C00000"/>
+            </a:solidFill>
+            <a:tailEnd type="triangle"/>
+          </a:ln>
+        </p:spPr>
+        <p:style>
+          <a:lnRef idx="1">
+            <a:schemeClr val="accent1"/>
+          </a:lnRef>
+          <a:fillRef idx="0">
+            <a:schemeClr val="accent1"/>
+          </a:fillRef>
+          <a:effectRef idx="0">
+            <a:schemeClr val="accent1"/>
+          </a:effectRef>
+          <a:fontRef idx="minor">
+            <a:schemeClr val="tx1"/>
+          </a:fontRef>
+        </p:style>
+      </p:cxnSp>
+      <p:sp>
+        <p:nvSpPr>
+          <p:cNvPr id="17" name="TextBox 16"/>
+          <p:cNvSpPr txBox="1"/>
+          <p:nvPr/>
+        </p:nvSpPr>
+        <p:spPr>
+          <a:xfrm>
+            <a:off x="2525225" y="2196451"/>
+            <a:ext cx="535724" cy="923330"/>
+          </a:xfrm>
+          <a:prstGeom prst="rect">
+            <a:avLst/>
+          </a:prstGeom>
+          <a:noFill/>
+        </p:spPr>
+        <p:txBody>
+          <a:bodyPr wrap="none" rtlCol="0">
+            <a:spAutoFit/>
+          </a:bodyPr>
+          <a:lstStyle/>
+          <a:p>
+            <a:r>
+              <a:rPr lang="en-US" sz="5400" b="1" dirty="0">
+                <a:solidFill>
+                  <a:schemeClr val="accent1">
+                    <a:lumMod val="75000"/>
+                  </a:schemeClr>
+                </a:solidFill>
+              </a:rPr>
+              <a:t>1</a:t>
+            </a:r>
+          </a:p>
+        </p:txBody>
+      </p:sp>
+      <p:sp>
+        <p:nvSpPr>
+          <p:cNvPr id="18" name="TextBox 17"/>
+          <p:cNvSpPr txBox="1"/>
+          <p:nvPr/>
+        </p:nvSpPr>
+        <p:spPr>
+          <a:xfrm>
+            <a:off x="9423475" y="2251483"/>
+            <a:ext cx="535724" cy="923330"/>
+          </a:xfrm>
+          <a:prstGeom prst="rect">
+            <a:avLst/>
+          </a:prstGeom>
+          <a:noFill/>
+        </p:spPr>
+        <p:txBody>
+          <a:bodyPr wrap="none" rtlCol="0">
+            <a:spAutoFit/>
+          </a:bodyPr>
+          <a:lstStyle/>
+          <a:p>
+            <a:r>
+              <a:rPr lang="en-US" sz="5400" b="1" dirty="0">
+                <a:solidFill>
+                  <a:srgbClr val="C00000"/>
+                </a:solidFill>
+              </a:rPr>
+              <a:t>2</a:t>
+            </a:r>
+          </a:p>
+        </p:txBody>
+      </p:sp>
+    </p:spTree>
+    <p:extLst>
+      <p:ext uri="{BB962C8B-B14F-4D97-AF65-F5344CB8AC3E}">
+        <p14:creationId xmlns:p14="http://schemas.microsoft.com/office/powerpoint/2010/main" val="6244059"/>
+      </p:ext>
+    </p:extLst>
+  </p:cSld>
+  <p:clrMapOvr>
+    <a:masterClrMapping/>
+  </p:clrMapOvr>
+</p:sld>
+</file>
+
+<file path=ppt/slides/slide6.xml><?xml version="1.0" encoding="utf-8"?>
+<p:sld xmlns:a="http://schemas.openxmlformats.org/drawingml/2006/main" xmlns:r="http://schemas.openxmlformats.org/officeDocument/2006/relationships" xmlns:p="http://schemas.openxmlformats.org/presentationml/2006/main">
+  <p:cSld>
+    <p:spTree>
+      <p:nvGrpSpPr>
+        <p:cNvPr id="1" name=""/>
+        <p:cNvGrpSpPr/>
+        <p:nvPr/>
+      </p:nvGrpSpPr>
+      <p:grpSpPr>
+        <a:xfrm>
+          <a:off x="0" y="0"/>
+          <a:ext cx="0" cy="0"/>
+          <a:chOff x="0" y="0"/>
+          <a:chExt cx="0" cy="0"/>
+        </a:xfrm>
+      </p:grpSpPr>
+      <p:cxnSp>
+        <p:nvCxnSpPr>
+          <p:cNvPr id="27" name="Straight Connector 26"/>
+          <p:cNvCxnSpPr/>
+          <p:nvPr/>
+        </p:nvCxnSpPr>
+        <p:spPr>
+          <a:xfrm flipH="1">
+            <a:off x="5904417" y="839174"/>
+            <a:ext cx="54948" cy="2552955"/>
+          </a:xfrm>
+          <a:prstGeom prst="line">
+            <a:avLst/>
+          </a:prstGeom>
+        </p:spPr>
+        <p:style>
+          <a:lnRef idx="1">
+            <a:schemeClr val="accent1"/>
+          </a:lnRef>
+          <a:fillRef idx="0">
+            <a:schemeClr val="accent1"/>
+          </a:fillRef>
+          <a:effectRef idx="0">
+            <a:schemeClr val="accent1"/>
+          </a:effectRef>
+          <a:fontRef idx="minor">
+            <a:schemeClr val="tx1"/>
+          </a:fontRef>
+        </p:style>
+      </p:cxnSp>
+      <p:cxnSp>
+        <p:nvCxnSpPr>
+          <p:cNvPr id="29" name="Straight Connector 28"/>
+          <p:cNvCxnSpPr/>
+          <p:nvPr/>
+        </p:nvCxnSpPr>
+        <p:spPr>
+          <a:xfrm>
+            <a:off x="4166144" y="1137383"/>
+            <a:ext cx="1777456" cy="2228980"/>
+          </a:xfrm>
+          <a:prstGeom prst="line">
+            <a:avLst/>
+          </a:prstGeom>
+        </p:spPr>
+        <p:style>
+          <a:lnRef idx="1">
+            <a:schemeClr val="accent1"/>
+          </a:lnRef>
+          <a:fillRef idx="0">
+            <a:schemeClr val="accent1"/>
+          </a:fillRef>
+          <a:effectRef idx="0">
+            <a:schemeClr val="accent1"/>
+          </a:effectRef>
+          <a:fontRef idx="minor">
+            <a:schemeClr val="tx1"/>
+          </a:fontRef>
+        </p:style>
+      </p:cxnSp>
+      <p:cxnSp>
+        <p:nvCxnSpPr>
+          <p:cNvPr id="34" name="Straight Connector 33"/>
+          <p:cNvCxnSpPr/>
+          <p:nvPr/>
+        </p:nvCxnSpPr>
+        <p:spPr>
+          <a:xfrm>
+            <a:off x="3230350" y="1640544"/>
+            <a:ext cx="2713250" cy="1751585"/>
+          </a:xfrm>
+          <a:prstGeom prst="line">
+            <a:avLst/>
+          </a:prstGeom>
+        </p:spPr>
+        <p:style>
+          <a:lnRef idx="1">
+            <a:schemeClr val="accent1"/>
+          </a:lnRef>
+          <a:fillRef idx="0">
+            <a:schemeClr val="accent1"/>
+          </a:fillRef>
+          <a:effectRef idx="0">
+            <a:schemeClr val="accent1"/>
+          </a:effectRef>
+          <a:fontRef idx="minor">
+            <a:schemeClr val="tx1"/>
+          </a:fontRef>
+        </p:style>
+      </p:cxnSp>
+      <p:cxnSp>
+        <p:nvCxnSpPr>
+          <p:cNvPr id="36" name="Straight Connector 35"/>
+          <p:cNvCxnSpPr/>
+          <p:nvPr/>
+        </p:nvCxnSpPr>
+        <p:spPr>
+          <a:xfrm>
+            <a:off x="2736900" y="2301427"/>
+            <a:ext cx="3206700" cy="1087502"/>
+          </a:xfrm>
+          <a:prstGeom prst="line">
+            <a:avLst/>
+          </a:prstGeom>
+        </p:spPr>
+        <p:style>
+          <a:lnRef idx="1">
+            <a:schemeClr val="accent1"/>
+          </a:lnRef>
+          <a:fillRef idx="0">
+            <a:schemeClr val="accent1"/>
+          </a:fillRef>
+          <a:effectRef idx="0">
+            <a:schemeClr val="accent1"/>
+          </a:effectRef>
+          <a:fontRef idx="minor">
+            <a:schemeClr val="tx1"/>
+          </a:fontRef>
+        </p:style>
+      </p:cxnSp>
+      <p:cxnSp>
+        <p:nvCxnSpPr>
+          <p:cNvPr id="38" name="Straight Connector 37"/>
+          <p:cNvCxnSpPr/>
+          <p:nvPr/>
+        </p:nvCxnSpPr>
+        <p:spPr>
+          <a:xfrm>
+            <a:off x="2600958" y="2885609"/>
+            <a:ext cx="3358406" cy="517506"/>
+          </a:xfrm>
+          <a:prstGeom prst="line">
+            <a:avLst/>
+          </a:prstGeom>
+        </p:spPr>
+        <p:style>
+          <a:lnRef idx="1">
+            <a:schemeClr val="accent1"/>
+          </a:lnRef>
+          <a:fillRef idx="0">
+            <a:schemeClr val="accent1"/>
+          </a:fillRef>
+          <a:effectRef idx="0">
+            <a:schemeClr val="accent1"/>
+          </a:effectRef>
+          <a:fontRef idx="minor">
+            <a:schemeClr val="tx1"/>
+          </a:fontRef>
+        </p:style>
+      </p:cxnSp>
+      <p:cxnSp>
+        <p:nvCxnSpPr>
+          <p:cNvPr id="40" name="Straight Connector 39"/>
+          <p:cNvCxnSpPr/>
+          <p:nvPr/>
+        </p:nvCxnSpPr>
+        <p:spPr>
+          <a:xfrm flipV="1">
+            <a:off x="2402816" y="3446375"/>
+            <a:ext cx="3556548" cy="116647"/>
+          </a:xfrm>
+          <a:prstGeom prst="line">
+            <a:avLst/>
+          </a:prstGeom>
+        </p:spPr>
+        <p:style>
+          <a:lnRef idx="1">
+            <a:schemeClr val="accent1"/>
+          </a:lnRef>
+          <a:fillRef idx="0">
+            <a:schemeClr val="accent1"/>
+          </a:fillRef>
+          <a:effectRef idx="0">
+            <a:schemeClr val="accent1"/>
+          </a:effectRef>
+          <a:fontRef idx="minor">
+            <a:schemeClr val="tx1"/>
+          </a:fontRef>
+        </p:style>
+      </p:cxnSp>
+      <p:cxnSp>
+        <p:nvCxnSpPr>
+          <p:cNvPr id="42" name="Straight Connector 41"/>
+          <p:cNvCxnSpPr/>
+          <p:nvPr/>
+        </p:nvCxnSpPr>
+        <p:spPr>
+          <a:xfrm flipV="1">
+            <a:off x="2385847" y="3452740"/>
+            <a:ext cx="3573517" cy="710893"/>
+          </a:xfrm>
+          <a:prstGeom prst="line">
+            <a:avLst/>
+          </a:prstGeom>
+        </p:spPr>
+        <p:style>
+          <a:lnRef idx="1">
+            <a:schemeClr val="accent1"/>
+          </a:lnRef>
+          <a:fillRef idx="0">
+            <a:schemeClr val="accent1"/>
+          </a:fillRef>
+          <a:effectRef idx="0">
+            <a:schemeClr val="accent1"/>
+          </a:effectRef>
+          <a:fontRef idx="minor">
+            <a:schemeClr val="tx1"/>
+          </a:fontRef>
+        </p:style>
+      </p:cxnSp>
+      <p:cxnSp>
+        <p:nvCxnSpPr>
+          <p:cNvPr id="44" name="Straight Connector 43"/>
+          <p:cNvCxnSpPr/>
+          <p:nvPr/>
+        </p:nvCxnSpPr>
+        <p:spPr>
+          <a:xfrm flipV="1">
+            <a:off x="2721670" y="3466590"/>
+            <a:ext cx="3221930" cy="1299873"/>
+          </a:xfrm>
+          <a:prstGeom prst="line">
+            <a:avLst/>
+          </a:prstGeom>
+        </p:spPr>
+        <p:style>
+          <a:lnRef idx="1">
+            <a:schemeClr val="accent1"/>
+          </a:lnRef>
+          <a:fillRef idx="0">
+            <a:schemeClr val="accent1"/>
+          </a:fillRef>
+          <a:effectRef idx="0">
+            <a:schemeClr val="accent1"/>
+          </a:effectRef>
+          <a:fontRef idx="minor">
+            <a:schemeClr val="tx1"/>
+          </a:fontRef>
+        </p:style>
+      </p:cxnSp>
+      <p:cxnSp>
+        <p:nvCxnSpPr>
+          <p:cNvPr id="46" name="Straight Connector 45"/>
+          <p:cNvCxnSpPr/>
+          <p:nvPr/>
+        </p:nvCxnSpPr>
+        <p:spPr>
+          <a:xfrm flipV="1">
+            <a:off x="3276493" y="3481557"/>
+            <a:ext cx="2682871" cy="1976024"/>
+          </a:xfrm>
+          <a:prstGeom prst="line">
+            <a:avLst/>
+          </a:prstGeom>
+        </p:spPr>
+        <p:style>
+          <a:lnRef idx="1">
+            <a:schemeClr val="accent1"/>
+          </a:lnRef>
+          <a:fillRef idx="0">
+            <a:schemeClr val="accent1"/>
+          </a:fillRef>
+          <a:effectRef idx="0">
+            <a:schemeClr val="accent1"/>
+          </a:effectRef>
+          <a:fontRef idx="minor">
+            <a:schemeClr val="tx1"/>
+          </a:fontRef>
+        </p:style>
+      </p:cxnSp>
+      <p:cxnSp>
+        <p:nvCxnSpPr>
+          <p:cNvPr id="48" name="Straight Connector 47"/>
+          <p:cNvCxnSpPr/>
+          <p:nvPr/>
+        </p:nvCxnSpPr>
+        <p:spPr>
+          <a:xfrm flipV="1">
+            <a:off x="4370867" y="3488118"/>
+            <a:ext cx="1572733" cy="2489556"/>
+          </a:xfrm>
+          <a:prstGeom prst="line">
+            <a:avLst/>
+          </a:prstGeom>
+        </p:spPr>
+        <p:style>
+          <a:lnRef idx="1">
+            <a:schemeClr val="accent1"/>
+          </a:lnRef>
+          <a:fillRef idx="0">
+            <a:schemeClr val="accent1"/>
+          </a:fillRef>
+          <a:effectRef idx="0">
+            <a:schemeClr val="accent1"/>
+          </a:effectRef>
+          <a:fontRef idx="minor">
+            <a:schemeClr val="tx1"/>
+          </a:fontRef>
+        </p:style>
+      </p:cxnSp>
+      <p:cxnSp>
+        <p:nvCxnSpPr>
+          <p:cNvPr id="50" name="Straight Connector 49"/>
+          <p:cNvCxnSpPr/>
+          <p:nvPr/>
+        </p:nvCxnSpPr>
+        <p:spPr>
+          <a:xfrm flipH="1" flipV="1">
+            <a:off x="5940046" y="3532833"/>
+            <a:ext cx="77532" cy="2757208"/>
+          </a:xfrm>
+          <a:prstGeom prst="line">
+            <a:avLst/>
+          </a:prstGeom>
+        </p:spPr>
+        <p:style>
+          <a:lnRef idx="1">
+            <a:schemeClr val="accent1"/>
+          </a:lnRef>
+          <a:fillRef idx="0">
+            <a:schemeClr val="accent1"/>
+          </a:fillRef>
+          <a:effectRef idx="0">
+            <a:schemeClr val="accent1"/>
+          </a:effectRef>
+          <a:fontRef idx="minor">
+            <a:schemeClr val="tx1"/>
+          </a:fontRef>
+        </p:style>
+      </p:cxnSp>
+      <p:cxnSp>
+        <p:nvCxnSpPr>
+          <p:cNvPr id="52" name="Straight Connector 51"/>
+          <p:cNvCxnSpPr/>
+          <p:nvPr/>
+        </p:nvCxnSpPr>
+        <p:spPr>
+          <a:xfrm flipH="1" flipV="1">
+            <a:off x="5959364" y="3461847"/>
+            <a:ext cx="1689161" cy="2500532"/>
+          </a:xfrm>
+          <a:prstGeom prst="line">
+            <a:avLst/>
+          </a:prstGeom>
+        </p:spPr>
+        <p:style>
+          <a:lnRef idx="1">
+            <a:schemeClr val="accent1"/>
+          </a:lnRef>
+          <a:fillRef idx="0">
+            <a:schemeClr val="accent1"/>
+          </a:fillRef>
+          <a:effectRef idx="0">
+            <a:schemeClr val="accent1"/>
+          </a:effectRef>
+          <a:fontRef idx="minor">
+            <a:schemeClr val="tx1"/>
+          </a:fontRef>
+        </p:style>
+      </p:cxnSp>
+      <p:cxnSp>
+        <p:nvCxnSpPr>
+          <p:cNvPr id="54" name="Straight Connector 53"/>
+          <p:cNvCxnSpPr/>
+          <p:nvPr/>
+        </p:nvCxnSpPr>
+        <p:spPr>
+          <a:xfrm flipH="1" flipV="1">
+            <a:off x="6017578" y="3478587"/>
+            <a:ext cx="2477916" cy="1896196"/>
+          </a:xfrm>
+          <a:prstGeom prst="line">
+            <a:avLst/>
+          </a:prstGeom>
+        </p:spPr>
+        <p:style>
+          <a:lnRef idx="1">
+            <a:schemeClr val="accent1"/>
+          </a:lnRef>
+          <a:fillRef idx="0">
+            <a:schemeClr val="accent1"/>
+          </a:fillRef>
+          <a:effectRef idx="0">
+            <a:schemeClr val="accent1"/>
+          </a:effectRef>
+          <a:fontRef idx="minor">
+            <a:schemeClr val="tx1"/>
+          </a:fontRef>
+        </p:style>
+      </p:cxnSp>
+      <p:cxnSp>
+        <p:nvCxnSpPr>
+          <p:cNvPr id="56" name="Straight Connector 55"/>
+          <p:cNvCxnSpPr/>
+          <p:nvPr/>
+        </p:nvCxnSpPr>
+        <p:spPr>
+          <a:xfrm flipH="1" flipV="1">
+            <a:off x="5940046" y="3441809"/>
+            <a:ext cx="3202448" cy="1325140"/>
+          </a:xfrm>
+          <a:prstGeom prst="line">
+            <a:avLst/>
+          </a:prstGeom>
+        </p:spPr>
+        <p:style>
+          <a:lnRef idx="1">
+            <a:schemeClr val="accent1"/>
+          </a:lnRef>
+          <a:fillRef idx="0">
+            <a:schemeClr val="accent1"/>
+          </a:fillRef>
+          <a:effectRef idx="0">
+            <a:schemeClr val="accent1"/>
+          </a:effectRef>
+          <a:fontRef idx="minor">
+            <a:schemeClr val="tx1"/>
+          </a:fontRef>
+        </p:style>
+      </p:cxnSp>
+      <p:cxnSp>
+        <p:nvCxnSpPr>
+          <p:cNvPr id="58" name="Straight Connector 57"/>
+          <p:cNvCxnSpPr/>
+          <p:nvPr/>
+        </p:nvCxnSpPr>
+        <p:spPr>
+          <a:xfrm flipH="1" flipV="1">
+            <a:off x="5976333" y="3446375"/>
+            <a:ext cx="3606095" cy="747341"/>
+          </a:xfrm>
+          <a:prstGeom prst="line">
+            <a:avLst/>
+          </a:prstGeom>
+        </p:spPr>
+        <p:style>
+          <a:lnRef idx="1">
+            <a:schemeClr val="accent1"/>
+          </a:lnRef>
+          <a:fillRef idx="0">
+            <a:schemeClr val="accent1"/>
+          </a:fillRef>
+          <a:effectRef idx="0">
+            <a:schemeClr val="accent1"/>
+          </a:effectRef>
+          <a:fontRef idx="minor">
+            <a:schemeClr val="tx1"/>
+          </a:fontRef>
+        </p:style>
+      </p:cxnSp>
+      <p:cxnSp>
+        <p:nvCxnSpPr>
+          <p:cNvPr id="60" name="Straight Connector 59"/>
+          <p:cNvCxnSpPr/>
+          <p:nvPr/>
+        </p:nvCxnSpPr>
+        <p:spPr>
+          <a:xfrm flipH="1" flipV="1">
+            <a:off x="5975128" y="3441809"/>
+            <a:ext cx="3487317" cy="172755"/>
+          </a:xfrm>
+          <a:prstGeom prst="line">
+            <a:avLst/>
+          </a:prstGeom>
+        </p:spPr>
+        <p:style>
+          <a:lnRef idx="1">
+            <a:schemeClr val="accent1"/>
+          </a:lnRef>
+          <a:fillRef idx="0">
+            <a:schemeClr val="accent1"/>
+          </a:fillRef>
+          <a:effectRef idx="0">
+            <a:schemeClr val="accent1"/>
+          </a:effectRef>
+          <a:fontRef idx="minor">
+            <a:schemeClr val="tx1"/>
+          </a:fontRef>
+        </p:style>
+      </p:cxnSp>
+      <p:cxnSp>
+        <p:nvCxnSpPr>
+          <p:cNvPr id="62" name="Straight Connector 61"/>
+          <p:cNvCxnSpPr/>
+          <p:nvPr/>
+        </p:nvCxnSpPr>
+        <p:spPr>
+          <a:xfrm flipH="1">
+            <a:off x="5999457" y="2958452"/>
+            <a:ext cx="3354750" cy="444663"/>
+          </a:xfrm>
+          <a:prstGeom prst="line">
+            <a:avLst/>
+          </a:prstGeom>
+        </p:spPr>
+        <p:style>
+          <a:lnRef idx="1">
+            <a:schemeClr val="accent1"/>
+          </a:lnRef>
+          <a:fillRef idx="0">
+            <a:schemeClr val="accent1"/>
+          </a:fillRef>
+          <a:effectRef idx="0">
+            <a:schemeClr val="accent1"/>
+          </a:effectRef>
+          <a:fontRef idx="minor">
+            <a:schemeClr val="tx1"/>
+          </a:fontRef>
+        </p:style>
+      </p:cxnSp>
+      <p:cxnSp>
+        <p:nvCxnSpPr>
+          <p:cNvPr id="64" name="Straight Connector 63"/>
+          <p:cNvCxnSpPr/>
+          <p:nvPr/>
+        </p:nvCxnSpPr>
+        <p:spPr>
+          <a:xfrm flipH="1">
+            <a:off x="6015179" y="2409208"/>
+            <a:ext cx="3127315" cy="982734"/>
+          </a:xfrm>
+          <a:prstGeom prst="line">
+            <a:avLst/>
+          </a:prstGeom>
+        </p:spPr>
+        <p:style>
+          <a:lnRef idx="1">
+            <a:schemeClr val="accent1"/>
+          </a:lnRef>
+          <a:fillRef idx="0">
+            <a:schemeClr val="accent1"/>
+          </a:fillRef>
+          <a:effectRef idx="0">
+            <a:schemeClr val="accent1"/>
+          </a:effectRef>
+          <a:fontRef idx="minor">
+            <a:schemeClr val="tx1"/>
+          </a:fontRef>
+        </p:style>
+      </p:cxnSp>
+      <p:cxnSp>
+        <p:nvCxnSpPr>
+          <p:cNvPr id="66" name="Straight Connector 65"/>
+          <p:cNvCxnSpPr/>
+          <p:nvPr/>
+        </p:nvCxnSpPr>
+        <p:spPr>
+          <a:xfrm flipH="1">
+            <a:off x="5975128" y="1742801"/>
+            <a:ext cx="2753881" cy="1623562"/>
+          </a:xfrm>
+          <a:prstGeom prst="line">
+            <a:avLst/>
+          </a:prstGeom>
+        </p:spPr>
+        <p:style>
+          <a:lnRef idx="1">
+            <a:schemeClr val="accent1"/>
+          </a:lnRef>
+          <a:fillRef idx="0">
+            <a:schemeClr val="accent1"/>
+          </a:fillRef>
+          <a:effectRef idx="0">
+            <a:schemeClr val="accent1"/>
+          </a:effectRef>
+          <a:fontRef idx="minor">
+            <a:schemeClr val="tx1"/>
+          </a:fontRef>
+        </p:style>
+      </p:cxnSp>
+      <p:cxnSp>
+        <p:nvCxnSpPr>
+          <p:cNvPr id="68" name="Straight Connector 67"/>
+          <p:cNvCxnSpPr/>
+          <p:nvPr/>
+        </p:nvCxnSpPr>
+        <p:spPr>
+          <a:xfrm flipH="1">
+            <a:off x="5983692" y="1115802"/>
+            <a:ext cx="1795688" cy="2234141"/>
+          </a:xfrm>
+          <a:prstGeom prst="line">
+            <a:avLst/>
+          </a:prstGeom>
+        </p:spPr>
+        <p:style>
+          <a:lnRef idx="1">
+            <a:schemeClr val="accent1"/>
+          </a:lnRef>
+          <a:fillRef idx="0">
+            <a:schemeClr val="accent1"/>
+          </a:fillRef>
+          <a:effectRef idx="0">
+            <a:schemeClr val="accent1"/>
+          </a:effectRef>
+          <a:fontRef idx="minor">
+            <a:schemeClr val="tx1"/>
+          </a:fontRef>
+        </p:style>
+      </p:cxnSp>
+      <p:sp>
+        <p:nvSpPr>
+          <p:cNvPr id="4" name="Oval 3"/>
+          <p:cNvSpPr/>
+          <p:nvPr/>
+        </p:nvSpPr>
+        <p:spPr>
+          <a:xfrm>
+            <a:off x="4884755" y="2437661"/>
+            <a:ext cx="2094271" cy="1848464"/>
+          </a:xfrm>
+          <a:prstGeom prst="ellipse">
+            <a:avLst/>
+          </a:prstGeom>
+          <a:solidFill>
+            <a:schemeClr val="accent1">
+              <a:lumMod val="40000"/>
+              <a:lumOff val="60000"/>
+            </a:schemeClr>
+          </a:solidFill>
+        </p:spPr>
+        <p:style>
+          <a:lnRef idx="2">
+            <a:schemeClr val="accent1">
+              <a:shade val="50000"/>
+            </a:schemeClr>
+          </a:lnRef>
+          <a:fillRef idx="1">
+            <a:schemeClr val="accent1"/>
+          </a:fillRef>
+          <a:effectRef idx="0">
+            <a:schemeClr val="accent1"/>
+          </a:effectRef>
+          <a:fontRef idx="minor">
+            <a:schemeClr val="lt1"/>
+          </a:fontRef>
+        </p:style>
+        <p:txBody>
+          <a:bodyPr rtlCol="0" anchor="ctr"/>
+          <a:lstStyle/>
+          <a:p>
+            <a:pPr algn="ctr"/>
+            <a:r>
+              <a:rPr lang="en-US" sz="2300" b="1" dirty="0"/>
+              <a:t>Drug1Pool</a:t>
+            </a:r>
+          </a:p>
+        </p:txBody>
+      </p:sp>
+      <p:sp>
+        <p:nvSpPr>
+          <p:cNvPr id="5" name="Oval 4"/>
+          <p:cNvSpPr/>
+          <p:nvPr/>
+        </p:nvSpPr>
+        <p:spPr>
+          <a:xfrm>
+            <a:off x="5056833" y="522804"/>
+            <a:ext cx="1933903" cy="567559"/>
+          </a:xfrm>
+          <a:prstGeom prst="ellipse">
+            <a:avLst/>
+          </a:prstGeom>
+          <a:solidFill>
+            <a:schemeClr val="accent6">
+              <a:lumMod val="40000"/>
+              <a:lumOff val="60000"/>
+            </a:schemeClr>
+          </a:solidFill>
+        </p:spPr>
+        <p:style>
+          <a:lnRef idx="2">
+            <a:schemeClr val="accent1">
+              <a:shade val="50000"/>
+            </a:schemeClr>
+          </a:lnRef>
+          <a:fillRef idx="1">
+            <a:schemeClr val="accent1"/>
+          </a:fillRef>
+          <a:effectRef idx="0">
+            <a:schemeClr val="accent1"/>
+          </a:effectRef>
+          <a:fontRef idx="minor">
+            <a:schemeClr val="lt1"/>
+          </a:fontRef>
+        </p:style>
+        <p:txBody>
+          <a:bodyPr rtlCol="0" anchor="ctr"/>
+          <a:lstStyle/>
+          <a:p>
+            <a:pPr algn="ctr"/>
+            <a:r>
+              <a:rPr lang="en-US" dirty="0">
+                <a:solidFill>
+                  <a:schemeClr val="tx1"/>
+                </a:solidFill>
+              </a:rPr>
+              <a:t>Study1</a:t>
+            </a:r>
+          </a:p>
+        </p:txBody>
+      </p:sp>
+      <p:sp>
+        <p:nvSpPr>
+          <p:cNvPr id="7" name="Oval 6"/>
+          <p:cNvSpPr/>
+          <p:nvPr/>
+        </p:nvSpPr>
+        <p:spPr>
+          <a:xfrm>
+            <a:off x="3240193" y="813193"/>
+            <a:ext cx="1933903" cy="567559"/>
+          </a:xfrm>
+          <a:prstGeom prst="ellipse">
+            <a:avLst/>
+          </a:prstGeom>
+          <a:solidFill>
+            <a:schemeClr val="accent6">
+              <a:lumMod val="40000"/>
+              <a:lumOff val="60000"/>
+            </a:schemeClr>
+          </a:solidFill>
+        </p:spPr>
+        <p:style>
+          <a:lnRef idx="2">
+            <a:schemeClr val="accent1">
+              <a:shade val="50000"/>
+            </a:schemeClr>
+          </a:lnRef>
+          <a:fillRef idx="1">
+            <a:schemeClr val="accent1"/>
+          </a:fillRef>
+          <a:effectRef idx="0">
+            <a:schemeClr val="accent1"/>
+          </a:effectRef>
+          <a:fontRef idx="minor">
+            <a:schemeClr val="lt1"/>
+          </a:fontRef>
+        </p:style>
+        <p:txBody>
+          <a:bodyPr rtlCol="0" anchor="ctr"/>
+          <a:lstStyle/>
+          <a:p>
+            <a:pPr algn="ctr"/>
+            <a:r>
+              <a:rPr lang="en-US" dirty="0">
+                <a:solidFill>
+                  <a:schemeClr val="tx1"/>
+                </a:solidFill>
+              </a:rPr>
+              <a:t>Study2</a:t>
+            </a:r>
+          </a:p>
+        </p:txBody>
+      </p:sp>
+      <p:sp>
+        <p:nvSpPr>
+          <p:cNvPr id="8" name="Oval 7"/>
+          <p:cNvSpPr/>
+          <p:nvPr/>
+        </p:nvSpPr>
+        <p:spPr>
+          <a:xfrm>
+            <a:off x="2297528" y="1356765"/>
+            <a:ext cx="1933903" cy="567559"/>
+          </a:xfrm>
+          <a:prstGeom prst="ellipse">
+            <a:avLst/>
+          </a:prstGeom>
+          <a:solidFill>
+            <a:schemeClr val="accent6">
+              <a:lumMod val="40000"/>
+              <a:lumOff val="60000"/>
+            </a:schemeClr>
+          </a:solidFill>
+        </p:spPr>
+        <p:style>
+          <a:lnRef idx="2">
+            <a:schemeClr val="accent1">
+              <a:shade val="50000"/>
+            </a:schemeClr>
+          </a:lnRef>
+          <a:fillRef idx="1">
+            <a:schemeClr val="accent1"/>
+          </a:fillRef>
+          <a:effectRef idx="0">
+            <a:schemeClr val="accent1"/>
+          </a:effectRef>
+          <a:fontRef idx="minor">
+            <a:schemeClr val="lt1"/>
+          </a:fontRef>
+        </p:style>
+        <p:txBody>
+          <a:bodyPr rtlCol="0" anchor="ctr"/>
+          <a:lstStyle/>
+          <a:p>
+            <a:pPr algn="ctr"/>
+            <a:r>
+              <a:rPr lang="en-US" dirty="0">
+                <a:solidFill>
+                  <a:schemeClr val="tx1"/>
+                </a:solidFill>
+              </a:rPr>
+              <a:t>Study3</a:t>
+            </a:r>
+          </a:p>
+        </p:txBody>
+      </p:sp>
+      <p:sp>
+        <p:nvSpPr>
+          <p:cNvPr id="9" name="Oval 8"/>
+          <p:cNvSpPr/>
+          <p:nvPr/>
+        </p:nvSpPr>
+        <p:spPr>
+          <a:xfrm>
+            <a:off x="1754719" y="1962077"/>
+            <a:ext cx="1933903" cy="567559"/>
+          </a:xfrm>
+          <a:prstGeom prst="ellipse">
+            <a:avLst/>
+          </a:prstGeom>
+          <a:solidFill>
+            <a:schemeClr val="accent6">
+              <a:lumMod val="40000"/>
+              <a:lumOff val="60000"/>
+            </a:schemeClr>
+          </a:solidFill>
+        </p:spPr>
+        <p:style>
+          <a:lnRef idx="2">
+            <a:schemeClr val="accent1">
+              <a:shade val="50000"/>
+            </a:schemeClr>
+          </a:lnRef>
+          <a:fillRef idx="1">
+            <a:schemeClr val="accent1"/>
+          </a:fillRef>
+          <a:effectRef idx="0">
+            <a:schemeClr val="accent1"/>
+          </a:effectRef>
+          <a:fontRef idx="minor">
+            <a:schemeClr val="lt1"/>
+          </a:fontRef>
+        </p:style>
+        <p:txBody>
+          <a:bodyPr rtlCol="0" anchor="ctr"/>
+          <a:lstStyle/>
+          <a:p>
+            <a:pPr algn="ctr"/>
+            <a:r>
+              <a:rPr lang="en-US" dirty="0">
+                <a:solidFill>
+                  <a:schemeClr val="tx1"/>
+                </a:solidFill>
+              </a:rPr>
+              <a:t>Study4</a:t>
+            </a:r>
+          </a:p>
+        </p:txBody>
+      </p:sp>
+      <p:sp>
+        <p:nvSpPr>
+          <p:cNvPr id="10" name="Oval 9"/>
+          <p:cNvSpPr/>
+          <p:nvPr/>
+        </p:nvSpPr>
+        <p:spPr>
+          <a:xfrm>
+            <a:off x="1494081" y="2576395"/>
+            <a:ext cx="1933903" cy="567559"/>
+          </a:xfrm>
+          <a:prstGeom prst="ellipse">
+            <a:avLst/>
+          </a:prstGeom>
+          <a:solidFill>
+            <a:schemeClr val="accent6">
+              <a:lumMod val="40000"/>
+              <a:lumOff val="60000"/>
+            </a:schemeClr>
+          </a:solidFill>
+        </p:spPr>
+        <p:style>
+          <a:lnRef idx="2">
+            <a:schemeClr val="accent1">
+              <a:shade val="50000"/>
+            </a:schemeClr>
+          </a:lnRef>
+          <a:fillRef idx="1">
+            <a:schemeClr val="accent1"/>
+          </a:fillRef>
+          <a:effectRef idx="0">
+            <a:schemeClr val="accent1"/>
+          </a:effectRef>
+          <a:fontRef idx="minor">
+            <a:schemeClr val="lt1"/>
+          </a:fontRef>
+        </p:style>
+        <p:txBody>
+          <a:bodyPr rtlCol="0" anchor="ctr"/>
+          <a:lstStyle/>
+          <a:p>
+            <a:pPr algn="ctr"/>
+            <a:r>
+              <a:rPr lang="en-US" dirty="0">
+                <a:solidFill>
+                  <a:schemeClr val="tx1"/>
+                </a:solidFill>
+              </a:rPr>
+              <a:t>Study5</a:t>
+            </a:r>
+          </a:p>
+        </p:txBody>
+      </p:sp>
+      <p:sp>
+        <p:nvSpPr>
+          <p:cNvPr id="11" name="Oval 10"/>
+          <p:cNvSpPr/>
+          <p:nvPr/>
+        </p:nvSpPr>
+        <p:spPr>
+          <a:xfrm>
+            <a:off x="3240192" y="5693895"/>
+            <a:ext cx="1933903" cy="567559"/>
+          </a:xfrm>
+          <a:prstGeom prst="ellipse">
+            <a:avLst/>
+          </a:prstGeom>
+          <a:solidFill>
+            <a:schemeClr val="accent6">
+              <a:lumMod val="40000"/>
+              <a:lumOff val="60000"/>
+            </a:schemeClr>
+          </a:solidFill>
+        </p:spPr>
+        <p:style>
+          <a:lnRef idx="2">
+            <a:schemeClr val="accent1">
+              <a:shade val="50000"/>
+            </a:schemeClr>
+          </a:lnRef>
+          <a:fillRef idx="1">
+            <a:schemeClr val="accent1"/>
+          </a:fillRef>
+          <a:effectRef idx="0">
+            <a:schemeClr val="accent1"/>
+          </a:effectRef>
+          <a:fontRef idx="minor">
+            <a:schemeClr val="lt1"/>
+          </a:fontRef>
+        </p:style>
+        <p:txBody>
+          <a:bodyPr rtlCol="0" anchor="ctr"/>
+          <a:lstStyle/>
+          <a:p>
+            <a:pPr algn="ctr"/>
+            <a:r>
+              <a:rPr lang="en-US" dirty="0">
+                <a:solidFill>
+                  <a:schemeClr val="tx1"/>
+                </a:solidFill>
+              </a:rPr>
+              <a:t>Study10</a:t>
+            </a:r>
+          </a:p>
+        </p:txBody>
+      </p:sp>
+      <p:sp>
+        <p:nvSpPr>
+          <p:cNvPr id="12" name="Oval 11"/>
+          <p:cNvSpPr/>
+          <p:nvPr/>
+        </p:nvSpPr>
+        <p:spPr>
+          <a:xfrm>
+            <a:off x="1418896" y="3223966"/>
+            <a:ext cx="1933903" cy="567559"/>
+          </a:xfrm>
+          <a:prstGeom prst="ellipse">
+            <a:avLst/>
+          </a:prstGeom>
+          <a:solidFill>
+            <a:schemeClr val="accent6">
+              <a:lumMod val="40000"/>
+              <a:lumOff val="60000"/>
+            </a:schemeClr>
+          </a:solidFill>
+        </p:spPr>
+        <p:style>
+          <a:lnRef idx="2">
+            <a:schemeClr val="accent1">
+              <a:shade val="50000"/>
+            </a:schemeClr>
+          </a:lnRef>
+          <a:fillRef idx="1">
+            <a:schemeClr val="accent1"/>
+          </a:fillRef>
+          <a:effectRef idx="0">
+            <a:schemeClr val="accent1"/>
+          </a:effectRef>
+          <a:fontRef idx="minor">
+            <a:schemeClr val="lt1"/>
+          </a:fontRef>
+        </p:style>
+        <p:txBody>
+          <a:bodyPr rtlCol="0" anchor="ctr"/>
+          <a:lstStyle/>
+          <a:p>
+            <a:pPr algn="ctr"/>
+            <a:r>
+              <a:rPr lang="en-US" dirty="0">
+                <a:solidFill>
+                  <a:schemeClr val="tx1"/>
+                </a:solidFill>
+              </a:rPr>
+              <a:t>Study6</a:t>
+            </a:r>
+          </a:p>
+        </p:txBody>
+      </p:sp>
+      <p:sp>
+        <p:nvSpPr>
+          <p:cNvPr id="13" name="Oval 12"/>
+          <p:cNvSpPr/>
+          <p:nvPr/>
+        </p:nvSpPr>
+        <p:spPr>
+          <a:xfrm>
+            <a:off x="1470013" y="3865986"/>
+            <a:ext cx="1933903" cy="567559"/>
+          </a:xfrm>
+          <a:prstGeom prst="ellipse">
+            <a:avLst/>
+          </a:prstGeom>
+          <a:solidFill>
+            <a:schemeClr val="accent6">
+              <a:lumMod val="40000"/>
+              <a:lumOff val="60000"/>
+            </a:schemeClr>
+          </a:solidFill>
+        </p:spPr>
+        <p:style>
+          <a:lnRef idx="2">
+            <a:schemeClr val="accent1">
+              <a:shade val="50000"/>
+            </a:schemeClr>
+          </a:lnRef>
+          <a:fillRef idx="1">
+            <a:schemeClr val="accent1"/>
+          </a:fillRef>
+          <a:effectRef idx="0">
+            <a:schemeClr val="accent1"/>
+          </a:effectRef>
+          <a:fontRef idx="minor">
+            <a:schemeClr val="lt1"/>
+          </a:fontRef>
+        </p:style>
+        <p:txBody>
+          <a:bodyPr rtlCol="0" anchor="ctr"/>
+          <a:lstStyle/>
+          <a:p>
+            <a:pPr algn="ctr"/>
+            <a:r>
+              <a:rPr lang="en-US" dirty="0">
+                <a:solidFill>
+                  <a:schemeClr val="tx1"/>
+                </a:solidFill>
+              </a:rPr>
+              <a:t>Study7</a:t>
+            </a:r>
+          </a:p>
+        </p:txBody>
+      </p:sp>
+      <p:sp>
+        <p:nvSpPr>
+          <p:cNvPr id="14" name="Oval 13"/>
+          <p:cNvSpPr/>
+          <p:nvPr/>
+        </p:nvSpPr>
+        <p:spPr>
+          <a:xfrm>
+            <a:off x="1754719" y="4483170"/>
+            <a:ext cx="1933903" cy="567559"/>
+          </a:xfrm>
+          <a:prstGeom prst="ellipse">
+            <a:avLst/>
+          </a:prstGeom>
+          <a:solidFill>
+            <a:schemeClr val="accent6">
+              <a:lumMod val="40000"/>
+              <a:lumOff val="60000"/>
+            </a:schemeClr>
+          </a:solidFill>
+        </p:spPr>
+        <p:style>
+          <a:lnRef idx="2">
+            <a:schemeClr val="accent1">
+              <a:shade val="50000"/>
+            </a:schemeClr>
+          </a:lnRef>
+          <a:fillRef idx="1">
+            <a:schemeClr val="accent1"/>
+          </a:fillRef>
+          <a:effectRef idx="0">
+            <a:schemeClr val="accent1"/>
+          </a:effectRef>
+          <a:fontRef idx="minor">
+            <a:schemeClr val="lt1"/>
+          </a:fontRef>
+        </p:style>
+        <p:txBody>
+          <a:bodyPr rtlCol="0" anchor="ctr"/>
+          <a:lstStyle/>
+          <a:p>
+            <a:pPr algn="ctr"/>
+            <a:r>
+              <a:rPr lang="en-US" dirty="0">
+                <a:solidFill>
+                  <a:schemeClr val="tx1"/>
+                </a:solidFill>
+              </a:rPr>
+              <a:t>Study8</a:t>
+            </a:r>
+          </a:p>
+        </p:txBody>
+      </p:sp>
+      <p:sp>
+        <p:nvSpPr>
+          <p:cNvPr id="15" name="Oval 14"/>
+          <p:cNvSpPr/>
+          <p:nvPr/>
+        </p:nvSpPr>
+        <p:spPr>
+          <a:xfrm>
+            <a:off x="2309542" y="5097749"/>
+            <a:ext cx="1933903" cy="567559"/>
+          </a:xfrm>
+          <a:prstGeom prst="ellipse">
+            <a:avLst/>
+          </a:prstGeom>
+          <a:solidFill>
+            <a:schemeClr val="accent6">
+              <a:lumMod val="40000"/>
+              <a:lumOff val="60000"/>
+            </a:schemeClr>
+          </a:solidFill>
+        </p:spPr>
+        <p:style>
+          <a:lnRef idx="2">
+            <a:schemeClr val="accent1">
+              <a:shade val="50000"/>
+            </a:schemeClr>
+          </a:lnRef>
+          <a:fillRef idx="1">
+            <a:schemeClr val="accent1"/>
+          </a:fillRef>
+          <a:effectRef idx="0">
+            <a:schemeClr val="accent1"/>
+          </a:effectRef>
+          <a:fontRef idx="minor">
+            <a:schemeClr val="lt1"/>
+          </a:fontRef>
+        </p:style>
+        <p:txBody>
+          <a:bodyPr rtlCol="0" anchor="ctr"/>
+          <a:lstStyle/>
+          <a:p>
+            <a:pPr algn="ctr"/>
+            <a:r>
+              <a:rPr lang="en-US" dirty="0">
+                <a:solidFill>
+                  <a:schemeClr val="tx1"/>
+                </a:solidFill>
+              </a:rPr>
+              <a:t>Study9</a:t>
+            </a:r>
+          </a:p>
+        </p:txBody>
+      </p:sp>
+      <p:sp>
+        <p:nvSpPr>
+          <p:cNvPr id="16" name="Oval 15"/>
+          <p:cNvSpPr/>
+          <p:nvPr/>
+        </p:nvSpPr>
+        <p:spPr>
+          <a:xfrm>
+            <a:off x="4992413" y="5982417"/>
+            <a:ext cx="1933903" cy="567559"/>
+          </a:xfrm>
+          <a:prstGeom prst="ellipse">
+            <a:avLst/>
+          </a:prstGeom>
+          <a:solidFill>
+            <a:schemeClr val="accent6">
+              <a:lumMod val="40000"/>
+              <a:lumOff val="60000"/>
+            </a:schemeClr>
+          </a:solidFill>
+        </p:spPr>
+        <p:style>
+          <a:lnRef idx="2">
+            <a:schemeClr val="accent1">
+              <a:shade val="50000"/>
+            </a:schemeClr>
+          </a:lnRef>
+          <a:fillRef idx="1">
+            <a:schemeClr val="accent1"/>
+          </a:fillRef>
+          <a:effectRef idx="0">
+            <a:schemeClr val="accent1"/>
+          </a:effectRef>
+          <a:fontRef idx="minor">
+            <a:schemeClr val="lt1"/>
+          </a:fontRef>
+        </p:style>
+        <p:txBody>
+          <a:bodyPr rtlCol="0" anchor="ctr"/>
+          <a:lstStyle/>
+          <a:p>
+            <a:pPr algn="ctr"/>
+            <a:r>
+              <a:rPr lang="en-US" dirty="0">
+                <a:solidFill>
+                  <a:schemeClr val="tx1"/>
+                </a:solidFill>
+              </a:rPr>
+              <a:t>Study11</a:t>
+            </a:r>
+          </a:p>
+        </p:txBody>
+      </p:sp>
+      <p:sp>
+        <p:nvSpPr>
+          <p:cNvPr id="17" name="Oval 16"/>
+          <p:cNvSpPr/>
+          <p:nvPr/>
+        </p:nvSpPr>
+        <p:spPr>
+          <a:xfrm>
+            <a:off x="8495494" y="3918381"/>
+            <a:ext cx="1933903" cy="567559"/>
+          </a:xfrm>
+          <a:prstGeom prst="ellipse">
+            <a:avLst/>
+          </a:prstGeom>
+          <a:solidFill>
+            <a:schemeClr val="accent6">
+              <a:lumMod val="40000"/>
+              <a:lumOff val="60000"/>
+            </a:schemeClr>
+          </a:solidFill>
+        </p:spPr>
+        <p:style>
+          <a:lnRef idx="2">
+            <a:schemeClr val="accent1">
+              <a:shade val="50000"/>
+            </a:schemeClr>
+          </a:lnRef>
+          <a:fillRef idx="1">
+            <a:schemeClr val="accent1"/>
+          </a:fillRef>
+          <a:effectRef idx="0">
+            <a:schemeClr val="accent1"/>
+          </a:effectRef>
+          <a:fontRef idx="minor">
+            <a:schemeClr val="lt1"/>
+          </a:fontRef>
+        </p:style>
+        <p:txBody>
+          <a:bodyPr rtlCol="0" anchor="ctr"/>
+          <a:lstStyle/>
+          <a:p>
+            <a:pPr algn="ctr"/>
+            <a:r>
+              <a:rPr lang="en-US" dirty="0">
+                <a:solidFill>
+                  <a:schemeClr val="tx1"/>
+                </a:solidFill>
+              </a:rPr>
+              <a:t>Study15</a:t>
+            </a:r>
+          </a:p>
+        </p:txBody>
+      </p:sp>
+      <p:sp>
+        <p:nvSpPr>
+          <p:cNvPr id="18" name="Oval 17"/>
+          <p:cNvSpPr/>
+          <p:nvPr/>
+        </p:nvSpPr>
+        <p:spPr>
+          <a:xfrm>
+            <a:off x="6740645" y="5678600"/>
+            <a:ext cx="1933903" cy="567559"/>
+          </a:xfrm>
+          <a:prstGeom prst="ellipse">
+            <a:avLst/>
+          </a:prstGeom>
+          <a:solidFill>
+            <a:schemeClr val="accent6">
+              <a:lumMod val="40000"/>
+              <a:lumOff val="60000"/>
+            </a:schemeClr>
+          </a:solidFill>
+        </p:spPr>
+        <p:style>
+          <a:lnRef idx="2">
+            <a:schemeClr val="accent1">
+              <a:shade val="50000"/>
+            </a:schemeClr>
+          </a:lnRef>
+          <a:fillRef idx="1">
+            <a:schemeClr val="accent1"/>
+          </a:fillRef>
+          <a:effectRef idx="0">
+            <a:schemeClr val="accent1"/>
+          </a:effectRef>
+          <a:fontRef idx="minor">
+            <a:schemeClr val="lt1"/>
+          </a:fontRef>
+        </p:style>
+        <p:txBody>
+          <a:bodyPr rtlCol="0" anchor="ctr"/>
+          <a:lstStyle/>
+          <a:p>
+            <a:pPr algn="ctr"/>
+            <a:r>
+              <a:rPr lang="en-US" dirty="0">
+                <a:solidFill>
+                  <a:schemeClr val="tx1"/>
+                </a:solidFill>
+              </a:rPr>
+              <a:t>Study12</a:t>
+            </a:r>
+          </a:p>
+        </p:txBody>
+      </p:sp>
+      <p:sp>
+        <p:nvSpPr>
+          <p:cNvPr id="19" name="Oval 18"/>
+          <p:cNvSpPr/>
+          <p:nvPr/>
+        </p:nvSpPr>
+        <p:spPr>
+          <a:xfrm>
+            <a:off x="7648525" y="5130682"/>
+            <a:ext cx="1933903" cy="567559"/>
+          </a:xfrm>
+          <a:prstGeom prst="ellipse">
+            <a:avLst/>
+          </a:prstGeom>
+          <a:solidFill>
+            <a:schemeClr val="accent6">
+              <a:lumMod val="40000"/>
+              <a:lumOff val="60000"/>
+            </a:schemeClr>
+          </a:solidFill>
+        </p:spPr>
+        <p:style>
+          <a:lnRef idx="2">
+            <a:schemeClr val="accent1">
+              <a:shade val="50000"/>
+            </a:schemeClr>
+          </a:lnRef>
+          <a:fillRef idx="1">
+            <a:schemeClr val="accent1"/>
+          </a:fillRef>
+          <a:effectRef idx="0">
+            <a:schemeClr val="accent1"/>
+          </a:effectRef>
+          <a:fontRef idx="minor">
+            <a:schemeClr val="lt1"/>
+          </a:fontRef>
+        </p:style>
+        <p:txBody>
+          <a:bodyPr rtlCol="0" anchor="ctr"/>
+          <a:lstStyle/>
+          <a:p>
+            <a:pPr algn="ctr"/>
+            <a:r>
+              <a:rPr lang="en-US" dirty="0">
+                <a:solidFill>
+                  <a:schemeClr val="tx1"/>
+                </a:solidFill>
+              </a:rPr>
+              <a:t>Study13</a:t>
+            </a:r>
+          </a:p>
+        </p:txBody>
+      </p:sp>
+      <p:sp>
+        <p:nvSpPr>
+          <p:cNvPr id="20" name="Oval 19"/>
+          <p:cNvSpPr/>
+          <p:nvPr/>
+        </p:nvSpPr>
+        <p:spPr>
+          <a:xfrm>
+            <a:off x="8175543" y="4529784"/>
+            <a:ext cx="1933903" cy="567559"/>
+          </a:xfrm>
+          <a:prstGeom prst="ellipse">
+            <a:avLst/>
+          </a:prstGeom>
+          <a:solidFill>
+            <a:schemeClr val="accent6">
+              <a:lumMod val="40000"/>
+              <a:lumOff val="60000"/>
+            </a:schemeClr>
+          </a:solidFill>
+        </p:spPr>
+        <p:style>
+          <a:lnRef idx="2">
+            <a:schemeClr val="accent1">
+              <a:shade val="50000"/>
+            </a:schemeClr>
+          </a:lnRef>
+          <a:fillRef idx="1">
+            <a:schemeClr val="accent1"/>
+          </a:fillRef>
+          <a:effectRef idx="0">
+            <a:schemeClr val="accent1"/>
+          </a:effectRef>
+          <a:fontRef idx="minor">
+            <a:schemeClr val="lt1"/>
+          </a:fontRef>
+        </p:style>
+        <p:txBody>
+          <a:bodyPr rtlCol="0" anchor="ctr"/>
+          <a:lstStyle/>
+          <a:p>
+            <a:pPr algn="ctr"/>
+            <a:r>
+              <a:rPr lang="en-US" dirty="0">
+                <a:solidFill>
+                  <a:schemeClr val="tx1"/>
+                </a:solidFill>
+              </a:rPr>
+              <a:t>Study14</a:t>
+            </a:r>
+          </a:p>
+        </p:txBody>
+      </p:sp>
+      <p:sp>
+        <p:nvSpPr>
+          <p:cNvPr id="21" name="Oval 20"/>
+          <p:cNvSpPr/>
+          <p:nvPr/>
+        </p:nvSpPr>
+        <p:spPr>
+          <a:xfrm>
+            <a:off x="8596616" y="3310414"/>
+            <a:ext cx="1933903" cy="567559"/>
+          </a:xfrm>
+          <a:prstGeom prst="ellipse">
+            <a:avLst/>
+          </a:prstGeom>
+          <a:solidFill>
+            <a:schemeClr val="accent6">
+              <a:lumMod val="40000"/>
+              <a:lumOff val="60000"/>
+            </a:schemeClr>
+          </a:solidFill>
+        </p:spPr>
+        <p:style>
+          <a:lnRef idx="2">
+            <a:schemeClr val="accent1">
+              <a:shade val="50000"/>
+            </a:schemeClr>
+          </a:lnRef>
+          <a:fillRef idx="1">
+            <a:schemeClr val="accent1"/>
+          </a:fillRef>
+          <a:effectRef idx="0">
+            <a:schemeClr val="accent1"/>
+          </a:effectRef>
+          <a:fontRef idx="minor">
+            <a:schemeClr val="lt1"/>
+          </a:fontRef>
+        </p:style>
+        <p:txBody>
+          <a:bodyPr rtlCol="0" anchor="ctr"/>
+          <a:lstStyle/>
+          <a:p>
+            <a:pPr algn="ctr"/>
+            <a:r>
+              <a:rPr lang="en-US" dirty="0">
+                <a:solidFill>
+                  <a:schemeClr val="tx1"/>
+                </a:solidFill>
+              </a:rPr>
+              <a:t>Study16</a:t>
+            </a:r>
+          </a:p>
+        </p:txBody>
+      </p:sp>
+      <p:sp>
+        <p:nvSpPr>
+          <p:cNvPr id="22" name="Oval 21"/>
+          <p:cNvSpPr/>
+          <p:nvPr/>
+        </p:nvSpPr>
+        <p:spPr>
+          <a:xfrm>
+            <a:off x="8495494" y="2692988"/>
+            <a:ext cx="1933903" cy="567559"/>
+          </a:xfrm>
+          <a:prstGeom prst="ellipse">
+            <a:avLst/>
+          </a:prstGeom>
+          <a:solidFill>
+            <a:schemeClr val="accent6">
+              <a:lumMod val="40000"/>
+              <a:lumOff val="60000"/>
+            </a:schemeClr>
+          </a:solidFill>
+        </p:spPr>
+        <p:style>
+          <a:lnRef idx="2">
+            <a:schemeClr val="accent1">
+              <a:shade val="50000"/>
+            </a:schemeClr>
+          </a:lnRef>
+          <a:fillRef idx="1">
+            <a:schemeClr val="accent1"/>
+          </a:fillRef>
+          <a:effectRef idx="0">
+            <a:schemeClr val="accent1"/>
+          </a:effectRef>
+          <a:fontRef idx="minor">
+            <a:schemeClr val="lt1"/>
+          </a:fontRef>
+        </p:style>
+        <p:txBody>
+          <a:bodyPr rtlCol="0" anchor="ctr"/>
+          <a:lstStyle/>
+          <a:p>
+            <a:pPr algn="ctr"/>
+            <a:r>
+              <a:rPr lang="en-US" dirty="0">
+                <a:solidFill>
+                  <a:schemeClr val="tx1"/>
+                </a:solidFill>
+              </a:rPr>
+              <a:t>Study17</a:t>
+            </a:r>
+          </a:p>
+        </p:txBody>
+      </p:sp>
+      <p:sp>
+        <p:nvSpPr>
+          <p:cNvPr id="23" name="Oval 22"/>
+          <p:cNvSpPr/>
+          <p:nvPr/>
+        </p:nvSpPr>
+        <p:spPr>
+          <a:xfrm>
+            <a:off x="8298805" y="2080292"/>
+            <a:ext cx="1933903" cy="567559"/>
+          </a:xfrm>
+          <a:prstGeom prst="ellipse">
+            <a:avLst/>
+          </a:prstGeom>
+          <a:solidFill>
+            <a:schemeClr val="accent6">
+              <a:lumMod val="40000"/>
+              <a:lumOff val="60000"/>
+            </a:schemeClr>
+          </a:solidFill>
+        </p:spPr>
+        <p:style>
+          <a:lnRef idx="2">
+            <a:schemeClr val="accent1">
+              <a:shade val="50000"/>
+            </a:schemeClr>
+          </a:lnRef>
+          <a:fillRef idx="1">
+            <a:schemeClr val="accent1"/>
+          </a:fillRef>
+          <a:effectRef idx="0">
+            <a:schemeClr val="accent1"/>
+          </a:effectRef>
+          <a:fontRef idx="minor">
+            <a:schemeClr val="lt1"/>
+          </a:fontRef>
+        </p:style>
+        <p:txBody>
+          <a:bodyPr rtlCol="0" anchor="ctr"/>
+          <a:lstStyle/>
+          <a:p>
+            <a:pPr algn="ctr"/>
+            <a:r>
+              <a:rPr lang="en-US" dirty="0">
+                <a:solidFill>
+                  <a:schemeClr val="tx1"/>
+                </a:solidFill>
+              </a:rPr>
+              <a:t>Study18</a:t>
+            </a:r>
+          </a:p>
+        </p:txBody>
+      </p:sp>
+      <p:sp>
+        <p:nvSpPr>
+          <p:cNvPr id="24" name="Oval 23"/>
+          <p:cNvSpPr/>
+          <p:nvPr/>
+        </p:nvSpPr>
+        <p:spPr>
+          <a:xfrm>
+            <a:off x="7839210" y="1451870"/>
+            <a:ext cx="1933903" cy="567559"/>
+          </a:xfrm>
+          <a:prstGeom prst="ellipse">
+            <a:avLst/>
+          </a:prstGeom>
+          <a:solidFill>
+            <a:schemeClr val="accent6">
+              <a:lumMod val="40000"/>
+              <a:lumOff val="60000"/>
+            </a:schemeClr>
+          </a:solidFill>
+        </p:spPr>
+        <p:style>
+          <a:lnRef idx="2">
+            <a:schemeClr val="accent1">
+              <a:shade val="50000"/>
+            </a:schemeClr>
+          </a:lnRef>
+          <a:fillRef idx="1">
+            <a:schemeClr val="accent1"/>
+          </a:fillRef>
+          <a:effectRef idx="0">
+            <a:schemeClr val="accent1"/>
+          </a:effectRef>
+          <a:fontRef idx="minor">
+            <a:schemeClr val="lt1"/>
+          </a:fontRef>
+        </p:style>
+        <p:txBody>
+          <a:bodyPr rtlCol="0" anchor="ctr"/>
+          <a:lstStyle/>
+          <a:p>
+            <a:pPr algn="ctr"/>
+            <a:r>
+              <a:rPr lang="en-US" dirty="0">
+                <a:solidFill>
+                  <a:schemeClr val="tx1"/>
+                </a:solidFill>
+              </a:rPr>
+              <a:t>Study19</a:t>
+            </a:r>
+          </a:p>
+        </p:txBody>
+      </p:sp>
+      <p:sp>
+        <p:nvSpPr>
+          <p:cNvPr id="25" name="Oval 24"/>
+          <p:cNvSpPr/>
+          <p:nvPr/>
+        </p:nvSpPr>
+        <p:spPr>
+          <a:xfrm>
+            <a:off x="6934897" y="839174"/>
+            <a:ext cx="1933903" cy="567559"/>
+          </a:xfrm>
+          <a:prstGeom prst="ellipse">
+            <a:avLst/>
+          </a:prstGeom>
+          <a:solidFill>
+            <a:schemeClr val="accent6">
+              <a:lumMod val="40000"/>
+              <a:lumOff val="60000"/>
+            </a:schemeClr>
+          </a:solidFill>
+        </p:spPr>
+        <p:style>
+          <a:lnRef idx="2">
+            <a:schemeClr val="accent1">
+              <a:shade val="50000"/>
+            </a:schemeClr>
+          </a:lnRef>
+          <a:fillRef idx="1">
+            <a:schemeClr val="accent1"/>
+          </a:fillRef>
+          <a:effectRef idx="0">
+            <a:schemeClr val="accent1"/>
+          </a:effectRef>
+          <a:fontRef idx="minor">
+            <a:schemeClr val="lt1"/>
+          </a:fontRef>
+        </p:style>
+        <p:txBody>
+          <a:bodyPr rtlCol="0" anchor="ctr"/>
+          <a:lstStyle/>
+          <a:p>
+            <a:pPr algn="ctr"/>
+            <a:r>
+              <a:rPr lang="en-US" dirty="0">
+                <a:solidFill>
+                  <a:schemeClr val="tx1"/>
+                </a:solidFill>
+              </a:rPr>
+              <a:t>Study20</a:t>
+            </a:r>
+          </a:p>
+        </p:txBody>
+      </p:sp>
+    </p:spTree>
+    <p:extLst>
+      <p:ext uri="{BB962C8B-B14F-4D97-AF65-F5344CB8AC3E}">
+        <p14:creationId xmlns:p14="http://schemas.microsoft.com/office/powerpoint/2010/main" val="711884031"/>
+      </p:ext>
+    </p:extLst>
+  </p:cSld>
+  <p:clrMapOvr>
+    <a:masterClrMapping/>
+  </p:clrMapOvr>
+</p:sld>
+</file>
+
+<file path=ppt/slides/slide7.xml><?xml version="1.0" encoding="utf-8"?>
+<p:sld xmlns:a="http://schemas.openxmlformats.org/drawingml/2006/main" xmlns:r="http://schemas.openxmlformats.org/officeDocument/2006/relationships" xmlns:p="http://schemas.openxmlformats.org/presentationml/2006/main">
+  <p:cSld>
+    <p:spTree>
+      <p:nvGrpSpPr>
+        <p:cNvPr id="1" name=""/>
+        <p:cNvGrpSpPr/>
+        <p:nvPr/>
+      </p:nvGrpSpPr>
+      <p:grpSpPr>
+        <a:xfrm>
+          <a:off x="0" y="0"/>
+          <a:ext cx="0" cy="0"/>
+          <a:chOff x="0" y="0"/>
+          <a:chExt cx="0" cy="0"/>
+        </a:xfrm>
+      </p:grpSpPr>
       <p:sp>
         <p:nvSpPr>
           <p:cNvPr id="49" name="TextBox 48"/>
@@ -6077,7 +6656,7 @@
 </p:sld>
 </file>
 
-<file path=ppt/slides/slide6.xml><?xml version="1.0" encoding="utf-8"?>
+<file path=ppt/slides/slide8.xml><?xml version="1.0" encoding="utf-8"?>
 <p:sld xmlns:a="http://schemas.openxmlformats.org/drawingml/2006/main" xmlns:r="http://schemas.openxmlformats.org/officeDocument/2006/relationships" xmlns:p="http://schemas.openxmlformats.org/presentationml/2006/main">
   <p:cSld>
     <p:spTree>

</xml_diff>

<commit_message>
wink wink nudge: small changes.
</commit_message>
<xml_diff>
--- a/CSS2018/presentation/images/ImagesForPres.pptx
+++ b/CSS2018/presentation/images/ImagesForPres.pptx
@@ -251,7 +251,7 @@
           <a:p>
             <a:fld id="{D11E1260-BDD1-43CE-88D4-981C7FF86022}" type="datetimeFigureOut">
               <a:rPr lang="en-US" smtClean="0"/>
-              <a:t>2/21/2018</a:t>
+              <a:t>2/23/2018</a:t>
             </a:fld>
             <a:endParaRPr lang="en-US"/>
           </a:p>
@@ -419,7 +419,7 @@
           <a:p>
             <a:fld id="{D11E1260-BDD1-43CE-88D4-981C7FF86022}" type="datetimeFigureOut">
               <a:rPr lang="en-US" smtClean="0"/>
-              <a:t>2/21/2018</a:t>
+              <a:t>2/23/2018</a:t>
             </a:fld>
             <a:endParaRPr lang="en-US"/>
           </a:p>
@@ -597,7 +597,7 @@
           <a:p>
             <a:fld id="{D11E1260-BDD1-43CE-88D4-981C7FF86022}" type="datetimeFigureOut">
               <a:rPr lang="en-US" smtClean="0"/>
-              <a:t>2/21/2018</a:t>
+              <a:t>2/23/2018</a:t>
             </a:fld>
             <a:endParaRPr lang="en-US"/>
           </a:p>
@@ -765,7 +765,7 @@
           <a:p>
             <a:fld id="{D11E1260-BDD1-43CE-88D4-981C7FF86022}" type="datetimeFigureOut">
               <a:rPr lang="en-US" smtClean="0"/>
-              <a:t>2/21/2018</a:t>
+              <a:t>2/23/2018</a:t>
             </a:fld>
             <a:endParaRPr lang="en-US"/>
           </a:p>
@@ -1010,7 +1010,7 @@
           <a:p>
             <a:fld id="{D11E1260-BDD1-43CE-88D4-981C7FF86022}" type="datetimeFigureOut">
               <a:rPr lang="en-US" smtClean="0"/>
-              <a:t>2/21/2018</a:t>
+              <a:t>2/23/2018</a:t>
             </a:fld>
             <a:endParaRPr lang="en-US"/>
           </a:p>
@@ -1239,7 +1239,7 @@
           <a:p>
             <a:fld id="{D11E1260-BDD1-43CE-88D4-981C7FF86022}" type="datetimeFigureOut">
               <a:rPr lang="en-US" smtClean="0"/>
-              <a:t>2/21/2018</a:t>
+              <a:t>2/23/2018</a:t>
             </a:fld>
             <a:endParaRPr lang="en-US"/>
           </a:p>
@@ -1603,7 +1603,7 @@
           <a:p>
             <a:fld id="{D11E1260-BDD1-43CE-88D4-981C7FF86022}" type="datetimeFigureOut">
               <a:rPr lang="en-US" smtClean="0"/>
-              <a:t>2/21/2018</a:t>
+              <a:t>2/23/2018</a:t>
             </a:fld>
             <a:endParaRPr lang="en-US"/>
           </a:p>
@@ -1720,7 +1720,7 @@
           <a:p>
             <a:fld id="{D11E1260-BDD1-43CE-88D4-981C7FF86022}" type="datetimeFigureOut">
               <a:rPr lang="en-US" smtClean="0"/>
-              <a:t>2/21/2018</a:t>
+              <a:t>2/23/2018</a:t>
             </a:fld>
             <a:endParaRPr lang="en-US"/>
           </a:p>
@@ -1815,7 +1815,7 @@
           <a:p>
             <a:fld id="{D11E1260-BDD1-43CE-88D4-981C7FF86022}" type="datetimeFigureOut">
               <a:rPr lang="en-US" smtClean="0"/>
-              <a:t>2/21/2018</a:t>
+              <a:t>2/23/2018</a:t>
             </a:fld>
             <a:endParaRPr lang="en-US"/>
           </a:p>
@@ -2090,7 +2090,7 @@
           <a:p>
             <a:fld id="{D11E1260-BDD1-43CE-88D4-981C7FF86022}" type="datetimeFigureOut">
               <a:rPr lang="en-US" smtClean="0"/>
-              <a:t>2/21/2018</a:t>
+              <a:t>2/23/2018</a:t>
             </a:fld>
             <a:endParaRPr lang="en-US"/>
           </a:p>
@@ -2342,7 +2342,7 @@
           <a:p>
             <a:fld id="{D11E1260-BDD1-43CE-88D4-981C7FF86022}" type="datetimeFigureOut">
               <a:rPr lang="en-US" smtClean="0"/>
-              <a:t>2/21/2018</a:t>
+              <a:t>2/23/2018</a:t>
             </a:fld>
             <a:endParaRPr lang="en-US"/>
           </a:p>
@@ -2553,7 +2553,7 @@
           <a:p>
             <a:fld id="{D11E1260-BDD1-43CE-88D4-981C7FF86022}" type="datetimeFigureOut">
               <a:rPr lang="en-US" smtClean="0"/>
-              <a:t>2/21/2018</a:t>
+              <a:t>2/23/2018</a:t>
             </a:fld>
             <a:endParaRPr lang="en-US"/>
           </a:p>
@@ -5591,10 +5591,6 @@
               </a:rPr>
               <a:t>.</a:t>
             </a:r>
-            <a:endParaRPr lang="en-US" dirty="0">
-              <a:latin typeface="Courier New" panose="02070309020205020404" pitchFamily="49" charset="0"/>
-              <a:cs typeface="Courier New" panose="02070309020205020404" pitchFamily="49" charset="0"/>
-            </a:endParaRPr>
           </a:p>
         </p:txBody>
       </p:sp>
@@ -6907,7 +6903,7 @@
           <a:lstStyle/>
           <a:p>
             <a:r>
-              <a:rPr lang="en-US" dirty="0" err="1">
+              <a:rPr lang="en-US" dirty="0">
                 <a:solidFill>
                   <a:schemeClr val="accent2">
                     <a:lumMod val="75000"/>
@@ -6916,13 +6912,6 @@
               </a:rPr>
               <a:t>ncit:study</a:t>
             </a:r>
-            <a:endParaRPr lang="en-US" dirty="0">
-              <a:solidFill>
-                <a:schemeClr val="accent2">
-                  <a:lumMod val="75000"/>
-                </a:schemeClr>
-              </a:solidFill>
-            </a:endParaRPr>
           </a:p>
         </p:txBody>
       </p:sp>
@@ -7484,7 +7473,7 @@
           <a:lstStyle/>
           <a:p>
             <a:r>
-              <a:rPr lang="en-US" dirty="0" err="1">
+              <a:rPr lang="en-US" dirty="0">
                 <a:solidFill>
                   <a:schemeClr val="accent2">
                     <a:lumMod val="75000"/>
@@ -7493,13 +7482,6 @@
               </a:rPr>
               <a:t>ncit:study</a:t>
             </a:r>
-            <a:endParaRPr lang="en-US" dirty="0">
-              <a:solidFill>
-                <a:schemeClr val="accent2">
-                  <a:lumMod val="75000"/>
-                </a:schemeClr>
-              </a:solidFill>
-            </a:endParaRPr>
           </a:p>
         </p:txBody>
       </p:sp>

</xml_diff>

<commit_message>
added review section for graph
</commit_message>
<xml_diff>
--- a/CSS2018/presentation/images/ImagesForPres.pptx
+++ b/CSS2018/presentation/images/ImagesForPres.pptx
@@ -15,7 +15,8 @@
     <p:sldId id="260" r:id="rId9"/>
     <p:sldId id="257" r:id="rId10"/>
     <p:sldId id="259" r:id="rId11"/>
-    <p:sldId id="262" r:id="rId12"/>
+    <p:sldId id="268" r:id="rId12"/>
+    <p:sldId id="262" r:id="rId13"/>
   </p:sldIdLst>
   <p:sldSz cx="12192000" cy="6858000"/>
   <p:notesSz cx="6858000" cy="9144000"/>
@@ -251,7 +252,7 @@
           <a:p>
             <a:fld id="{D11E1260-BDD1-43CE-88D4-981C7FF86022}" type="datetimeFigureOut">
               <a:rPr lang="en-US" smtClean="0"/>
-              <a:t>2/23/2018</a:t>
+              <a:t>2/24/2018</a:t>
             </a:fld>
             <a:endParaRPr lang="en-US"/>
           </a:p>
@@ -419,7 +420,7 @@
           <a:p>
             <a:fld id="{D11E1260-BDD1-43CE-88D4-981C7FF86022}" type="datetimeFigureOut">
               <a:rPr lang="en-US" smtClean="0"/>
-              <a:t>2/23/2018</a:t>
+              <a:t>2/24/2018</a:t>
             </a:fld>
             <a:endParaRPr lang="en-US"/>
           </a:p>
@@ -597,7 +598,7 @@
           <a:p>
             <a:fld id="{D11E1260-BDD1-43CE-88D4-981C7FF86022}" type="datetimeFigureOut">
               <a:rPr lang="en-US" smtClean="0"/>
-              <a:t>2/23/2018</a:t>
+              <a:t>2/24/2018</a:t>
             </a:fld>
             <a:endParaRPr lang="en-US"/>
           </a:p>
@@ -765,7 +766,7 @@
           <a:p>
             <a:fld id="{D11E1260-BDD1-43CE-88D4-981C7FF86022}" type="datetimeFigureOut">
               <a:rPr lang="en-US" smtClean="0"/>
-              <a:t>2/23/2018</a:t>
+              <a:t>2/24/2018</a:t>
             </a:fld>
             <a:endParaRPr lang="en-US"/>
           </a:p>
@@ -1010,7 +1011,7 @@
           <a:p>
             <a:fld id="{D11E1260-BDD1-43CE-88D4-981C7FF86022}" type="datetimeFigureOut">
               <a:rPr lang="en-US" smtClean="0"/>
-              <a:t>2/23/2018</a:t>
+              <a:t>2/24/2018</a:t>
             </a:fld>
             <a:endParaRPr lang="en-US"/>
           </a:p>
@@ -1239,7 +1240,7 @@
           <a:p>
             <a:fld id="{D11E1260-BDD1-43CE-88D4-981C7FF86022}" type="datetimeFigureOut">
               <a:rPr lang="en-US" smtClean="0"/>
-              <a:t>2/23/2018</a:t>
+              <a:t>2/24/2018</a:t>
             </a:fld>
             <a:endParaRPr lang="en-US"/>
           </a:p>
@@ -1603,7 +1604,7 @@
           <a:p>
             <a:fld id="{D11E1260-BDD1-43CE-88D4-981C7FF86022}" type="datetimeFigureOut">
               <a:rPr lang="en-US" smtClean="0"/>
-              <a:t>2/23/2018</a:t>
+              <a:t>2/24/2018</a:t>
             </a:fld>
             <a:endParaRPr lang="en-US"/>
           </a:p>
@@ -1720,7 +1721,7 @@
           <a:p>
             <a:fld id="{D11E1260-BDD1-43CE-88D4-981C7FF86022}" type="datetimeFigureOut">
               <a:rPr lang="en-US" smtClean="0"/>
-              <a:t>2/23/2018</a:t>
+              <a:t>2/24/2018</a:t>
             </a:fld>
             <a:endParaRPr lang="en-US"/>
           </a:p>
@@ -1815,7 +1816,7 @@
           <a:p>
             <a:fld id="{D11E1260-BDD1-43CE-88D4-981C7FF86022}" type="datetimeFigureOut">
               <a:rPr lang="en-US" smtClean="0"/>
-              <a:t>2/23/2018</a:t>
+              <a:t>2/24/2018</a:t>
             </a:fld>
             <a:endParaRPr lang="en-US"/>
           </a:p>
@@ -2090,7 +2091,7 @@
           <a:p>
             <a:fld id="{D11E1260-BDD1-43CE-88D4-981C7FF86022}" type="datetimeFigureOut">
               <a:rPr lang="en-US" smtClean="0"/>
-              <a:t>2/23/2018</a:t>
+              <a:t>2/24/2018</a:t>
             </a:fld>
             <a:endParaRPr lang="en-US"/>
           </a:p>
@@ -2342,7 +2343,7 @@
           <a:p>
             <a:fld id="{D11E1260-BDD1-43CE-88D4-981C7FF86022}" type="datetimeFigureOut">
               <a:rPr lang="en-US" smtClean="0"/>
-              <a:t>2/23/2018</a:t>
+              <a:t>2/24/2018</a:t>
             </a:fld>
             <a:endParaRPr lang="en-US"/>
           </a:p>
@@ -2553,7 +2554,7 @@
           <a:p>
             <a:fld id="{D11E1260-BDD1-43CE-88D4-981C7FF86022}" type="datetimeFigureOut">
               <a:rPr lang="en-US" smtClean="0"/>
-              <a:t>2/23/2018</a:t>
+              <a:t>2/24/2018</a:t>
             </a:fld>
             <a:endParaRPr lang="en-US"/>
           </a:p>
@@ -3764,26 +3765,954 @@
       </p:grpSpPr>
       <p:sp>
         <p:nvSpPr>
-          <p:cNvPr id="2" name="Title 1"/>
-          <p:cNvSpPr>
-            <a:spLocks noGrp="1"/>
-          </p:cNvSpPr>
-          <p:nvPr>
-            <p:ph type="title"/>
-          </p:nvPr>
-        </p:nvSpPr>
-        <p:spPr/>
-        <p:txBody>
-          <a:bodyPr/>
-          <a:lstStyle/>
-          <a:p>
-            <a:r>
-              <a:rPr lang="en-US" dirty="0"/>
-              <a:t>OLDE SLIDES</a:t>
-            </a:r>
-          </a:p>
-        </p:txBody>
-      </p:sp>
+          <p:cNvPr id="4" name="Rectangle: Rounded Corners 3"/>
+          <p:cNvSpPr/>
+          <p:nvPr/>
+        </p:nvSpPr>
+        <p:spPr>
+          <a:xfrm>
+            <a:off x="5559013" y="342649"/>
+            <a:ext cx="2103064" cy="365721"/>
+          </a:xfrm>
+          <a:prstGeom prst="roundRect">
+            <a:avLst/>
+          </a:prstGeom>
+          <a:solidFill>
+            <a:schemeClr val="accent6">
+              <a:lumMod val="40000"/>
+              <a:lumOff val="60000"/>
+            </a:schemeClr>
+          </a:solidFill>
+          <a:ln>
+            <a:solidFill>
+              <a:schemeClr val="tx1"/>
+            </a:solidFill>
+          </a:ln>
+        </p:spPr>
+        <p:style>
+          <a:lnRef idx="2">
+            <a:schemeClr val="accent1">
+              <a:shade val="50000"/>
+            </a:schemeClr>
+          </a:lnRef>
+          <a:fillRef idx="1">
+            <a:schemeClr val="accent1"/>
+          </a:fillRef>
+          <a:effectRef idx="0">
+            <a:schemeClr val="accent1"/>
+          </a:effectRef>
+          <a:fontRef idx="minor">
+            <a:schemeClr val="lt1"/>
+          </a:fontRef>
+        </p:style>
+        <p:txBody>
+          <a:bodyPr rtlCol="0" anchor="ctr"/>
+          <a:lstStyle/>
+          <a:p>
+            <a:pPr algn="ctr"/>
+            <a:r>
+              <a:rPr lang="en-US" b="1" dirty="0">
+                <a:solidFill>
+                  <a:schemeClr val="tx1"/>
+                </a:solidFill>
+              </a:rPr>
+              <a:t>eg:Drug1</a:t>
+            </a:r>
+          </a:p>
+        </p:txBody>
+      </p:sp>
+      <p:sp>
+        <p:nvSpPr>
+          <p:cNvPr id="11" name="Rectangle: Rounded Corners 10"/>
+          <p:cNvSpPr/>
+          <p:nvPr/>
+        </p:nvSpPr>
+        <p:spPr>
+          <a:xfrm>
+            <a:off x="9549416" y="365362"/>
+            <a:ext cx="2103064" cy="365721"/>
+          </a:xfrm>
+          <a:prstGeom prst="roundRect">
+            <a:avLst/>
+          </a:prstGeom>
+          <a:solidFill>
+            <a:schemeClr val="accent6">
+              <a:lumMod val="40000"/>
+              <a:lumOff val="60000"/>
+            </a:schemeClr>
+          </a:solidFill>
+          <a:ln>
+            <a:solidFill>
+              <a:schemeClr val="tx1"/>
+            </a:solidFill>
+          </a:ln>
+        </p:spPr>
+        <p:style>
+          <a:lnRef idx="2">
+            <a:schemeClr val="accent1">
+              <a:shade val="50000"/>
+            </a:schemeClr>
+          </a:lnRef>
+          <a:fillRef idx="1">
+            <a:schemeClr val="accent1"/>
+          </a:fillRef>
+          <a:effectRef idx="0">
+            <a:schemeClr val="accent1"/>
+          </a:effectRef>
+          <a:fontRef idx="minor">
+            <a:schemeClr val="lt1"/>
+          </a:fontRef>
+        </p:style>
+        <p:txBody>
+          <a:bodyPr rtlCol="0" anchor="ctr"/>
+          <a:lstStyle/>
+          <a:p>
+            <a:pPr algn="ctr"/>
+            <a:r>
+              <a:rPr lang="en-US" b="1" dirty="0" err="1">
+                <a:solidFill>
+                  <a:schemeClr val="tx1"/>
+                </a:solidFill>
+              </a:rPr>
+              <a:t>eg:Study</a:t>
+            </a:r>
+            <a:r>
+              <a:rPr lang="en-US" b="1" dirty="0">
+                <a:solidFill>
+                  <a:schemeClr val="tx1"/>
+                </a:solidFill>
+                <a:highlight>
+                  <a:srgbClr val="FFFF00"/>
+                </a:highlight>
+              </a:rPr>
+              <a:t>(n)</a:t>
+            </a:r>
+          </a:p>
+        </p:txBody>
+      </p:sp>
+      <p:cxnSp>
+        <p:nvCxnSpPr>
+          <p:cNvPr id="6" name="Straight Arrow Connector 5"/>
+          <p:cNvCxnSpPr>
+            <a:stCxn id="4" idx="3"/>
+            <a:endCxn id="11" idx="1"/>
+          </p:cNvCxnSpPr>
+          <p:nvPr/>
+        </p:nvCxnSpPr>
+        <p:spPr>
+          <a:xfrm>
+            <a:off x="7662077" y="525510"/>
+            <a:ext cx="1887339" cy="22713"/>
+          </a:xfrm>
+          <a:prstGeom prst="straightConnector1">
+            <a:avLst/>
+          </a:prstGeom>
+          <a:ln w="50800">
+            <a:solidFill>
+              <a:schemeClr val="bg1">
+                <a:lumMod val="50000"/>
+              </a:schemeClr>
+            </a:solidFill>
+            <a:tailEnd type="triangle"/>
+          </a:ln>
+        </p:spPr>
+        <p:style>
+          <a:lnRef idx="1">
+            <a:schemeClr val="accent1"/>
+          </a:lnRef>
+          <a:fillRef idx="0">
+            <a:schemeClr val="accent1"/>
+          </a:fillRef>
+          <a:effectRef idx="0">
+            <a:schemeClr val="accent1"/>
+          </a:effectRef>
+          <a:fontRef idx="minor">
+            <a:schemeClr val="tx1"/>
+          </a:fontRef>
+        </p:style>
+      </p:cxnSp>
+      <p:sp>
+        <p:nvSpPr>
+          <p:cNvPr id="7" name="TextBox 6"/>
+          <p:cNvSpPr txBox="1"/>
+          <p:nvPr/>
+        </p:nvSpPr>
+        <p:spPr>
+          <a:xfrm>
+            <a:off x="7728413" y="178890"/>
+            <a:ext cx="2872535" cy="369332"/>
+          </a:xfrm>
+          <a:prstGeom prst="rect">
+            <a:avLst/>
+          </a:prstGeom>
+          <a:noFill/>
+        </p:spPr>
+        <p:txBody>
+          <a:bodyPr wrap="square" rtlCol="0">
+            <a:spAutoFit/>
+          </a:bodyPr>
+          <a:lstStyle/>
+          <a:p>
+            <a:r>
+              <a:rPr lang="en-US" dirty="0">
+                <a:solidFill>
+                  <a:schemeClr val="accent2">
+                    <a:lumMod val="75000"/>
+                  </a:schemeClr>
+                </a:solidFill>
+              </a:rPr>
+              <a:t>ncit:study</a:t>
+            </a:r>
+          </a:p>
+        </p:txBody>
+      </p:sp>
+      <p:sp>
+        <p:nvSpPr>
+          <p:cNvPr id="8" name="Rectangle: Rounded Corners 7"/>
+          <p:cNvSpPr/>
+          <p:nvPr/>
+        </p:nvSpPr>
+        <p:spPr>
+          <a:xfrm>
+            <a:off x="9549416" y="1316181"/>
+            <a:ext cx="2103064" cy="365721"/>
+          </a:xfrm>
+          <a:prstGeom prst="roundRect">
+            <a:avLst/>
+          </a:prstGeom>
+          <a:solidFill>
+            <a:schemeClr val="accent6">
+              <a:lumMod val="40000"/>
+              <a:lumOff val="60000"/>
+            </a:schemeClr>
+          </a:solidFill>
+          <a:ln>
+            <a:solidFill>
+              <a:schemeClr val="tx1"/>
+            </a:solidFill>
+          </a:ln>
+        </p:spPr>
+        <p:style>
+          <a:lnRef idx="2">
+            <a:schemeClr val="accent1">
+              <a:shade val="50000"/>
+            </a:schemeClr>
+          </a:lnRef>
+          <a:fillRef idx="1">
+            <a:schemeClr val="accent1"/>
+          </a:fillRef>
+          <a:effectRef idx="0">
+            <a:schemeClr val="accent1"/>
+          </a:effectRef>
+          <a:fontRef idx="minor">
+            <a:schemeClr val="lt1"/>
+          </a:fontRef>
+        </p:style>
+        <p:txBody>
+          <a:bodyPr rtlCol="0" anchor="ctr"/>
+          <a:lstStyle/>
+          <a:p>
+            <a:pPr algn="ctr"/>
+            <a:r>
+              <a:rPr lang="en-US" b="1" dirty="0" err="1">
+                <a:solidFill>
+                  <a:schemeClr val="tx1"/>
+                </a:solidFill>
+              </a:rPr>
+              <a:t>eg:Person</a:t>
+            </a:r>
+            <a:r>
+              <a:rPr lang="en-US" b="1" dirty="0">
+                <a:solidFill>
+                  <a:schemeClr val="tx1"/>
+                </a:solidFill>
+                <a:highlight>
+                  <a:srgbClr val="FFFF00"/>
+                </a:highlight>
+              </a:rPr>
+              <a:t>(n)</a:t>
+            </a:r>
+            <a:r>
+              <a:rPr lang="en-US" b="1" dirty="0">
+                <a:solidFill>
+                  <a:schemeClr val="tx1"/>
+                </a:solidFill>
+              </a:rPr>
+              <a:t>(n2)</a:t>
+            </a:r>
+          </a:p>
+        </p:txBody>
+      </p:sp>
+      <p:sp>
+        <p:nvSpPr>
+          <p:cNvPr id="13" name="Rectangle: Rounded Corners 12"/>
+          <p:cNvSpPr/>
+          <p:nvPr/>
+        </p:nvSpPr>
+        <p:spPr>
+          <a:xfrm>
+            <a:off x="9623158" y="2084139"/>
+            <a:ext cx="2103064" cy="365721"/>
+          </a:xfrm>
+          <a:prstGeom prst="roundRect">
+            <a:avLst/>
+          </a:prstGeom>
+          <a:solidFill>
+            <a:schemeClr val="accent6">
+              <a:lumMod val="40000"/>
+              <a:lumOff val="60000"/>
+            </a:schemeClr>
+          </a:solidFill>
+          <a:ln>
+            <a:solidFill>
+              <a:schemeClr val="tx1"/>
+            </a:solidFill>
+          </a:ln>
+        </p:spPr>
+        <p:style>
+          <a:lnRef idx="2">
+            <a:schemeClr val="accent1">
+              <a:shade val="50000"/>
+            </a:schemeClr>
+          </a:lnRef>
+          <a:fillRef idx="1">
+            <a:schemeClr val="accent1"/>
+          </a:fillRef>
+          <a:effectRef idx="0">
+            <a:schemeClr val="accent1"/>
+          </a:effectRef>
+          <a:fontRef idx="minor">
+            <a:schemeClr val="lt1"/>
+          </a:fontRef>
+        </p:style>
+        <p:txBody>
+          <a:bodyPr rtlCol="0" anchor="ctr"/>
+          <a:lstStyle/>
+          <a:p>
+            <a:pPr algn="ctr"/>
+            <a:r>
+              <a:rPr lang="en-US" b="1" dirty="0" err="1">
+                <a:solidFill>
+                  <a:schemeClr val="tx1"/>
+                </a:solidFill>
+              </a:rPr>
+              <a:t>eg:</a:t>
+            </a:r>
+            <a:r>
+              <a:rPr lang="en-US" b="1" dirty="0" err="1">
+                <a:solidFill>
+                  <a:schemeClr val="tx1"/>
+                </a:solidFill>
+                <a:highlight>
+                  <a:srgbClr val="FFFFCC"/>
+                </a:highlight>
+              </a:rPr>
+              <a:t>T</a:t>
+            </a:r>
+            <a:r>
+              <a:rPr lang="en-US" b="1" dirty="0" err="1">
+                <a:solidFill>
+                  <a:schemeClr val="tx1"/>
+                </a:solidFill>
+              </a:rPr>
+              <a:t>rt</a:t>
+            </a:r>
+            <a:r>
+              <a:rPr lang="en-US" b="1" dirty="0" err="1">
+                <a:solidFill>
+                  <a:schemeClr val="tx1"/>
+                </a:solidFill>
+                <a:highlight>
+                  <a:srgbClr val="FFFFCC"/>
+                </a:highlight>
+              </a:rPr>
+              <a:t>A</a:t>
+            </a:r>
+            <a:r>
+              <a:rPr lang="en-US" b="1" dirty="0" err="1">
+                <a:solidFill>
+                  <a:schemeClr val="tx1"/>
+                </a:solidFill>
+              </a:rPr>
+              <a:t>rm</a:t>
+            </a:r>
+            <a:r>
+              <a:rPr lang="en-US" b="1" dirty="0">
+                <a:solidFill>
+                  <a:schemeClr val="tx1"/>
+                </a:solidFill>
+                <a:highlight>
+                  <a:srgbClr val="FFFF00"/>
+                </a:highlight>
+              </a:rPr>
+              <a:t>(n)-</a:t>
+            </a:r>
+            <a:r>
+              <a:rPr lang="en-US" b="1" dirty="0">
+                <a:solidFill>
+                  <a:schemeClr val="tx1"/>
+                </a:solidFill>
+                <a:highlight>
+                  <a:srgbClr val="C0C0C0"/>
+                </a:highlight>
+              </a:rPr>
+              <a:t>&lt;1,2&gt;</a:t>
+            </a:r>
+          </a:p>
+        </p:txBody>
+      </p:sp>
+      <p:sp>
+        <p:nvSpPr>
+          <p:cNvPr id="16" name="TextBox 15"/>
+          <p:cNvSpPr txBox="1"/>
+          <p:nvPr/>
+        </p:nvSpPr>
+        <p:spPr>
+          <a:xfrm>
+            <a:off x="4429232" y="1027172"/>
+            <a:ext cx="995785" cy="461665"/>
+          </a:xfrm>
+          <a:prstGeom prst="rect">
+            <a:avLst/>
+          </a:prstGeom>
+          <a:noFill/>
+        </p:spPr>
+        <p:txBody>
+          <a:bodyPr wrap="none" rtlCol="0">
+            <a:spAutoFit/>
+          </a:bodyPr>
+          <a:lstStyle/>
+          <a:p>
+            <a:r>
+              <a:rPr lang="en-US" sz="2400" b="1" u="sng" dirty="0"/>
+              <a:t>Nodes</a:t>
+            </a:r>
+          </a:p>
+        </p:txBody>
+      </p:sp>
+      <p:sp>
+        <p:nvSpPr>
+          <p:cNvPr id="17" name="TextBox 16"/>
+          <p:cNvSpPr txBox="1"/>
+          <p:nvPr/>
+        </p:nvSpPr>
+        <p:spPr>
+          <a:xfrm>
+            <a:off x="348978" y="1333525"/>
+            <a:ext cx="2528256" cy="5109091"/>
+          </a:xfrm>
+          <a:prstGeom prst="rect">
+            <a:avLst/>
+          </a:prstGeom>
+          <a:noFill/>
+          <a:ln>
+            <a:solidFill>
+              <a:schemeClr val="accent1"/>
+            </a:solidFill>
+          </a:ln>
+        </p:spPr>
+        <p:txBody>
+          <a:bodyPr wrap="none" rtlCol="0">
+            <a:spAutoFit/>
+          </a:bodyPr>
+          <a:lstStyle/>
+          <a:p>
+            <a:pPr>
+              <a:spcBef>
+                <a:spcPts val="600"/>
+              </a:spcBef>
+              <a:spcAft>
+                <a:spcPts val="600"/>
+              </a:spcAft>
+            </a:pPr>
+            <a:r>
+              <a:rPr lang="en-US" dirty="0">
+                <a:latin typeface="Courier New" panose="02070309020205020404" pitchFamily="49" charset="0"/>
+                <a:cs typeface="Courier New" panose="02070309020205020404" pitchFamily="49" charset="0"/>
+              </a:rPr>
+              <a:t>eg:age</a:t>
+            </a:r>
+          </a:p>
+          <a:p>
+            <a:pPr>
+              <a:spcBef>
+                <a:spcPts val="600"/>
+              </a:spcBef>
+              <a:spcAft>
+                <a:spcPts val="600"/>
+              </a:spcAft>
+            </a:pPr>
+            <a:r>
+              <a:rPr lang="en-US" dirty="0" err="1">
+                <a:latin typeface="Courier New" panose="02070309020205020404" pitchFamily="49" charset="0"/>
+                <a:cs typeface="Courier New" panose="02070309020205020404" pitchFamily="49" charset="0"/>
+              </a:rPr>
+              <a:t>eg:</a:t>
+            </a:r>
+            <a:r>
+              <a:rPr lang="en-US" dirty="0" err="1">
+                <a:highlight>
+                  <a:srgbClr val="FFFF00"/>
+                </a:highlight>
+                <a:latin typeface="Courier New" panose="02070309020205020404" pitchFamily="49" charset="0"/>
+                <a:cs typeface="Courier New" panose="02070309020205020404" pitchFamily="49" charset="0"/>
+              </a:rPr>
+              <a:t>LDE</a:t>
+            </a:r>
+            <a:r>
+              <a:rPr lang="en-US" dirty="0" err="1">
+                <a:latin typeface="Courier New" panose="02070309020205020404" pitchFamily="49" charset="0"/>
+                <a:cs typeface="Courier New" panose="02070309020205020404" pitchFamily="49" charset="0"/>
+              </a:rPr>
+              <a:t>xpert</a:t>
+            </a:r>
+            <a:endParaRPr lang="en-US" dirty="0">
+              <a:latin typeface="Courier New" panose="02070309020205020404" pitchFamily="49" charset="0"/>
+              <a:cs typeface="Courier New" panose="02070309020205020404" pitchFamily="49" charset="0"/>
+            </a:endParaRPr>
+          </a:p>
+          <a:p>
+            <a:pPr>
+              <a:spcBef>
+                <a:spcPts val="600"/>
+              </a:spcBef>
+              <a:spcAft>
+                <a:spcPts val="600"/>
+              </a:spcAft>
+            </a:pPr>
+            <a:r>
+              <a:rPr lang="en-US" dirty="0" err="1">
+                <a:latin typeface="Courier New" panose="02070309020205020404" pitchFamily="49" charset="0"/>
+                <a:cs typeface="Courier New" panose="02070309020205020404" pitchFamily="49" charset="0"/>
+              </a:rPr>
+              <a:t>eg:participates</a:t>
+            </a:r>
+            <a:r>
+              <a:rPr lang="en-US" dirty="0" err="1">
+                <a:highlight>
+                  <a:srgbClr val="FFFF00"/>
+                </a:highlight>
+                <a:latin typeface="Courier New" panose="02070309020205020404" pitchFamily="49" charset="0"/>
+                <a:cs typeface="Courier New" panose="02070309020205020404" pitchFamily="49" charset="0"/>
+              </a:rPr>
+              <a:t>I</a:t>
+            </a:r>
+            <a:r>
+              <a:rPr lang="en-US" dirty="0" err="1">
+                <a:latin typeface="Courier New" panose="02070309020205020404" pitchFamily="49" charset="0"/>
+                <a:cs typeface="Courier New" panose="02070309020205020404" pitchFamily="49" charset="0"/>
+              </a:rPr>
+              <a:t>n</a:t>
+            </a:r>
+            <a:endParaRPr lang="en-US" dirty="0">
+              <a:latin typeface="Courier New" panose="02070309020205020404" pitchFamily="49" charset="0"/>
+              <a:cs typeface="Courier New" panose="02070309020205020404" pitchFamily="49" charset="0"/>
+            </a:endParaRPr>
+          </a:p>
+          <a:p>
+            <a:pPr>
+              <a:spcBef>
+                <a:spcPts val="600"/>
+              </a:spcBef>
+              <a:spcAft>
+                <a:spcPts val="600"/>
+              </a:spcAft>
+            </a:pPr>
+            <a:r>
+              <a:rPr lang="en-US" dirty="0" err="1">
+                <a:latin typeface="Courier New" panose="02070309020205020404" pitchFamily="49" charset="0"/>
+                <a:cs typeface="Courier New" panose="02070309020205020404" pitchFamily="49" charset="0"/>
+              </a:rPr>
+              <a:t>eg:randomized</a:t>
+            </a:r>
+            <a:r>
+              <a:rPr lang="en-US" dirty="0" err="1">
+                <a:highlight>
+                  <a:srgbClr val="FFFF00"/>
+                </a:highlight>
+                <a:latin typeface="Courier New" panose="02070309020205020404" pitchFamily="49" charset="0"/>
+                <a:cs typeface="Courier New" panose="02070309020205020404" pitchFamily="49" charset="0"/>
+              </a:rPr>
+              <a:t>T</a:t>
+            </a:r>
+            <a:r>
+              <a:rPr lang="en-US" dirty="0" err="1">
+                <a:latin typeface="Courier New" panose="02070309020205020404" pitchFamily="49" charset="0"/>
+                <a:cs typeface="Courier New" panose="02070309020205020404" pitchFamily="49" charset="0"/>
+              </a:rPr>
+              <a:t>o</a:t>
+            </a:r>
+            <a:endParaRPr lang="en-US" dirty="0">
+              <a:latin typeface="Courier New" panose="02070309020205020404" pitchFamily="49" charset="0"/>
+              <a:cs typeface="Courier New" panose="02070309020205020404" pitchFamily="49" charset="0"/>
+            </a:endParaRPr>
+          </a:p>
+          <a:p>
+            <a:pPr>
+              <a:spcBef>
+                <a:spcPts val="600"/>
+              </a:spcBef>
+              <a:spcAft>
+                <a:spcPts val="600"/>
+              </a:spcAft>
+            </a:pPr>
+            <a:r>
+              <a:rPr lang="en-US" dirty="0" err="1">
+                <a:latin typeface="Courier New" panose="02070309020205020404" pitchFamily="49" charset="0"/>
+                <a:cs typeface="Courier New" panose="02070309020205020404" pitchFamily="49" charset="0"/>
+              </a:rPr>
+              <a:t>eg:trt</a:t>
+            </a:r>
+            <a:r>
+              <a:rPr lang="en-US" dirty="0" err="1">
+                <a:highlight>
+                  <a:srgbClr val="FFFF00"/>
+                </a:highlight>
+                <a:latin typeface="Courier New" panose="02070309020205020404" pitchFamily="49" charset="0"/>
+                <a:cs typeface="Courier New" panose="02070309020205020404" pitchFamily="49" charset="0"/>
+              </a:rPr>
+              <a:t>A</a:t>
+            </a:r>
+            <a:r>
+              <a:rPr lang="en-US" dirty="0" err="1">
+                <a:latin typeface="Courier New" panose="02070309020205020404" pitchFamily="49" charset="0"/>
+                <a:cs typeface="Courier New" panose="02070309020205020404" pitchFamily="49" charset="0"/>
+              </a:rPr>
+              <a:t>rm</a:t>
+            </a:r>
+            <a:endParaRPr lang="en-US" dirty="0">
+              <a:latin typeface="Courier New" panose="02070309020205020404" pitchFamily="49" charset="0"/>
+              <a:cs typeface="Courier New" panose="02070309020205020404" pitchFamily="49" charset="0"/>
+            </a:endParaRPr>
+          </a:p>
+          <a:p>
+            <a:pPr>
+              <a:spcBef>
+                <a:spcPts val="600"/>
+              </a:spcBef>
+              <a:spcAft>
+                <a:spcPts val="600"/>
+              </a:spcAft>
+            </a:pPr>
+            <a:r>
+              <a:rPr lang="en-US" dirty="0" err="1">
+                <a:latin typeface="Courier New" panose="02070309020205020404" pitchFamily="49" charset="0"/>
+                <a:cs typeface="Courier New" panose="02070309020205020404" pitchFamily="49" charset="0"/>
+              </a:rPr>
+              <a:t>eg:trt</a:t>
+            </a:r>
+            <a:r>
+              <a:rPr lang="en-US" dirty="0" err="1">
+                <a:highlight>
+                  <a:srgbClr val="FFFF00"/>
+                </a:highlight>
+                <a:latin typeface="Courier New" panose="02070309020205020404" pitchFamily="49" charset="0"/>
+                <a:cs typeface="Courier New" panose="02070309020205020404" pitchFamily="49" charset="0"/>
+              </a:rPr>
+              <a:t>A</a:t>
+            </a:r>
+            <a:r>
+              <a:rPr lang="en-US" dirty="0" err="1">
+                <a:latin typeface="Courier New" panose="02070309020205020404" pitchFamily="49" charset="0"/>
+                <a:cs typeface="Courier New" panose="02070309020205020404" pitchFamily="49" charset="0"/>
+              </a:rPr>
+              <a:t>rm</a:t>
+            </a:r>
+            <a:r>
+              <a:rPr lang="en-US" dirty="0" err="1">
+                <a:highlight>
+                  <a:srgbClr val="FFFF00"/>
+                </a:highlight>
+                <a:latin typeface="Courier New" panose="02070309020205020404" pitchFamily="49" charset="0"/>
+                <a:cs typeface="Courier New" panose="02070309020205020404" pitchFamily="49" charset="0"/>
+              </a:rPr>
+              <a:t>T</a:t>
+            </a:r>
+            <a:r>
+              <a:rPr lang="en-US" dirty="0" err="1">
+                <a:latin typeface="Courier New" panose="02070309020205020404" pitchFamily="49" charset="0"/>
+                <a:cs typeface="Courier New" panose="02070309020205020404" pitchFamily="49" charset="0"/>
+              </a:rPr>
+              <a:t>ype</a:t>
+            </a:r>
+            <a:endParaRPr lang="en-US" dirty="0">
+              <a:latin typeface="Courier New" panose="02070309020205020404" pitchFamily="49" charset="0"/>
+              <a:cs typeface="Courier New" panose="02070309020205020404" pitchFamily="49" charset="0"/>
+            </a:endParaRPr>
+          </a:p>
+          <a:p>
+            <a:pPr>
+              <a:spcBef>
+                <a:spcPts val="600"/>
+              </a:spcBef>
+              <a:spcAft>
+                <a:spcPts val="600"/>
+              </a:spcAft>
+            </a:pPr>
+            <a:endParaRPr lang="en-US" dirty="0">
+              <a:latin typeface="Courier New" panose="02070309020205020404" pitchFamily="49" charset="0"/>
+              <a:cs typeface="Courier New" panose="02070309020205020404" pitchFamily="49" charset="0"/>
+            </a:endParaRPr>
+          </a:p>
+          <a:p>
+            <a:pPr>
+              <a:spcBef>
+                <a:spcPts val="600"/>
+              </a:spcBef>
+              <a:spcAft>
+                <a:spcPts val="600"/>
+              </a:spcAft>
+            </a:pPr>
+            <a:r>
+              <a:rPr lang="en-US" dirty="0" err="1">
+                <a:solidFill>
+                  <a:schemeClr val="accent2">
+                    <a:lumMod val="75000"/>
+                  </a:schemeClr>
+                </a:solidFill>
+                <a:latin typeface="Courier New" panose="02070309020205020404" pitchFamily="49" charset="0"/>
+                <a:cs typeface="Courier New" panose="02070309020205020404" pitchFamily="49" charset="0"/>
+              </a:rPr>
+              <a:t>ncit:gender</a:t>
+            </a:r>
+            <a:endParaRPr lang="en-US" dirty="0">
+              <a:solidFill>
+                <a:schemeClr val="accent2">
+                  <a:lumMod val="75000"/>
+                </a:schemeClr>
+              </a:solidFill>
+              <a:latin typeface="Courier New" panose="02070309020205020404" pitchFamily="49" charset="0"/>
+              <a:cs typeface="Courier New" panose="02070309020205020404" pitchFamily="49" charset="0"/>
+            </a:endParaRPr>
+          </a:p>
+          <a:p>
+            <a:pPr>
+              <a:spcBef>
+                <a:spcPts val="600"/>
+              </a:spcBef>
+              <a:spcAft>
+                <a:spcPts val="600"/>
+              </a:spcAft>
+            </a:pPr>
+            <a:r>
+              <a:rPr lang="en-US" dirty="0" err="1">
+                <a:solidFill>
+                  <a:schemeClr val="accent2">
+                    <a:lumMod val="75000"/>
+                  </a:schemeClr>
+                </a:solidFill>
+                <a:latin typeface="Courier New" panose="02070309020205020404" pitchFamily="49" charset="0"/>
+                <a:cs typeface="Courier New" panose="02070309020205020404" pitchFamily="49" charset="0"/>
+              </a:rPr>
+              <a:t>ncit:phase</a:t>
+            </a:r>
+            <a:endParaRPr lang="en-US" dirty="0">
+              <a:solidFill>
+                <a:schemeClr val="accent2">
+                  <a:lumMod val="75000"/>
+                </a:schemeClr>
+              </a:solidFill>
+              <a:latin typeface="Courier New" panose="02070309020205020404" pitchFamily="49" charset="0"/>
+              <a:cs typeface="Courier New" panose="02070309020205020404" pitchFamily="49" charset="0"/>
+            </a:endParaRPr>
+          </a:p>
+          <a:p>
+            <a:pPr>
+              <a:spcBef>
+                <a:spcPts val="600"/>
+              </a:spcBef>
+              <a:spcAft>
+                <a:spcPts val="600"/>
+              </a:spcAft>
+            </a:pPr>
+            <a:r>
+              <a:rPr lang="en-US" dirty="0" err="1">
+                <a:solidFill>
+                  <a:schemeClr val="accent2">
+                    <a:lumMod val="75000"/>
+                  </a:schemeClr>
+                </a:solidFill>
+                <a:latin typeface="Courier New" panose="02070309020205020404" pitchFamily="49" charset="0"/>
+                <a:cs typeface="Courier New" panose="02070309020205020404" pitchFamily="49" charset="0"/>
+              </a:rPr>
+              <a:t>ncit:study</a:t>
+            </a:r>
+            <a:endParaRPr lang="en-US" dirty="0">
+              <a:solidFill>
+                <a:schemeClr val="accent2">
+                  <a:lumMod val="75000"/>
+                </a:schemeClr>
+              </a:solidFill>
+              <a:latin typeface="Courier New" panose="02070309020205020404" pitchFamily="49" charset="0"/>
+              <a:cs typeface="Courier New" panose="02070309020205020404" pitchFamily="49" charset="0"/>
+            </a:endParaRPr>
+          </a:p>
+          <a:p>
+            <a:pPr>
+              <a:spcBef>
+                <a:spcPts val="600"/>
+              </a:spcBef>
+              <a:spcAft>
+                <a:spcPts val="600"/>
+              </a:spcAft>
+            </a:pPr>
+            <a:endParaRPr lang="en-US" dirty="0">
+              <a:latin typeface="Courier New" panose="02070309020205020404" pitchFamily="49" charset="0"/>
+              <a:cs typeface="Courier New" panose="02070309020205020404" pitchFamily="49" charset="0"/>
+            </a:endParaRPr>
+          </a:p>
+          <a:p>
+            <a:pPr>
+              <a:spcBef>
+                <a:spcPts val="600"/>
+              </a:spcBef>
+              <a:spcAft>
+                <a:spcPts val="600"/>
+              </a:spcAft>
+            </a:pPr>
+            <a:r>
+              <a:rPr lang="en-US" dirty="0" err="1">
+                <a:solidFill>
+                  <a:schemeClr val="accent2">
+                    <a:lumMod val="75000"/>
+                  </a:schemeClr>
+                </a:solidFill>
+                <a:latin typeface="Courier New" panose="02070309020205020404" pitchFamily="49" charset="0"/>
+                <a:cs typeface="Courier New" panose="02070309020205020404" pitchFamily="49" charset="0"/>
+              </a:rPr>
+              <a:t>schema:given</a:t>
+            </a:r>
+            <a:r>
+              <a:rPr lang="en-US" dirty="0" err="1">
+                <a:solidFill>
+                  <a:schemeClr val="accent2">
+                    <a:lumMod val="75000"/>
+                  </a:schemeClr>
+                </a:solidFill>
+                <a:highlight>
+                  <a:srgbClr val="FFFF00"/>
+                </a:highlight>
+                <a:latin typeface="Courier New" panose="02070309020205020404" pitchFamily="49" charset="0"/>
+                <a:cs typeface="Courier New" panose="02070309020205020404" pitchFamily="49" charset="0"/>
+              </a:rPr>
+              <a:t>N</a:t>
+            </a:r>
+            <a:r>
+              <a:rPr lang="en-US" dirty="0" err="1">
+                <a:solidFill>
+                  <a:schemeClr val="accent2">
+                    <a:lumMod val="75000"/>
+                  </a:schemeClr>
+                </a:solidFill>
+                <a:latin typeface="Courier New" panose="02070309020205020404" pitchFamily="49" charset="0"/>
+                <a:cs typeface="Courier New" panose="02070309020205020404" pitchFamily="49" charset="0"/>
+              </a:rPr>
+              <a:t>ame</a:t>
+            </a:r>
+            <a:endParaRPr lang="en-US" dirty="0">
+              <a:solidFill>
+                <a:schemeClr val="accent2">
+                  <a:lumMod val="75000"/>
+                </a:schemeClr>
+              </a:solidFill>
+              <a:latin typeface="Courier New" panose="02070309020205020404" pitchFamily="49" charset="0"/>
+              <a:cs typeface="Courier New" panose="02070309020205020404" pitchFamily="49" charset="0"/>
+            </a:endParaRPr>
+          </a:p>
+        </p:txBody>
+      </p:sp>
+      <p:sp>
+        <p:nvSpPr>
+          <p:cNvPr id="18" name="TextBox 17"/>
+          <p:cNvSpPr txBox="1"/>
+          <p:nvPr/>
+        </p:nvSpPr>
+        <p:spPr>
+          <a:xfrm>
+            <a:off x="477318" y="868416"/>
+            <a:ext cx="823302" cy="461665"/>
+          </a:xfrm>
+          <a:prstGeom prst="rect">
+            <a:avLst/>
+          </a:prstGeom>
+          <a:noFill/>
+        </p:spPr>
+        <p:txBody>
+          <a:bodyPr wrap="none" rtlCol="0">
+            <a:spAutoFit/>
+          </a:bodyPr>
+          <a:lstStyle/>
+          <a:p>
+            <a:r>
+              <a:rPr lang="en-US" sz="2400" b="1" u="sng" dirty="0"/>
+              <a:t>Links</a:t>
+            </a:r>
+          </a:p>
+        </p:txBody>
+      </p:sp>
+      <p:sp>
+        <p:nvSpPr>
+          <p:cNvPr id="19" name="TextBox 18"/>
+          <p:cNvSpPr txBox="1"/>
+          <p:nvPr/>
+        </p:nvSpPr>
+        <p:spPr>
+          <a:xfrm>
+            <a:off x="237616" y="178890"/>
+            <a:ext cx="2448427" cy="461665"/>
+          </a:xfrm>
+          <a:prstGeom prst="rect">
+            <a:avLst/>
+          </a:prstGeom>
+          <a:noFill/>
+        </p:spPr>
+        <p:txBody>
+          <a:bodyPr wrap="none" rtlCol="0">
+            <a:spAutoFit/>
+          </a:bodyPr>
+          <a:lstStyle/>
+          <a:p>
+            <a:r>
+              <a:rPr lang="en-US" sz="2400" dirty="0">
+                <a:solidFill>
+                  <a:srgbClr val="0070C0"/>
+                </a:solidFill>
+              </a:rPr>
+              <a:t>GRAPH QC Checks</a:t>
+            </a:r>
+          </a:p>
+        </p:txBody>
+      </p:sp>
+    </p:spTree>
+    <p:extLst>
+      <p:ext uri="{BB962C8B-B14F-4D97-AF65-F5344CB8AC3E}">
+        <p14:creationId xmlns:p14="http://schemas.microsoft.com/office/powerpoint/2010/main" val="1530084632"/>
+      </p:ext>
+    </p:extLst>
+  </p:cSld>
+  <p:clrMapOvr>
+    <a:masterClrMapping/>
+  </p:clrMapOvr>
+</p:sld>
+</file>
+
+<file path=ppt/slides/slide12.xml><?xml version="1.0" encoding="utf-8"?>
+<p:sld xmlns:a="http://schemas.openxmlformats.org/drawingml/2006/main" xmlns:r="http://schemas.openxmlformats.org/officeDocument/2006/relationships" xmlns:p="http://schemas.openxmlformats.org/presentationml/2006/main">
+  <p:cSld>
+    <p:spTree>
+      <p:nvGrpSpPr>
+        <p:cNvPr id="1" name=""/>
+        <p:cNvGrpSpPr/>
+        <p:nvPr/>
+      </p:nvGrpSpPr>
+      <p:grpSpPr>
+        <a:xfrm>
+          <a:off x="0" y="0"/>
+          <a:ext cx="0" cy="0"/>
+          <a:chOff x="0" y="0"/>
+          <a:chExt cx="0" cy="0"/>
+        </a:xfrm>
+      </p:grpSpPr>
     </p:spTree>
     <p:extLst>
       <p:ext uri="{BB962C8B-B14F-4D97-AF65-F5344CB8AC3E}">

</xml_diff>

<commit_message>
Naming case and number guidance
</commit_message>
<xml_diff>
--- a/CSS2018/presentation/images/ImagesForPres.pptx
+++ b/CSS2018/presentation/images/ImagesForPres.pptx
@@ -4366,6 +4366,1610 @@
           <a:chExt cx="0" cy="0"/>
         </a:xfrm>
       </p:grpSpPr>
+      <p:graphicFrame>
+        <p:nvGraphicFramePr>
+          <p:cNvPr id="5" name="Table 4"/>
+          <p:cNvGraphicFramePr>
+            <a:graphicFrameLocks noGrp="1"/>
+          </p:cNvGraphicFramePr>
+          <p:nvPr>
+            <p:extLst>
+              <p:ext uri="{D42A27DB-BD31-4B8C-83A1-F6EECF244321}">
+                <p14:modId xmlns:p14="http://schemas.microsoft.com/office/powerpoint/2010/main" val="4016803413"/>
+              </p:ext>
+            </p:extLst>
+          </p:nvPr>
+        </p:nvGraphicFramePr>
+        <p:xfrm>
+          <a:off x="865632" y="1224122"/>
+          <a:ext cx="2584704" cy="4468179"/>
+        </p:xfrm>
+        <a:graphic>
+          <a:graphicData uri="http://schemas.openxmlformats.org/drawingml/2006/table">
+            <a:tbl>
+              <a:tblPr firstRow="1" firstCol="1" bandRow="1">
+                <a:tableStyleId>{5C22544A-7EE6-4342-B048-85BDC9FD1C3A}</a:tableStyleId>
+              </a:tblPr>
+              <a:tblGrid>
+                <a:gridCol w="2584704">
+                  <a:extLst>
+                    <a:ext uri="{9D8B030D-6E8A-4147-A177-3AD203B41FA5}">
+                      <a16:colId xmlns:a16="http://schemas.microsoft.com/office/drawing/2014/main" val="1988749366"/>
+                    </a:ext>
+                  </a:extLst>
+                </a:gridCol>
+              </a:tblGrid>
+              <a:tr h="476706">
+                <a:tc>
+                  <a:txBody>
+                    <a:bodyPr/>
+                    <a:lstStyle/>
+                    <a:p>
+                      <a:pPr marL="0" marR="0">
+                        <a:lnSpc>
+                          <a:spcPct val="115000"/>
+                        </a:lnSpc>
+                        <a:spcBef>
+                          <a:spcPts val="0"/>
+                        </a:spcBef>
+                        <a:spcAft>
+                          <a:spcPts val="0"/>
+                        </a:spcAft>
+                      </a:pPr>
+                      <a:r>
+                        <a:rPr lang="en-US" sz="2900" dirty="0">
+                          <a:solidFill>
+                            <a:srgbClr val="0070C0"/>
+                          </a:solidFill>
+                          <a:effectLst/>
+                        </a:rPr>
+                        <a:t>NODES</a:t>
+                      </a:r>
+                      <a:endParaRPr lang="en-US" sz="2300" dirty="0">
+                        <a:solidFill>
+                          <a:srgbClr val="0070C0"/>
+                        </a:solidFill>
+                        <a:effectLst/>
+                        <a:latin typeface="Calibri" panose="020F0502020204030204" pitchFamily="34" charset="0"/>
+                        <a:ea typeface="Calibri" panose="020F0502020204030204" pitchFamily="34" charset="0"/>
+                        <a:cs typeface="Calibri" panose="020F0502020204030204" pitchFamily="34" charset="0"/>
+                      </a:endParaRPr>
+                    </a:p>
+                  </a:txBody>
+                  <a:tcPr marL="141557" marR="141557" marT="0" marB="0">
+                    <a:solidFill>
+                      <a:schemeClr val="bg1"/>
+                    </a:solidFill>
+                  </a:tcPr>
+                </a:tc>
+                <a:extLst>
+                  <a:ext uri="{0D108BD9-81ED-4DB2-BD59-A6C34878D82A}">
+                    <a16:rowId xmlns:a16="http://schemas.microsoft.com/office/drawing/2014/main" val="4013321353"/>
+                  </a:ext>
+                </a:extLst>
+              </a:tr>
+              <a:tr h="374601">
+                <a:tc>
+                  <a:txBody>
+                    <a:bodyPr/>
+                    <a:lstStyle/>
+                    <a:p>
+                      <a:pPr marL="0" marR="0">
+                        <a:lnSpc>
+                          <a:spcPct val="115000"/>
+                        </a:lnSpc>
+                        <a:spcBef>
+                          <a:spcPts val="0"/>
+                        </a:spcBef>
+                        <a:spcAft>
+                          <a:spcPts val="0"/>
+                        </a:spcAft>
+                      </a:pPr>
+                      <a:r>
+                        <a:rPr lang="en-US" sz="2300" dirty="0" err="1">
+                          <a:solidFill>
+                            <a:schemeClr val="tx1"/>
+                          </a:solidFill>
+                          <a:effectLst/>
+                        </a:rPr>
+                        <a:t>eg:</a:t>
+                      </a:r>
+                      <a:r>
+                        <a:rPr lang="en-US" sz="2300" dirty="0" err="1">
+                          <a:solidFill>
+                            <a:schemeClr val="tx1"/>
+                          </a:solidFill>
+                          <a:effectLst/>
+                          <a:highlight>
+                            <a:srgbClr val="FFFF00"/>
+                          </a:highlight>
+                        </a:rPr>
+                        <a:t>S</a:t>
+                      </a:r>
+                      <a:r>
+                        <a:rPr lang="en-US" sz="2300" dirty="0" err="1">
+                          <a:solidFill>
+                            <a:schemeClr val="tx1"/>
+                          </a:solidFill>
+                          <a:effectLst/>
+                        </a:rPr>
+                        <a:t>tudy</a:t>
+                      </a:r>
+                      <a:r>
+                        <a:rPr lang="en-US" sz="2300" b="1" i="1" kern="1200" dirty="0">
+                          <a:solidFill>
+                            <a:schemeClr val="bg1">
+                              <a:lumMod val="75000"/>
+                            </a:schemeClr>
+                          </a:solidFill>
+                          <a:effectLst/>
+                          <a:latin typeface="+mn-lt"/>
+                          <a:ea typeface="+mn-ea"/>
+                          <a:cs typeface="+mn-cs"/>
+                        </a:rPr>
+                        <a:t>&lt;n&gt;</a:t>
+                      </a:r>
+                    </a:p>
+                  </a:txBody>
+                  <a:tcPr marL="141557" marR="141557" marT="0" marB="0">
+                    <a:solidFill>
+                      <a:schemeClr val="bg1"/>
+                    </a:solidFill>
+                  </a:tcPr>
+                </a:tc>
+                <a:extLst>
+                  <a:ext uri="{0D108BD9-81ED-4DB2-BD59-A6C34878D82A}">
+                    <a16:rowId xmlns:a16="http://schemas.microsoft.com/office/drawing/2014/main" val="2603804651"/>
+                  </a:ext>
+                </a:extLst>
+              </a:tr>
+              <a:tr h="374601">
+                <a:tc>
+                  <a:txBody>
+                    <a:bodyPr/>
+                    <a:lstStyle/>
+                    <a:p>
+                      <a:pPr marL="0" marR="0">
+                        <a:lnSpc>
+                          <a:spcPct val="115000"/>
+                        </a:lnSpc>
+                        <a:spcBef>
+                          <a:spcPts val="0"/>
+                        </a:spcBef>
+                        <a:spcAft>
+                          <a:spcPts val="0"/>
+                        </a:spcAft>
+                      </a:pPr>
+                      <a:r>
+                        <a:rPr lang="en-US" sz="2300" dirty="0" err="1">
+                          <a:solidFill>
+                            <a:schemeClr val="tx1"/>
+                          </a:solidFill>
+                          <a:effectLst/>
+                        </a:rPr>
+                        <a:t>eg:</a:t>
+                      </a:r>
+                      <a:r>
+                        <a:rPr lang="en-US" sz="2300" dirty="0" err="1">
+                          <a:solidFill>
+                            <a:schemeClr val="tx1"/>
+                          </a:solidFill>
+                          <a:effectLst/>
+                          <a:highlight>
+                            <a:srgbClr val="FFFF00"/>
+                          </a:highlight>
+                        </a:rPr>
+                        <a:t>T</a:t>
+                      </a:r>
+                      <a:r>
+                        <a:rPr lang="en-US" sz="2300" dirty="0" err="1">
+                          <a:solidFill>
+                            <a:schemeClr val="tx1"/>
+                          </a:solidFill>
+                          <a:effectLst/>
+                        </a:rPr>
+                        <a:t>rt</a:t>
+                      </a:r>
+                      <a:r>
+                        <a:rPr lang="en-US" sz="2300" dirty="0" err="1">
+                          <a:solidFill>
+                            <a:schemeClr val="tx1"/>
+                          </a:solidFill>
+                          <a:effectLst/>
+                          <a:highlight>
+                            <a:srgbClr val="FFFF00"/>
+                          </a:highlight>
+                        </a:rPr>
+                        <a:t>A</a:t>
+                      </a:r>
+                      <a:r>
+                        <a:rPr lang="en-US" sz="2300" dirty="0" err="1">
+                          <a:solidFill>
+                            <a:schemeClr val="tx1"/>
+                          </a:solidFill>
+                          <a:effectLst/>
+                        </a:rPr>
+                        <a:t>rm</a:t>
+                      </a:r>
+                      <a:r>
+                        <a:rPr lang="en-US" sz="2300" b="1" i="1" kern="1200" dirty="0">
+                          <a:solidFill>
+                            <a:schemeClr val="bg1">
+                              <a:lumMod val="75000"/>
+                            </a:schemeClr>
+                          </a:solidFill>
+                          <a:effectLst/>
+                          <a:latin typeface="+mn-lt"/>
+                          <a:ea typeface="+mn-ea"/>
+                          <a:cs typeface="+mn-cs"/>
+                        </a:rPr>
+                        <a:t>&lt;n&gt;</a:t>
+                      </a:r>
+                      <a:r>
+                        <a:rPr lang="en-US" sz="2300" b="1" i="1" kern="1200" dirty="0">
+                          <a:solidFill>
+                            <a:schemeClr val="tx1"/>
+                          </a:solidFill>
+                          <a:effectLst/>
+                          <a:latin typeface="+mn-lt"/>
+                          <a:ea typeface="+mn-ea"/>
+                          <a:cs typeface="+mn-cs"/>
+                        </a:rPr>
+                        <a:t>-</a:t>
+                      </a:r>
+                      <a:r>
+                        <a:rPr lang="en-US" sz="2300" b="1" i="1" kern="1200" dirty="0">
+                          <a:solidFill>
+                            <a:schemeClr val="bg1">
+                              <a:lumMod val="75000"/>
+                            </a:schemeClr>
+                          </a:solidFill>
+                          <a:effectLst/>
+                          <a:latin typeface="+mn-lt"/>
+                          <a:ea typeface="+mn-ea"/>
+                          <a:cs typeface="+mn-cs"/>
+                        </a:rPr>
+                        <a:t>&lt;x&gt;</a:t>
+                      </a:r>
+                    </a:p>
+                  </a:txBody>
+                  <a:tcPr marL="141557" marR="141557" marT="0" marB="0">
+                    <a:solidFill>
+                      <a:schemeClr val="bg1"/>
+                    </a:solidFill>
+                  </a:tcPr>
+                </a:tc>
+                <a:extLst>
+                  <a:ext uri="{0D108BD9-81ED-4DB2-BD59-A6C34878D82A}">
+                    <a16:rowId xmlns:a16="http://schemas.microsoft.com/office/drawing/2014/main" val="2639473433"/>
+                  </a:ext>
+                </a:extLst>
+              </a:tr>
+              <a:tr h="374601">
+                <a:tc>
+                  <a:txBody>
+                    <a:bodyPr/>
+                    <a:lstStyle/>
+                    <a:p>
+                      <a:pPr marL="0" marR="0">
+                        <a:lnSpc>
+                          <a:spcPct val="115000"/>
+                        </a:lnSpc>
+                        <a:spcBef>
+                          <a:spcPts val="0"/>
+                        </a:spcBef>
+                        <a:spcAft>
+                          <a:spcPts val="0"/>
+                        </a:spcAft>
+                      </a:pPr>
+                      <a:r>
+                        <a:rPr lang="en-US" sz="2300" dirty="0" err="1">
+                          <a:solidFill>
+                            <a:schemeClr val="tx1"/>
+                          </a:solidFill>
+                          <a:effectLst/>
+                        </a:rPr>
+                        <a:t>eg:</a:t>
+                      </a:r>
+                      <a:r>
+                        <a:rPr lang="en-US" sz="2300" dirty="0" err="1">
+                          <a:solidFill>
+                            <a:schemeClr val="tx1"/>
+                          </a:solidFill>
+                          <a:effectLst/>
+                          <a:highlight>
+                            <a:srgbClr val="FFFF00"/>
+                          </a:highlight>
+                        </a:rPr>
+                        <a:t>P</a:t>
+                      </a:r>
+                      <a:r>
+                        <a:rPr lang="en-US" sz="2300" dirty="0" err="1">
+                          <a:solidFill>
+                            <a:schemeClr val="tx1"/>
+                          </a:solidFill>
+                          <a:effectLst/>
+                        </a:rPr>
+                        <a:t>erson</a:t>
+                      </a:r>
+                      <a:r>
+                        <a:rPr lang="en-US" sz="2300" b="1" i="1" kern="1200" dirty="0">
+                          <a:solidFill>
+                            <a:schemeClr val="bg1">
+                              <a:lumMod val="75000"/>
+                            </a:schemeClr>
+                          </a:solidFill>
+                          <a:effectLst/>
+                          <a:latin typeface="+mn-lt"/>
+                          <a:ea typeface="+mn-ea"/>
+                          <a:cs typeface="+mn-cs"/>
+                        </a:rPr>
+                        <a:t>&lt;n&gt;&lt;y&gt;</a:t>
+                      </a:r>
+                    </a:p>
+                  </a:txBody>
+                  <a:tcPr marL="141557" marR="141557" marT="0" marB="0">
+                    <a:solidFill>
+                      <a:schemeClr val="bg1"/>
+                    </a:solidFill>
+                  </a:tcPr>
+                </a:tc>
+                <a:extLst>
+                  <a:ext uri="{0D108BD9-81ED-4DB2-BD59-A6C34878D82A}">
+                    <a16:rowId xmlns:a16="http://schemas.microsoft.com/office/drawing/2014/main" val="157292370"/>
+                  </a:ext>
+                </a:extLst>
+              </a:tr>
+              <a:tr h="772532">
+                <a:tc>
+                  <a:txBody>
+                    <a:bodyPr/>
+                    <a:lstStyle/>
+                    <a:p>
+                      <a:pPr marL="0" marR="0">
+                        <a:lnSpc>
+                          <a:spcPct val="115000"/>
+                        </a:lnSpc>
+                        <a:spcBef>
+                          <a:spcPts val="0"/>
+                        </a:spcBef>
+                        <a:spcAft>
+                          <a:spcPts val="0"/>
+                        </a:spcAft>
+                      </a:pPr>
+                      <a:r>
+                        <a:rPr lang="en-US" sz="2300" dirty="0">
+                          <a:solidFill>
+                            <a:schemeClr val="tx1"/>
+                          </a:solidFill>
+                          <a:effectLst/>
+                        </a:rPr>
+                        <a:t> </a:t>
+                      </a:r>
+                    </a:p>
+                    <a:p>
+                      <a:pPr marL="0" marR="0">
+                        <a:lnSpc>
+                          <a:spcPct val="115000"/>
+                        </a:lnSpc>
+                        <a:spcBef>
+                          <a:spcPts val="0"/>
+                        </a:spcBef>
+                        <a:spcAft>
+                          <a:spcPts val="0"/>
+                        </a:spcAft>
+                      </a:pPr>
+                      <a:r>
+                        <a:rPr lang="en-US" sz="2300" dirty="0" err="1">
+                          <a:solidFill>
+                            <a:schemeClr val="tx1"/>
+                          </a:solidFill>
+                          <a:effectLst/>
+                        </a:rPr>
+                        <a:t>eg:</a:t>
+                      </a:r>
+                      <a:r>
+                        <a:rPr lang="en-US" sz="2300" dirty="0" err="1">
+                          <a:solidFill>
+                            <a:schemeClr val="tx1"/>
+                          </a:solidFill>
+                          <a:effectLst/>
+                          <a:highlight>
+                            <a:srgbClr val="FFFF00"/>
+                          </a:highlight>
+                        </a:rPr>
+                        <a:t>P</a:t>
+                      </a:r>
+                      <a:r>
+                        <a:rPr lang="en-US" sz="2300" dirty="0" err="1">
+                          <a:solidFill>
+                            <a:schemeClr val="tx1"/>
+                          </a:solidFill>
+                          <a:effectLst/>
+                        </a:rPr>
+                        <a:t>lacebo</a:t>
+                      </a:r>
+                      <a:r>
+                        <a:rPr lang="en-US" sz="2300" dirty="0" err="1">
+                          <a:solidFill>
+                            <a:schemeClr val="tx1"/>
+                          </a:solidFill>
+                          <a:effectLst/>
+                          <a:highlight>
+                            <a:srgbClr val="FFFF00"/>
+                          </a:highlight>
+                        </a:rPr>
+                        <a:t>A</a:t>
+                      </a:r>
+                      <a:r>
+                        <a:rPr lang="en-US" sz="2300" dirty="0" err="1">
+                          <a:solidFill>
+                            <a:schemeClr val="tx1"/>
+                          </a:solidFill>
+                          <a:effectLst/>
+                        </a:rPr>
+                        <a:t>rm</a:t>
+                      </a:r>
+                      <a:endParaRPr lang="en-US" sz="2300" dirty="0">
+                        <a:solidFill>
+                          <a:schemeClr val="tx1"/>
+                        </a:solidFill>
+                        <a:effectLst/>
+                        <a:latin typeface="Calibri" panose="020F0502020204030204" pitchFamily="34" charset="0"/>
+                        <a:ea typeface="Calibri" panose="020F0502020204030204" pitchFamily="34" charset="0"/>
+                        <a:cs typeface="Calibri" panose="020F0502020204030204" pitchFamily="34" charset="0"/>
+                      </a:endParaRPr>
+                    </a:p>
+                  </a:txBody>
+                  <a:tcPr marL="141557" marR="141557" marT="0" marB="0">
+                    <a:solidFill>
+                      <a:schemeClr val="bg1"/>
+                    </a:solidFill>
+                  </a:tcPr>
+                </a:tc>
+                <a:extLst>
+                  <a:ext uri="{0D108BD9-81ED-4DB2-BD59-A6C34878D82A}">
+                    <a16:rowId xmlns:a16="http://schemas.microsoft.com/office/drawing/2014/main" val="788461636"/>
+                  </a:ext>
+                </a:extLst>
+              </a:tr>
+              <a:tr h="374601">
+                <a:tc>
+                  <a:txBody>
+                    <a:bodyPr/>
+                    <a:lstStyle/>
+                    <a:p>
+                      <a:pPr marL="0" marR="0">
+                        <a:lnSpc>
+                          <a:spcPct val="115000"/>
+                        </a:lnSpc>
+                        <a:spcBef>
+                          <a:spcPts val="0"/>
+                        </a:spcBef>
+                        <a:spcAft>
+                          <a:spcPts val="0"/>
+                        </a:spcAft>
+                      </a:pPr>
+                      <a:r>
+                        <a:rPr lang="en-US" sz="2300" dirty="0" err="1">
+                          <a:solidFill>
+                            <a:schemeClr val="tx1"/>
+                          </a:solidFill>
+                          <a:effectLst/>
+                        </a:rPr>
+                        <a:t>eg:</a:t>
+                      </a:r>
+                      <a:r>
+                        <a:rPr lang="en-US" sz="2300" dirty="0" err="1">
+                          <a:solidFill>
+                            <a:schemeClr val="tx1"/>
+                          </a:solidFill>
+                          <a:effectLst/>
+                          <a:highlight>
+                            <a:srgbClr val="FFFF00"/>
+                          </a:highlight>
+                        </a:rPr>
+                        <a:t>LDE</a:t>
+                      </a:r>
+                      <a:r>
+                        <a:rPr lang="en-US" sz="2300" dirty="0" err="1">
+                          <a:solidFill>
+                            <a:schemeClr val="tx1"/>
+                          </a:solidFill>
+                          <a:effectLst/>
+                        </a:rPr>
+                        <a:t>xpert</a:t>
+                      </a:r>
+                      <a:endParaRPr lang="en-US" sz="2300" dirty="0">
+                        <a:solidFill>
+                          <a:schemeClr val="tx1"/>
+                        </a:solidFill>
+                        <a:effectLst/>
+                        <a:latin typeface="Calibri" panose="020F0502020204030204" pitchFamily="34" charset="0"/>
+                        <a:ea typeface="Calibri" panose="020F0502020204030204" pitchFamily="34" charset="0"/>
+                        <a:cs typeface="Calibri" panose="020F0502020204030204" pitchFamily="34" charset="0"/>
+                      </a:endParaRPr>
+                    </a:p>
+                  </a:txBody>
+                  <a:tcPr marL="141557" marR="141557" marT="0" marB="0">
+                    <a:solidFill>
+                      <a:schemeClr val="bg1"/>
+                    </a:solidFill>
+                  </a:tcPr>
+                </a:tc>
+                <a:extLst>
+                  <a:ext uri="{0D108BD9-81ED-4DB2-BD59-A6C34878D82A}">
+                    <a16:rowId xmlns:a16="http://schemas.microsoft.com/office/drawing/2014/main" val="647846079"/>
+                  </a:ext>
+                </a:extLst>
+              </a:tr>
+              <a:tr h="772532">
+                <a:tc>
+                  <a:txBody>
+                    <a:bodyPr/>
+                    <a:lstStyle/>
+                    <a:p>
+                      <a:pPr marL="0" marR="0">
+                        <a:lnSpc>
+                          <a:spcPct val="115000"/>
+                        </a:lnSpc>
+                        <a:spcBef>
+                          <a:spcPts val="0"/>
+                        </a:spcBef>
+                        <a:spcAft>
+                          <a:spcPts val="0"/>
+                        </a:spcAft>
+                      </a:pPr>
+                      <a:r>
+                        <a:rPr lang="en-US" sz="2300" dirty="0">
+                          <a:solidFill>
+                            <a:schemeClr val="tx1"/>
+                          </a:solidFill>
+                          <a:effectLst/>
+                        </a:rPr>
+                        <a:t> </a:t>
+                      </a:r>
+                    </a:p>
+                    <a:p>
+                      <a:pPr marL="0" marR="0">
+                        <a:lnSpc>
+                          <a:spcPct val="115000"/>
+                        </a:lnSpc>
+                        <a:spcBef>
+                          <a:spcPts val="0"/>
+                        </a:spcBef>
+                        <a:spcAft>
+                          <a:spcPts val="0"/>
+                        </a:spcAft>
+                      </a:pPr>
+                      <a:r>
+                        <a:rPr lang="en-US" sz="2300" dirty="0" err="1">
+                          <a:solidFill>
+                            <a:schemeClr val="tx1"/>
+                          </a:solidFill>
+                          <a:effectLst/>
+                        </a:rPr>
+                        <a:t>ncit:</a:t>
+                      </a:r>
+                      <a:r>
+                        <a:rPr lang="en-US" sz="2300" dirty="0" err="1">
+                          <a:solidFill>
+                            <a:schemeClr val="tx1"/>
+                          </a:solidFill>
+                          <a:effectLst/>
+                          <a:highlight>
+                            <a:srgbClr val="FFFF00"/>
+                          </a:highlight>
+                        </a:rPr>
+                        <a:t>P</a:t>
+                      </a:r>
+                      <a:r>
+                        <a:rPr lang="en-US" sz="2300" dirty="0" err="1">
+                          <a:solidFill>
+                            <a:schemeClr val="tx1"/>
+                          </a:solidFill>
+                          <a:effectLst/>
+                        </a:rPr>
+                        <a:t>hase</a:t>
+                      </a:r>
+                      <a:r>
+                        <a:rPr lang="en-US" sz="2300" b="1" i="1" kern="1200" dirty="0">
+                          <a:solidFill>
+                            <a:schemeClr val="bg1">
+                              <a:lumMod val="75000"/>
+                            </a:schemeClr>
+                          </a:solidFill>
+                          <a:effectLst/>
+                          <a:latin typeface="+mn-lt"/>
+                          <a:ea typeface="+mn-ea"/>
+                          <a:cs typeface="+mn-cs"/>
+                        </a:rPr>
+                        <a:t>&lt;z&gt;</a:t>
+                      </a:r>
+                    </a:p>
+                  </a:txBody>
+                  <a:tcPr marL="141557" marR="141557" marT="0" marB="0">
+                    <a:solidFill>
+                      <a:schemeClr val="bg1"/>
+                    </a:solidFill>
+                  </a:tcPr>
+                </a:tc>
+                <a:extLst>
+                  <a:ext uri="{0D108BD9-81ED-4DB2-BD59-A6C34878D82A}">
+                    <a16:rowId xmlns:a16="http://schemas.microsoft.com/office/drawing/2014/main" val="1318391329"/>
+                  </a:ext>
+                </a:extLst>
+              </a:tr>
+              <a:tr h="374601">
+                <a:tc>
+                  <a:txBody>
+                    <a:bodyPr/>
+                    <a:lstStyle/>
+                    <a:p>
+                      <a:pPr marL="0" marR="0">
+                        <a:lnSpc>
+                          <a:spcPct val="115000"/>
+                        </a:lnSpc>
+                        <a:spcBef>
+                          <a:spcPts val="0"/>
+                        </a:spcBef>
+                        <a:spcAft>
+                          <a:spcPts val="0"/>
+                        </a:spcAft>
+                      </a:pPr>
+                      <a:r>
+                        <a:rPr lang="en-US" sz="2300" dirty="0" err="1">
+                          <a:solidFill>
+                            <a:schemeClr val="tx1"/>
+                          </a:solidFill>
+                          <a:effectLst/>
+                        </a:rPr>
+                        <a:t>ncit:</a:t>
+                      </a:r>
+                      <a:r>
+                        <a:rPr lang="en-US" sz="2300" dirty="0" err="1">
+                          <a:solidFill>
+                            <a:schemeClr val="tx1"/>
+                          </a:solidFill>
+                          <a:effectLst/>
+                          <a:highlight>
+                            <a:srgbClr val="FFFF00"/>
+                          </a:highlight>
+                        </a:rPr>
+                        <a:t>M</a:t>
+                      </a:r>
+                      <a:r>
+                        <a:rPr lang="en-US" sz="2300" dirty="0" err="1">
+                          <a:solidFill>
+                            <a:schemeClr val="tx1"/>
+                          </a:solidFill>
+                          <a:effectLst/>
+                        </a:rPr>
+                        <a:t>ale</a:t>
+                      </a:r>
+                      <a:endParaRPr lang="en-US" sz="2300" dirty="0">
+                        <a:solidFill>
+                          <a:schemeClr val="tx1"/>
+                        </a:solidFill>
+                        <a:effectLst/>
+                        <a:latin typeface="Calibri" panose="020F0502020204030204" pitchFamily="34" charset="0"/>
+                        <a:ea typeface="Calibri" panose="020F0502020204030204" pitchFamily="34" charset="0"/>
+                        <a:cs typeface="Calibri" panose="020F0502020204030204" pitchFamily="34" charset="0"/>
+                      </a:endParaRPr>
+                    </a:p>
+                  </a:txBody>
+                  <a:tcPr marL="141557" marR="141557" marT="0" marB="0">
+                    <a:solidFill>
+                      <a:schemeClr val="bg1"/>
+                    </a:solidFill>
+                  </a:tcPr>
+                </a:tc>
+                <a:extLst>
+                  <a:ext uri="{0D108BD9-81ED-4DB2-BD59-A6C34878D82A}">
+                    <a16:rowId xmlns:a16="http://schemas.microsoft.com/office/drawing/2014/main" val="72957574"/>
+                  </a:ext>
+                </a:extLst>
+              </a:tr>
+              <a:tr h="374601">
+                <a:tc>
+                  <a:txBody>
+                    <a:bodyPr/>
+                    <a:lstStyle/>
+                    <a:p>
+                      <a:pPr marL="0" marR="0">
+                        <a:lnSpc>
+                          <a:spcPct val="115000"/>
+                        </a:lnSpc>
+                        <a:spcBef>
+                          <a:spcPts val="0"/>
+                        </a:spcBef>
+                        <a:spcAft>
+                          <a:spcPts val="0"/>
+                        </a:spcAft>
+                      </a:pPr>
+                      <a:r>
+                        <a:rPr lang="en-US" sz="2300" dirty="0" err="1">
+                          <a:solidFill>
+                            <a:schemeClr val="tx1"/>
+                          </a:solidFill>
+                          <a:effectLst/>
+                        </a:rPr>
+                        <a:t>ncit:</a:t>
+                      </a:r>
+                      <a:r>
+                        <a:rPr lang="en-US" sz="2300" dirty="0" err="1">
+                          <a:solidFill>
+                            <a:schemeClr val="tx1"/>
+                          </a:solidFill>
+                          <a:effectLst/>
+                          <a:highlight>
+                            <a:srgbClr val="FFFF00"/>
+                          </a:highlight>
+                        </a:rPr>
+                        <a:t>F</a:t>
+                      </a:r>
+                      <a:r>
+                        <a:rPr lang="en-US" sz="2300" dirty="0" err="1">
+                          <a:solidFill>
+                            <a:schemeClr val="tx1"/>
+                          </a:solidFill>
+                          <a:effectLst/>
+                        </a:rPr>
+                        <a:t>emale</a:t>
+                      </a:r>
+                      <a:endParaRPr lang="en-US" sz="2300" dirty="0">
+                        <a:solidFill>
+                          <a:schemeClr val="tx1"/>
+                        </a:solidFill>
+                        <a:effectLst/>
+                        <a:latin typeface="Calibri" panose="020F0502020204030204" pitchFamily="34" charset="0"/>
+                        <a:ea typeface="Calibri" panose="020F0502020204030204" pitchFamily="34" charset="0"/>
+                        <a:cs typeface="Calibri" panose="020F0502020204030204" pitchFamily="34" charset="0"/>
+                      </a:endParaRPr>
+                    </a:p>
+                  </a:txBody>
+                  <a:tcPr marL="141557" marR="141557" marT="0" marB="0">
+                    <a:solidFill>
+                      <a:schemeClr val="bg1"/>
+                    </a:solidFill>
+                  </a:tcPr>
+                </a:tc>
+                <a:extLst>
+                  <a:ext uri="{0D108BD9-81ED-4DB2-BD59-A6C34878D82A}">
+                    <a16:rowId xmlns:a16="http://schemas.microsoft.com/office/drawing/2014/main" val="1176398186"/>
+                  </a:ext>
+                </a:extLst>
+              </a:tr>
+            </a:tbl>
+          </a:graphicData>
+        </a:graphic>
+      </p:graphicFrame>
+      <p:graphicFrame>
+        <p:nvGraphicFramePr>
+          <p:cNvPr id="7" name="Table 6"/>
+          <p:cNvGraphicFramePr>
+            <a:graphicFrameLocks noGrp="1"/>
+          </p:cNvGraphicFramePr>
+          <p:nvPr>
+            <p:extLst>
+              <p:ext uri="{D42A27DB-BD31-4B8C-83A1-F6EECF244321}">
+                <p14:modId xmlns:p14="http://schemas.microsoft.com/office/powerpoint/2010/main" val="1577146990"/>
+              </p:ext>
+            </p:extLst>
+          </p:nvPr>
+        </p:nvGraphicFramePr>
+        <p:xfrm>
+          <a:off x="4108704" y="1224122"/>
+          <a:ext cx="5222277" cy="4973643"/>
+        </p:xfrm>
+        <a:graphic>
+          <a:graphicData uri="http://schemas.openxmlformats.org/drawingml/2006/table">
+            <a:tbl>
+              <a:tblPr firstRow="1" firstCol="1" bandRow="1">
+                <a:tableStyleId>{5C22544A-7EE6-4342-B048-85BDC9FD1C3A}</a:tableStyleId>
+              </a:tblPr>
+              <a:tblGrid>
+                <a:gridCol w="5222277">
+                  <a:extLst>
+                    <a:ext uri="{9D8B030D-6E8A-4147-A177-3AD203B41FA5}">
+                      <a16:colId xmlns:a16="http://schemas.microsoft.com/office/drawing/2014/main" val="691544491"/>
+                    </a:ext>
+                  </a:extLst>
+                </a:gridCol>
+              </a:tblGrid>
+              <a:tr h="462198">
+                <a:tc>
+                  <a:txBody>
+                    <a:bodyPr/>
+                    <a:lstStyle/>
+                    <a:p>
+                      <a:pPr marL="0" marR="0">
+                        <a:lnSpc>
+                          <a:spcPct val="115000"/>
+                        </a:lnSpc>
+                        <a:spcBef>
+                          <a:spcPts val="0"/>
+                        </a:spcBef>
+                        <a:spcAft>
+                          <a:spcPts val="0"/>
+                        </a:spcAft>
+                      </a:pPr>
+                      <a:r>
+                        <a:rPr lang="en-US" sz="2900" b="1" kern="1200" dirty="0">
+                          <a:solidFill>
+                            <a:srgbClr val="0070C0"/>
+                          </a:solidFill>
+                          <a:effectLst/>
+                          <a:latin typeface="+mn-lt"/>
+                          <a:ea typeface="+mn-ea"/>
+                          <a:cs typeface="+mn-cs"/>
+                        </a:rPr>
+                        <a:t>LINKS</a:t>
+                      </a:r>
+                    </a:p>
+                  </a:txBody>
+                  <a:tcPr marL="128038" marR="128038" marT="0" marB="0">
+                    <a:noFill/>
+                  </a:tcPr>
+                </a:tc>
+                <a:extLst>
+                  <a:ext uri="{0D108BD9-81ED-4DB2-BD59-A6C34878D82A}">
+                    <a16:rowId xmlns:a16="http://schemas.microsoft.com/office/drawing/2014/main" val="2301028425"/>
+                  </a:ext>
+                </a:extLst>
+              </a:tr>
+              <a:tr h="351271">
+                <a:tc>
+                  <a:txBody>
+                    <a:bodyPr/>
+                    <a:lstStyle/>
+                    <a:p>
+                      <a:pPr marL="0" marR="0">
+                        <a:lnSpc>
+                          <a:spcPct val="115000"/>
+                        </a:lnSpc>
+                        <a:spcBef>
+                          <a:spcPts val="0"/>
+                        </a:spcBef>
+                        <a:spcAft>
+                          <a:spcPts val="0"/>
+                        </a:spcAft>
+                      </a:pPr>
+                      <a:r>
+                        <a:rPr lang="en-US" sz="2300" b="1" kern="1200" dirty="0">
+                          <a:solidFill>
+                            <a:schemeClr val="tx1"/>
+                          </a:solidFill>
+                          <a:effectLst/>
+                          <a:latin typeface="+mn-lt"/>
+                          <a:ea typeface="+mn-ea"/>
+                          <a:cs typeface="+mn-cs"/>
+                        </a:rPr>
+                        <a:t>eg:age</a:t>
+                      </a:r>
+                    </a:p>
+                  </a:txBody>
+                  <a:tcPr marL="128038" marR="128038" marT="0" marB="0">
+                    <a:noFill/>
+                  </a:tcPr>
+                </a:tc>
+                <a:extLst>
+                  <a:ext uri="{0D108BD9-81ED-4DB2-BD59-A6C34878D82A}">
+                    <a16:rowId xmlns:a16="http://schemas.microsoft.com/office/drawing/2014/main" val="931040827"/>
+                  </a:ext>
+                </a:extLst>
+              </a:tr>
+              <a:tr h="351271">
+                <a:tc>
+                  <a:txBody>
+                    <a:bodyPr/>
+                    <a:lstStyle/>
+                    <a:p>
+                      <a:pPr marL="0" marR="0">
+                        <a:lnSpc>
+                          <a:spcPct val="115000"/>
+                        </a:lnSpc>
+                        <a:spcBef>
+                          <a:spcPts val="0"/>
+                        </a:spcBef>
+                        <a:spcAft>
+                          <a:spcPts val="0"/>
+                        </a:spcAft>
+                      </a:pPr>
+                      <a:r>
+                        <a:rPr lang="en-US" sz="2300" b="1" kern="1200" dirty="0" err="1">
+                          <a:solidFill>
+                            <a:schemeClr val="tx1"/>
+                          </a:solidFill>
+                          <a:effectLst/>
+                          <a:latin typeface="+mn-lt"/>
+                          <a:ea typeface="+mn-ea"/>
+                          <a:cs typeface="+mn-cs"/>
+                        </a:rPr>
+                        <a:t>eg:</a:t>
+                      </a:r>
+                      <a:r>
+                        <a:rPr lang="en-US" sz="2300" b="1" kern="1200" dirty="0" err="1">
+                          <a:solidFill>
+                            <a:schemeClr val="tx1"/>
+                          </a:solidFill>
+                          <a:effectLst/>
+                          <a:highlight>
+                            <a:srgbClr val="FFFF00"/>
+                          </a:highlight>
+                          <a:latin typeface="+mn-lt"/>
+                          <a:ea typeface="+mn-ea"/>
+                          <a:cs typeface="+mn-cs"/>
+                        </a:rPr>
+                        <a:t>LDE</a:t>
+                      </a:r>
+                      <a:r>
+                        <a:rPr lang="en-US" sz="2300" b="1" kern="1200" dirty="0" err="1">
+                          <a:solidFill>
+                            <a:schemeClr val="tx1"/>
+                          </a:solidFill>
+                          <a:effectLst/>
+                          <a:latin typeface="+mn-lt"/>
+                          <a:ea typeface="+mn-ea"/>
+                          <a:cs typeface="+mn-cs"/>
+                        </a:rPr>
+                        <a:t>xpert</a:t>
+                      </a:r>
+                      <a:endParaRPr lang="en-US" sz="2300" b="1" kern="1200" dirty="0">
+                        <a:solidFill>
+                          <a:schemeClr val="tx1"/>
+                        </a:solidFill>
+                        <a:effectLst/>
+                        <a:latin typeface="+mn-lt"/>
+                        <a:ea typeface="+mn-ea"/>
+                        <a:cs typeface="+mn-cs"/>
+                      </a:endParaRPr>
+                    </a:p>
+                  </a:txBody>
+                  <a:tcPr marL="128038" marR="128038" marT="0" marB="0">
+                    <a:noFill/>
+                  </a:tcPr>
+                </a:tc>
+                <a:extLst>
+                  <a:ext uri="{0D108BD9-81ED-4DB2-BD59-A6C34878D82A}">
+                    <a16:rowId xmlns:a16="http://schemas.microsoft.com/office/drawing/2014/main" val="2894795761"/>
+                  </a:ext>
+                </a:extLst>
+              </a:tr>
+              <a:tr h="351271">
+                <a:tc>
+                  <a:txBody>
+                    <a:bodyPr/>
+                    <a:lstStyle/>
+                    <a:p>
+                      <a:pPr marL="0" marR="0">
+                        <a:lnSpc>
+                          <a:spcPct val="115000"/>
+                        </a:lnSpc>
+                        <a:spcBef>
+                          <a:spcPts val="0"/>
+                        </a:spcBef>
+                        <a:spcAft>
+                          <a:spcPts val="0"/>
+                        </a:spcAft>
+                      </a:pPr>
+                      <a:r>
+                        <a:rPr lang="en-US" sz="2300" b="1" kern="1200" dirty="0" err="1">
+                          <a:solidFill>
+                            <a:schemeClr val="tx1"/>
+                          </a:solidFill>
+                          <a:effectLst/>
+                          <a:latin typeface="+mn-lt"/>
+                          <a:ea typeface="+mn-ea"/>
+                          <a:cs typeface="+mn-cs"/>
+                        </a:rPr>
+                        <a:t>eg:participates</a:t>
+                      </a:r>
+                      <a:r>
+                        <a:rPr lang="en-US" sz="2300" b="1" kern="1200" dirty="0" err="1">
+                          <a:solidFill>
+                            <a:schemeClr val="tx1"/>
+                          </a:solidFill>
+                          <a:effectLst/>
+                          <a:highlight>
+                            <a:srgbClr val="FFFF00"/>
+                          </a:highlight>
+                          <a:latin typeface="+mn-lt"/>
+                          <a:ea typeface="+mn-ea"/>
+                          <a:cs typeface="+mn-cs"/>
+                        </a:rPr>
+                        <a:t>I</a:t>
+                      </a:r>
+                      <a:r>
+                        <a:rPr lang="en-US" sz="2300" b="1" kern="1200" dirty="0" err="1">
+                          <a:solidFill>
+                            <a:schemeClr val="tx1"/>
+                          </a:solidFill>
+                          <a:effectLst/>
+                          <a:latin typeface="+mn-lt"/>
+                          <a:ea typeface="+mn-ea"/>
+                          <a:cs typeface="+mn-cs"/>
+                        </a:rPr>
+                        <a:t>n</a:t>
+                      </a:r>
+                      <a:endParaRPr lang="en-US" sz="2300" b="1" kern="1200" dirty="0">
+                        <a:solidFill>
+                          <a:schemeClr val="tx1"/>
+                        </a:solidFill>
+                        <a:effectLst/>
+                        <a:latin typeface="+mn-lt"/>
+                        <a:ea typeface="+mn-ea"/>
+                        <a:cs typeface="+mn-cs"/>
+                      </a:endParaRPr>
+                    </a:p>
+                  </a:txBody>
+                  <a:tcPr marL="128038" marR="128038" marT="0" marB="0">
+                    <a:noFill/>
+                  </a:tcPr>
+                </a:tc>
+                <a:extLst>
+                  <a:ext uri="{0D108BD9-81ED-4DB2-BD59-A6C34878D82A}">
+                    <a16:rowId xmlns:a16="http://schemas.microsoft.com/office/drawing/2014/main" val="1065163967"/>
+                  </a:ext>
+                </a:extLst>
+              </a:tr>
+              <a:tr h="351271">
+                <a:tc>
+                  <a:txBody>
+                    <a:bodyPr/>
+                    <a:lstStyle/>
+                    <a:p>
+                      <a:pPr marL="0" marR="0">
+                        <a:lnSpc>
+                          <a:spcPct val="115000"/>
+                        </a:lnSpc>
+                        <a:spcBef>
+                          <a:spcPts val="0"/>
+                        </a:spcBef>
+                        <a:spcAft>
+                          <a:spcPts val="0"/>
+                        </a:spcAft>
+                      </a:pPr>
+                      <a:r>
+                        <a:rPr lang="en-US" sz="2300" b="1" kern="1200" dirty="0" err="1">
+                          <a:solidFill>
+                            <a:schemeClr val="tx1"/>
+                          </a:solidFill>
+                          <a:effectLst/>
+                          <a:latin typeface="+mn-lt"/>
+                          <a:ea typeface="+mn-ea"/>
+                          <a:cs typeface="+mn-cs"/>
+                        </a:rPr>
+                        <a:t>eg:randomized</a:t>
+                      </a:r>
+                      <a:r>
+                        <a:rPr lang="en-US" sz="2300" b="1" kern="1200" dirty="0" err="1">
+                          <a:solidFill>
+                            <a:schemeClr val="tx1"/>
+                          </a:solidFill>
+                          <a:effectLst/>
+                          <a:highlight>
+                            <a:srgbClr val="FFFF00"/>
+                          </a:highlight>
+                          <a:latin typeface="+mn-lt"/>
+                          <a:ea typeface="+mn-ea"/>
+                          <a:cs typeface="+mn-cs"/>
+                        </a:rPr>
+                        <a:t>T</a:t>
+                      </a:r>
+                      <a:r>
+                        <a:rPr lang="en-US" sz="2300" b="1" kern="1200" dirty="0" err="1">
+                          <a:solidFill>
+                            <a:schemeClr val="tx1"/>
+                          </a:solidFill>
+                          <a:effectLst/>
+                          <a:latin typeface="+mn-lt"/>
+                          <a:ea typeface="+mn-ea"/>
+                          <a:cs typeface="+mn-cs"/>
+                        </a:rPr>
+                        <a:t>o</a:t>
+                      </a:r>
+                      <a:endParaRPr lang="en-US" sz="2300" b="1" kern="1200" dirty="0">
+                        <a:solidFill>
+                          <a:schemeClr val="tx1"/>
+                        </a:solidFill>
+                        <a:effectLst/>
+                        <a:latin typeface="+mn-lt"/>
+                        <a:ea typeface="+mn-ea"/>
+                        <a:cs typeface="+mn-cs"/>
+                      </a:endParaRPr>
+                    </a:p>
+                  </a:txBody>
+                  <a:tcPr marL="128038" marR="128038" marT="0" marB="0">
+                    <a:noFill/>
+                  </a:tcPr>
+                </a:tc>
+                <a:extLst>
+                  <a:ext uri="{0D108BD9-81ED-4DB2-BD59-A6C34878D82A}">
+                    <a16:rowId xmlns:a16="http://schemas.microsoft.com/office/drawing/2014/main" val="961836117"/>
+                  </a:ext>
+                </a:extLst>
+              </a:tr>
+              <a:tr h="351271">
+                <a:tc>
+                  <a:txBody>
+                    <a:bodyPr/>
+                    <a:lstStyle/>
+                    <a:p>
+                      <a:pPr marL="0" marR="0">
+                        <a:lnSpc>
+                          <a:spcPct val="115000"/>
+                        </a:lnSpc>
+                        <a:spcBef>
+                          <a:spcPts val="0"/>
+                        </a:spcBef>
+                        <a:spcAft>
+                          <a:spcPts val="0"/>
+                        </a:spcAft>
+                      </a:pPr>
+                      <a:r>
+                        <a:rPr lang="en-US" sz="2300" b="1" kern="1200" dirty="0" err="1">
+                          <a:solidFill>
+                            <a:schemeClr val="tx1"/>
+                          </a:solidFill>
+                          <a:effectLst/>
+                          <a:latin typeface="+mn-lt"/>
+                          <a:ea typeface="+mn-ea"/>
+                          <a:cs typeface="+mn-cs"/>
+                        </a:rPr>
+                        <a:t>eg:trt</a:t>
+                      </a:r>
+                      <a:r>
+                        <a:rPr lang="en-US" sz="2300" b="1" kern="1200" dirty="0" err="1">
+                          <a:solidFill>
+                            <a:schemeClr val="tx1"/>
+                          </a:solidFill>
+                          <a:effectLst/>
+                          <a:highlight>
+                            <a:srgbClr val="FFFF00"/>
+                          </a:highlight>
+                          <a:latin typeface="+mn-lt"/>
+                          <a:ea typeface="+mn-ea"/>
+                          <a:cs typeface="+mn-cs"/>
+                        </a:rPr>
+                        <a:t>A</a:t>
+                      </a:r>
+                      <a:r>
+                        <a:rPr lang="en-US" sz="2300" b="1" kern="1200" dirty="0" err="1">
+                          <a:solidFill>
+                            <a:schemeClr val="tx1"/>
+                          </a:solidFill>
+                          <a:effectLst/>
+                          <a:latin typeface="+mn-lt"/>
+                          <a:ea typeface="+mn-ea"/>
+                          <a:cs typeface="+mn-cs"/>
+                        </a:rPr>
+                        <a:t>rm</a:t>
+                      </a:r>
+                      <a:endParaRPr lang="en-US" sz="2300" b="1" kern="1200" dirty="0">
+                        <a:solidFill>
+                          <a:schemeClr val="tx1"/>
+                        </a:solidFill>
+                        <a:effectLst/>
+                        <a:latin typeface="+mn-lt"/>
+                        <a:ea typeface="+mn-ea"/>
+                        <a:cs typeface="+mn-cs"/>
+                      </a:endParaRPr>
+                    </a:p>
+                  </a:txBody>
+                  <a:tcPr marL="128038" marR="128038" marT="0" marB="0">
+                    <a:noFill/>
+                  </a:tcPr>
+                </a:tc>
+                <a:extLst>
+                  <a:ext uri="{0D108BD9-81ED-4DB2-BD59-A6C34878D82A}">
+                    <a16:rowId xmlns:a16="http://schemas.microsoft.com/office/drawing/2014/main" val="3276894664"/>
+                  </a:ext>
+                </a:extLst>
+              </a:tr>
+              <a:tr h="351271">
+                <a:tc>
+                  <a:txBody>
+                    <a:bodyPr/>
+                    <a:lstStyle/>
+                    <a:p>
+                      <a:pPr marL="0" marR="0">
+                        <a:lnSpc>
+                          <a:spcPct val="115000"/>
+                        </a:lnSpc>
+                        <a:spcBef>
+                          <a:spcPts val="0"/>
+                        </a:spcBef>
+                        <a:spcAft>
+                          <a:spcPts val="0"/>
+                        </a:spcAft>
+                      </a:pPr>
+                      <a:r>
+                        <a:rPr lang="en-US" sz="2300" b="1" kern="1200" dirty="0" err="1">
+                          <a:solidFill>
+                            <a:schemeClr val="tx1"/>
+                          </a:solidFill>
+                          <a:effectLst/>
+                          <a:latin typeface="+mn-lt"/>
+                          <a:ea typeface="+mn-ea"/>
+                          <a:cs typeface="+mn-cs"/>
+                        </a:rPr>
+                        <a:t>eg:trt</a:t>
+                      </a:r>
+                      <a:r>
+                        <a:rPr lang="en-US" sz="2300" b="1" kern="1200" dirty="0" err="1">
+                          <a:solidFill>
+                            <a:schemeClr val="tx1"/>
+                          </a:solidFill>
+                          <a:effectLst/>
+                          <a:highlight>
+                            <a:srgbClr val="FFFF00"/>
+                          </a:highlight>
+                          <a:latin typeface="+mn-lt"/>
+                          <a:ea typeface="+mn-ea"/>
+                          <a:cs typeface="+mn-cs"/>
+                        </a:rPr>
+                        <a:t>A</a:t>
+                      </a:r>
+                      <a:r>
+                        <a:rPr lang="en-US" sz="2300" b="1" kern="1200" dirty="0" err="1">
+                          <a:solidFill>
+                            <a:schemeClr val="tx1"/>
+                          </a:solidFill>
+                          <a:effectLst/>
+                          <a:latin typeface="+mn-lt"/>
+                          <a:ea typeface="+mn-ea"/>
+                          <a:cs typeface="+mn-cs"/>
+                        </a:rPr>
+                        <a:t>rm</a:t>
+                      </a:r>
+                      <a:r>
+                        <a:rPr lang="en-US" sz="2300" b="1" kern="1200" dirty="0" err="1">
+                          <a:solidFill>
+                            <a:schemeClr val="tx1"/>
+                          </a:solidFill>
+                          <a:effectLst/>
+                          <a:highlight>
+                            <a:srgbClr val="FFFF00"/>
+                          </a:highlight>
+                          <a:latin typeface="+mn-lt"/>
+                          <a:ea typeface="+mn-ea"/>
+                          <a:cs typeface="+mn-cs"/>
+                        </a:rPr>
+                        <a:t>T</a:t>
+                      </a:r>
+                      <a:r>
+                        <a:rPr lang="en-US" sz="2300" b="1" kern="1200" dirty="0" err="1">
+                          <a:solidFill>
+                            <a:schemeClr val="tx1"/>
+                          </a:solidFill>
+                          <a:effectLst/>
+                          <a:latin typeface="+mn-lt"/>
+                          <a:ea typeface="+mn-ea"/>
+                          <a:cs typeface="+mn-cs"/>
+                        </a:rPr>
+                        <a:t>ype</a:t>
+                      </a:r>
+                      <a:endParaRPr lang="en-US" sz="2300" b="1" kern="1200" dirty="0">
+                        <a:solidFill>
+                          <a:schemeClr val="tx1"/>
+                        </a:solidFill>
+                        <a:effectLst/>
+                        <a:latin typeface="+mn-lt"/>
+                        <a:ea typeface="+mn-ea"/>
+                        <a:cs typeface="+mn-cs"/>
+                      </a:endParaRPr>
+                    </a:p>
+                  </a:txBody>
+                  <a:tcPr marL="128038" marR="128038" marT="0" marB="0">
+                    <a:noFill/>
+                  </a:tcPr>
+                </a:tc>
+                <a:extLst>
+                  <a:ext uri="{0D108BD9-81ED-4DB2-BD59-A6C34878D82A}">
+                    <a16:rowId xmlns:a16="http://schemas.microsoft.com/office/drawing/2014/main" val="3221529045"/>
+                  </a:ext>
+                </a:extLst>
+              </a:tr>
+              <a:tr h="702541">
+                <a:tc>
+                  <a:txBody>
+                    <a:bodyPr/>
+                    <a:lstStyle/>
+                    <a:p>
+                      <a:pPr marL="0" marR="0">
+                        <a:lnSpc>
+                          <a:spcPct val="115000"/>
+                        </a:lnSpc>
+                        <a:spcBef>
+                          <a:spcPts val="0"/>
+                        </a:spcBef>
+                        <a:spcAft>
+                          <a:spcPts val="0"/>
+                        </a:spcAft>
+                      </a:pPr>
+                      <a:r>
+                        <a:rPr lang="en-US" sz="2000" dirty="0">
+                          <a:solidFill>
+                            <a:schemeClr val="accent2">
+                              <a:lumMod val="75000"/>
+                            </a:schemeClr>
+                          </a:solidFill>
+                          <a:effectLst/>
+                        </a:rPr>
+                        <a:t> </a:t>
+                      </a:r>
+                    </a:p>
+                    <a:p>
+                      <a:pPr marL="0" marR="0">
+                        <a:lnSpc>
+                          <a:spcPct val="115000"/>
+                        </a:lnSpc>
+                        <a:spcBef>
+                          <a:spcPts val="0"/>
+                        </a:spcBef>
+                        <a:spcAft>
+                          <a:spcPts val="0"/>
+                        </a:spcAft>
+                      </a:pPr>
+                      <a:r>
+                        <a:rPr lang="en-US" sz="2300" b="1" kern="1200" dirty="0" err="1">
+                          <a:solidFill>
+                            <a:schemeClr val="accent2">
+                              <a:lumMod val="75000"/>
+                            </a:schemeClr>
+                          </a:solidFill>
+                          <a:effectLst/>
+                          <a:latin typeface="+mn-lt"/>
+                          <a:ea typeface="+mn-ea"/>
+                          <a:cs typeface="+mn-cs"/>
+                        </a:rPr>
+                        <a:t>ncit:gender</a:t>
+                      </a:r>
+                      <a:endParaRPr lang="en-US" sz="2300" b="1" kern="1200" dirty="0">
+                        <a:solidFill>
+                          <a:schemeClr val="accent2">
+                            <a:lumMod val="75000"/>
+                          </a:schemeClr>
+                        </a:solidFill>
+                        <a:effectLst/>
+                        <a:latin typeface="+mn-lt"/>
+                        <a:ea typeface="+mn-ea"/>
+                        <a:cs typeface="+mn-cs"/>
+                      </a:endParaRPr>
+                    </a:p>
+                  </a:txBody>
+                  <a:tcPr marL="128038" marR="128038" marT="0" marB="0">
+                    <a:noFill/>
+                  </a:tcPr>
+                </a:tc>
+                <a:extLst>
+                  <a:ext uri="{0D108BD9-81ED-4DB2-BD59-A6C34878D82A}">
+                    <a16:rowId xmlns:a16="http://schemas.microsoft.com/office/drawing/2014/main" val="4266861425"/>
+                  </a:ext>
+                </a:extLst>
+              </a:tr>
+              <a:tr h="351271">
+                <a:tc>
+                  <a:txBody>
+                    <a:bodyPr/>
+                    <a:lstStyle/>
+                    <a:p>
+                      <a:pPr marL="0" marR="0">
+                        <a:lnSpc>
+                          <a:spcPct val="115000"/>
+                        </a:lnSpc>
+                        <a:spcBef>
+                          <a:spcPts val="0"/>
+                        </a:spcBef>
+                        <a:spcAft>
+                          <a:spcPts val="0"/>
+                        </a:spcAft>
+                      </a:pPr>
+                      <a:r>
+                        <a:rPr lang="en-US" sz="2300" b="1" kern="1200" dirty="0" err="1">
+                          <a:solidFill>
+                            <a:schemeClr val="accent2">
+                              <a:lumMod val="75000"/>
+                            </a:schemeClr>
+                          </a:solidFill>
+                          <a:effectLst/>
+                          <a:latin typeface="+mn-lt"/>
+                          <a:ea typeface="+mn-ea"/>
+                          <a:cs typeface="+mn-cs"/>
+                        </a:rPr>
+                        <a:t>ncit:phase</a:t>
+                      </a:r>
+                      <a:endParaRPr lang="en-US" sz="2300" b="1" kern="1200" dirty="0">
+                        <a:solidFill>
+                          <a:schemeClr val="accent2">
+                            <a:lumMod val="75000"/>
+                          </a:schemeClr>
+                        </a:solidFill>
+                        <a:effectLst/>
+                        <a:latin typeface="+mn-lt"/>
+                        <a:ea typeface="+mn-ea"/>
+                        <a:cs typeface="+mn-cs"/>
+                      </a:endParaRPr>
+                    </a:p>
+                  </a:txBody>
+                  <a:tcPr marL="128038" marR="128038" marT="0" marB="0">
+                    <a:noFill/>
+                  </a:tcPr>
+                </a:tc>
+                <a:extLst>
+                  <a:ext uri="{0D108BD9-81ED-4DB2-BD59-A6C34878D82A}">
+                    <a16:rowId xmlns:a16="http://schemas.microsoft.com/office/drawing/2014/main" val="1578329347"/>
+                  </a:ext>
+                </a:extLst>
+              </a:tr>
+              <a:tr h="351271">
+                <a:tc>
+                  <a:txBody>
+                    <a:bodyPr/>
+                    <a:lstStyle/>
+                    <a:p>
+                      <a:pPr marL="0" marR="0">
+                        <a:lnSpc>
+                          <a:spcPct val="115000"/>
+                        </a:lnSpc>
+                        <a:spcBef>
+                          <a:spcPts val="0"/>
+                        </a:spcBef>
+                        <a:spcAft>
+                          <a:spcPts val="0"/>
+                        </a:spcAft>
+                      </a:pPr>
+                      <a:r>
+                        <a:rPr lang="en-US" sz="2300" b="1" kern="1200" dirty="0" err="1">
+                          <a:solidFill>
+                            <a:schemeClr val="accent2">
+                              <a:lumMod val="75000"/>
+                            </a:schemeClr>
+                          </a:solidFill>
+                          <a:effectLst/>
+                          <a:latin typeface="+mn-lt"/>
+                          <a:ea typeface="+mn-ea"/>
+                          <a:cs typeface="+mn-cs"/>
+                        </a:rPr>
+                        <a:t>ncit:study</a:t>
+                      </a:r>
+                      <a:endParaRPr lang="en-US" sz="2300" b="1" kern="1200" dirty="0">
+                        <a:solidFill>
+                          <a:schemeClr val="accent2">
+                            <a:lumMod val="75000"/>
+                          </a:schemeClr>
+                        </a:solidFill>
+                        <a:effectLst/>
+                        <a:latin typeface="+mn-lt"/>
+                        <a:ea typeface="+mn-ea"/>
+                        <a:cs typeface="+mn-cs"/>
+                      </a:endParaRPr>
+                    </a:p>
+                  </a:txBody>
+                  <a:tcPr marL="128038" marR="128038" marT="0" marB="0">
+                    <a:noFill/>
+                  </a:tcPr>
+                </a:tc>
+                <a:extLst>
+                  <a:ext uri="{0D108BD9-81ED-4DB2-BD59-A6C34878D82A}">
+                    <a16:rowId xmlns:a16="http://schemas.microsoft.com/office/drawing/2014/main" val="3647191216"/>
+                  </a:ext>
+                </a:extLst>
+              </a:tr>
+              <a:tr h="702541">
+                <a:tc>
+                  <a:txBody>
+                    <a:bodyPr/>
+                    <a:lstStyle/>
+                    <a:p>
+                      <a:pPr marL="0" marR="0">
+                        <a:lnSpc>
+                          <a:spcPct val="115000"/>
+                        </a:lnSpc>
+                        <a:spcBef>
+                          <a:spcPts val="0"/>
+                        </a:spcBef>
+                        <a:spcAft>
+                          <a:spcPts val="0"/>
+                        </a:spcAft>
+                      </a:pPr>
+                      <a:r>
+                        <a:rPr lang="en-US" sz="2000" dirty="0">
+                          <a:solidFill>
+                            <a:schemeClr val="accent2">
+                              <a:lumMod val="75000"/>
+                            </a:schemeClr>
+                          </a:solidFill>
+                          <a:effectLst/>
+                        </a:rPr>
+                        <a:t> </a:t>
+                      </a:r>
+                    </a:p>
+                    <a:p>
+                      <a:pPr marL="0" marR="0">
+                        <a:lnSpc>
+                          <a:spcPct val="115000"/>
+                        </a:lnSpc>
+                        <a:spcBef>
+                          <a:spcPts val="0"/>
+                        </a:spcBef>
+                        <a:spcAft>
+                          <a:spcPts val="0"/>
+                        </a:spcAft>
+                      </a:pPr>
+                      <a:r>
+                        <a:rPr lang="en-US" sz="2300" b="1" kern="1200" dirty="0" err="1">
+                          <a:solidFill>
+                            <a:schemeClr val="accent2">
+                              <a:lumMod val="75000"/>
+                            </a:schemeClr>
+                          </a:solidFill>
+                          <a:effectLst/>
+                          <a:latin typeface="+mn-lt"/>
+                          <a:ea typeface="+mn-ea"/>
+                          <a:cs typeface="+mn-cs"/>
+                        </a:rPr>
+                        <a:t>schema:given</a:t>
+                      </a:r>
+                      <a:r>
+                        <a:rPr lang="en-US" sz="2300" b="1" kern="1200" dirty="0" err="1">
+                          <a:solidFill>
+                            <a:schemeClr val="accent2">
+                              <a:lumMod val="75000"/>
+                            </a:schemeClr>
+                          </a:solidFill>
+                          <a:effectLst/>
+                          <a:highlight>
+                            <a:srgbClr val="FFFF00"/>
+                          </a:highlight>
+                          <a:latin typeface="+mn-lt"/>
+                          <a:ea typeface="+mn-ea"/>
+                          <a:cs typeface="+mn-cs"/>
+                        </a:rPr>
+                        <a:t>N</a:t>
+                      </a:r>
+                      <a:r>
+                        <a:rPr lang="en-US" sz="2300" b="1" kern="1200" dirty="0" err="1">
+                          <a:solidFill>
+                            <a:schemeClr val="accent2">
+                              <a:lumMod val="75000"/>
+                            </a:schemeClr>
+                          </a:solidFill>
+                          <a:effectLst/>
+                          <a:latin typeface="+mn-lt"/>
+                          <a:ea typeface="+mn-ea"/>
+                          <a:cs typeface="+mn-cs"/>
+                        </a:rPr>
+                        <a:t>ame</a:t>
+                      </a:r>
+                      <a:endParaRPr lang="en-US" sz="2300" b="1" kern="1200" dirty="0">
+                        <a:solidFill>
+                          <a:schemeClr val="accent2">
+                            <a:lumMod val="75000"/>
+                          </a:schemeClr>
+                        </a:solidFill>
+                        <a:effectLst/>
+                        <a:latin typeface="+mn-lt"/>
+                        <a:ea typeface="+mn-ea"/>
+                        <a:cs typeface="+mn-cs"/>
+                      </a:endParaRPr>
+                    </a:p>
+                  </a:txBody>
+                  <a:tcPr marL="128038" marR="128038" marT="0" marB="0">
+                    <a:noFill/>
+                  </a:tcPr>
+                </a:tc>
+                <a:extLst>
+                  <a:ext uri="{0D108BD9-81ED-4DB2-BD59-A6C34878D82A}">
+                    <a16:rowId xmlns:a16="http://schemas.microsoft.com/office/drawing/2014/main" val="3174843727"/>
+                  </a:ext>
+                </a:extLst>
+              </a:tr>
+            </a:tbl>
+          </a:graphicData>
+        </a:graphic>
+      </p:graphicFrame>
     </p:spTree>
     <p:extLst>
       <p:ext uri="{BB962C8B-B14F-4D97-AF65-F5344CB8AC3E}">

</xml_diff>